<commit_message>
PPP Einführung und Clean up data
</commit_message>
<xml_diff>
--- a/Medical Appointment No Shows.pptx
+++ b/Medical Appointment No Shows.pptx
@@ -4,11 +4,19 @@
   <p:sldMasterIdLst>
     <p:sldMasterId id="2147483648" r:id="rId1"/>
   </p:sldMasterIdLst>
+  <p:notesMasterIdLst>
+    <p:notesMasterId r:id="rId11"/>
+  </p:notesMasterIdLst>
   <p:sldIdLst>
     <p:sldId id="256" r:id="rId2"/>
     <p:sldId id="257" r:id="rId3"/>
     <p:sldId id="258" r:id="rId4"/>
-    <p:sldId id="261" r:id="rId5"/>
+    <p:sldId id="270" r:id="rId5"/>
+    <p:sldId id="264" r:id="rId6"/>
+    <p:sldId id="266" r:id="rId7"/>
+    <p:sldId id="269" r:id="rId8"/>
+    <p:sldId id="268" r:id="rId9"/>
+    <p:sldId id="261" r:id="rId10"/>
   </p:sldIdLst>
   <p:sldSz cx="12192000" cy="6858000"/>
   <p:notesSz cx="6858000" cy="9144000"/>
@@ -115,6 +123,11 @@
             <p14:sldId id="256"/>
             <p14:sldId id="257"/>
             <p14:sldId id="258"/>
+            <p14:sldId id="270"/>
+            <p14:sldId id="264"/>
+            <p14:sldId id="266"/>
+            <p14:sldId id="269"/>
+            <p14:sldId id="268"/>
           </p14:sldIdLst>
         </p14:section>
         <p14:section name="Abschnitt 1" id="{1C7D8DC9-57ED-4193-A3AF-82B2A91DF4A2}">
@@ -124,8 +137,984 @@
         </p14:section>
       </p14:sectionLst>
     </p:ext>
+    <p:ext uri="{EFAFB233-063F-42B5-8137-9DF3F51BA10A}">
+      <p15:sldGuideLst xmlns:p15="http://schemas.microsoft.com/office/powerpoint/2012/main"/>
+    </p:ext>
   </p:extLst>
 </p:presentation>
+</file>
+
+<file path=ppt/notesMasters/notesMaster1.xml><?xml version="1.0" encoding="utf-8"?>
+<p:notesMaster xmlns:a="http://schemas.openxmlformats.org/drawingml/2006/main" xmlns:r="http://schemas.openxmlformats.org/officeDocument/2006/relationships" xmlns:p="http://schemas.openxmlformats.org/presentationml/2006/main">
+  <p:cSld>
+    <p:bg>
+      <p:bgRef idx="1001">
+        <a:schemeClr val="bg1"/>
+      </p:bgRef>
+    </p:bg>
+    <p:spTree>
+      <p:nvGrpSpPr>
+        <p:cNvPr id="1" name=""/>
+        <p:cNvGrpSpPr/>
+        <p:nvPr/>
+      </p:nvGrpSpPr>
+      <p:grpSpPr>
+        <a:xfrm>
+          <a:off x="0" y="0"/>
+          <a:ext cx="0" cy="0"/>
+          <a:chOff x="0" y="0"/>
+          <a:chExt cx="0" cy="0"/>
+        </a:xfrm>
+      </p:grpSpPr>
+      <p:sp>
+        <p:nvSpPr>
+          <p:cNvPr id="2" name="Kopfzeilenplatzhalter 1"/>
+          <p:cNvSpPr>
+            <a:spLocks noGrp="1"/>
+          </p:cNvSpPr>
+          <p:nvPr>
+            <p:ph type="hdr" sz="quarter"/>
+          </p:nvPr>
+        </p:nvSpPr>
+        <p:spPr>
+          <a:xfrm>
+            <a:off x="0" y="0"/>
+            <a:ext cx="2971800" cy="458788"/>
+          </a:xfrm>
+          <a:prstGeom prst="rect">
+            <a:avLst/>
+          </a:prstGeom>
+        </p:spPr>
+        <p:txBody>
+          <a:bodyPr vert="horz" lIns="91440" tIns="45720" rIns="91440" bIns="45720" rtlCol="0"/>
+          <a:lstStyle>
+            <a:lvl1pPr algn="l">
+              <a:defRPr sz="1200"/>
+            </a:lvl1pPr>
+          </a:lstStyle>
+          <a:p>
+            <a:endParaRPr lang="de-CH"/>
+          </a:p>
+        </p:txBody>
+      </p:sp>
+      <p:sp>
+        <p:nvSpPr>
+          <p:cNvPr id="3" name="Datumsplatzhalter 2"/>
+          <p:cNvSpPr>
+            <a:spLocks noGrp="1"/>
+          </p:cNvSpPr>
+          <p:nvPr>
+            <p:ph type="dt" idx="1"/>
+          </p:nvPr>
+        </p:nvSpPr>
+        <p:spPr>
+          <a:xfrm>
+            <a:off x="3884613" y="0"/>
+            <a:ext cx="2971800" cy="458788"/>
+          </a:xfrm>
+          <a:prstGeom prst="rect">
+            <a:avLst/>
+          </a:prstGeom>
+        </p:spPr>
+        <p:txBody>
+          <a:bodyPr vert="horz" lIns="91440" tIns="45720" rIns="91440" bIns="45720" rtlCol="0"/>
+          <a:lstStyle>
+            <a:lvl1pPr algn="r">
+              <a:defRPr sz="1200"/>
+            </a:lvl1pPr>
+          </a:lstStyle>
+          <a:p>
+            <a:fld id="{89E003B2-786C-4DE1-85BD-AA79EBA6DDC7}" type="datetimeFigureOut">
+              <a:rPr lang="de-CH" smtClean="0"/>
+              <a:t>13.05.2019</a:t>
+            </a:fld>
+            <a:endParaRPr lang="de-CH"/>
+          </a:p>
+        </p:txBody>
+      </p:sp>
+      <p:sp>
+        <p:nvSpPr>
+          <p:cNvPr id="4" name="Folienbildplatzhalter 3"/>
+          <p:cNvSpPr>
+            <a:spLocks noGrp="1" noRot="1" noChangeAspect="1"/>
+          </p:cNvSpPr>
+          <p:nvPr>
+            <p:ph type="sldImg" idx="2"/>
+          </p:nvPr>
+        </p:nvSpPr>
+        <p:spPr>
+          <a:xfrm>
+            <a:off x="685800" y="1143000"/>
+            <a:ext cx="5486400" cy="3086100"/>
+          </a:xfrm>
+          <a:prstGeom prst="rect">
+            <a:avLst/>
+          </a:prstGeom>
+          <a:noFill/>
+          <a:ln w="12700">
+            <a:solidFill>
+              <a:prstClr val="black"/>
+            </a:solidFill>
+          </a:ln>
+        </p:spPr>
+        <p:txBody>
+          <a:bodyPr vert="horz" lIns="91440" tIns="45720" rIns="91440" bIns="45720" rtlCol="0" anchor="ctr"/>
+          <a:lstStyle/>
+          <a:p>
+            <a:endParaRPr lang="de-CH"/>
+          </a:p>
+        </p:txBody>
+      </p:sp>
+      <p:sp>
+        <p:nvSpPr>
+          <p:cNvPr id="5" name="Notizenplatzhalter 4"/>
+          <p:cNvSpPr>
+            <a:spLocks noGrp="1"/>
+          </p:cNvSpPr>
+          <p:nvPr>
+            <p:ph type="body" sz="quarter" idx="3"/>
+          </p:nvPr>
+        </p:nvSpPr>
+        <p:spPr>
+          <a:xfrm>
+            <a:off x="685800" y="4400550"/>
+            <a:ext cx="5486400" cy="3600450"/>
+          </a:xfrm>
+          <a:prstGeom prst="rect">
+            <a:avLst/>
+          </a:prstGeom>
+        </p:spPr>
+        <p:txBody>
+          <a:bodyPr vert="horz" lIns="91440" tIns="45720" rIns="91440" bIns="45720" rtlCol="0"/>
+          <a:lstStyle/>
+          <a:p>
+            <a:pPr lvl="0"/>
+            <a:r>
+              <a:rPr lang="de-DE"/>
+              <a:t>Mastertextformat bearbeiten</a:t>
+            </a:r>
+          </a:p>
+          <a:p>
+            <a:pPr lvl="1"/>
+            <a:r>
+              <a:rPr lang="de-DE"/>
+              <a:t>Zweite Ebene</a:t>
+            </a:r>
+          </a:p>
+          <a:p>
+            <a:pPr lvl="2"/>
+            <a:r>
+              <a:rPr lang="de-DE"/>
+              <a:t>Dritte Ebene</a:t>
+            </a:r>
+          </a:p>
+          <a:p>
+            <a:pPr lvl="3"/>
+            <a:r>
+              <a:rPr lang="de-DE"/>
+              <a:t>Vierte Ebene</a:t>
+            </a:r>
+          </a:p>
+          <a:p>
+            <a:pPr lvl="4"/>
+            <a:r>
+              <a:rPr lang="de-DE"/>
+              <a:t>Fünfte Ebene</a:t>
+            </a:r>
+            <a:endParaRPr lang="de-CH"/>
+          </a:p>
+        </p:txBody>
+      </p:sp>
+      <p:sp>
+        <p:nvSpPr>
+          <p:cNvPr id="6" name="Fußzeilenplatzhalter 5"/>
+          <p:cNvSpPr>
+            <a:spLocks noGrp="1"/>
+          </p:cNvSpPr>
+          <p:nvPr>
+            <p:ph type="ftr" sz="quarter" idx="4"/>
+          </p:nvPr>
+        </p:nvSpPr>
+        <p:spPr>
+          <a:xfrm>
+            <a:off x="0" y="8685213"/>
+            <a:ext cx="2971800" cy="458787"/>
+          </a:xfrm>
+          <a:prstGeom prst="rect">
+            <a:avLst/>
+          </a:prstGeom>
+        </p:spPr>
+        <p:txBody>
+          <a:bodyPr vert="horz" lIns="91440" tIns="45720" rIns="91440" bIns="45720" rtlCol="0" anchor="b"/>
+          <a:lstStyle>
+            <a:lvl1pPr algn="l">
+              <a:defRPr sz="1200"/>
+            </a:lvl1pPr>
+          </a:lstStyle>
+          <a:p>
+            <a:endParaRPr lang="de-CH"/>
+          </a:p>
+        </p:txBody>
+      </p:sp>
+      <p:sp>
+        <p:nvSpPr>
+          <p:cNvPr id="7" name="Foliennummernplatzhalter 6"/>
+          <p:cNvSpPr>
+            <a:spLocks noGrp="1"/>
+          </p:cNvSpPr>
+          <p:nvPr>
+            <p:ph type="sldNum" sz="quarter" idx="5"/>
+          </p:nvPr>
+        </p:nvSpPr>
+        <p:spPr>
+          <a:xfrm>
+            <a:off x="3884613" y="8685213"/>
+            <a:ext cx="2971800" cy="458787"/>
+          </a:xfrm>
+          <a:prstGeom prst="rect">
+            <a:avLst/>
+          </a:prstGeom>
+        </p:spPr>
+        <p:txBody>
+          <a:bodyPr vert="horz" lIns="91440" tIns="45720" rIns="91440" bIns="45720" rtlCol="0" anchor="b"/>
+          <a:lstStyle>
+            <a:lvl1pPr algn="r">
+              <a:defRPr sz="1200"/>
+            </a:lvl1pPr>
+          </a:lstStyle>
+          <a:p>
+            <a:fld id="{A3E72A82-844A-4E08-9EB3-F7FF3B8B3A89}" type="slidenum">
+              <a:rPr lang="de-CH" smtClean="0"/>
+              <a:t>‹Nr.›</a:t>
+            </a:fld>
+            <a:endParaRPr lang="de-CH"/>
+          </a:p>
+        </p:txBody>
+      </p:sp>
+    </p:spTree>
+    <p:extLst>
+      <p:ext uri="{BB962C8B-B14F-4D97-AF65-F5344CB8AC3E}">
+        <p14:creationId xmlns:p14="http://schemas.microsoft.com/office/powerpoint/2010/main" val="3825616566"/>
+      </p:ext>
+    </p:extLst>
+  </p:cSld>
+  <p:clrMap bg1="lt1" tx1="dk1" bg2="lt2" tx2="dk2" accent1="accent1" accent2="accent2" accent3="accent3" accent4="accent4" accent5="accent5" accent6="accent6" hlink="hlink" folHlink="folHlink"/>
+  <p:notesStyle>
+    <a:lvl1pPr marL="0" algn="l" defTabSz="914400" rtl="0" eaLnBrk="1" latinLnBrk="0" hangingPunct="1">
+      <a:defRPr sz="1200" kern="1200">
+        <a:solidFill>
+          <a:schemeClr val="tx1"/>
+        </a:solidFill>
+        <a:latin typeface="+mn-lt"/>
+        <a:ea typeface="+mn-ea"/>
+        <a:cs typeface="+mn-cs"/>
+      </a:defRPr>
+    </a:lvl1pPr>
+    <a:lvl2pPr marL="457200" algn="l" defTabSz="914400" rtl="0" eaLnBrk="1" latinLnBrk="0" hangingPunct="1">
+      <a:defRPr sz="1200" kern="1200">
+        <a:solidFill>
+          <a:schemeClr val="tx1"/>
+        </a:solidFill>
+        <a:latin typeface="+mn-lt"/>
+        <a:ea typeface="+mn-ea"/>
+        <a:cs typeface="+mn-cs"/>
+      </a:defRPr>
+    </a:lvl2pPr>
+    <a:lvl3pPr marL="914400" algn="l" defTabSz="914400" rtl="0" eaLnBrk="1" latinLnBrk="0" hangingPunct="1">
+      <a:defRPr sz="1200" kern="1200">
+        <a:solidFill>
+          <a:schemeClr val="tx1"/>
+        </a:solidFill>
+        <a:latin typeface="+mn-lt"/>
+        <a:ea typeface="+mn-ea"/>
+        <a:cs typeface="+mn-cs"/>
+      </a:defRPr>
+    </a:lvl3pPr>
+    <a:lvl4pPr marL="1371600" algn="l" defTabSz="914400" rtl="0" eaLnBrk="1" latinLnBrk="0" hangingPunct="1">
+      <a:defRPr sz="1200" kern="1200">
+        <a:solidFill>
+          <a:schemeClr val="tx1"/>
+        </a:solidFill>
+        <a:latin typeface="+mn-lt"/>
+        <a:ea typeface="+mn-ea"/>
+        <a:cs typeface="+mn-cs"/>
+      </a:defRPr>
+    </a:lvl4pPr>
+    <a:lvl5pPr marL="1828800" algn="l" defTabSz="914400" rtl="0" eaLnBrk="1" latinLnBrk="0" hangingPunct="1">
+      <a:defRPr sz="1200" kern="1200">
+        <a:solidFill>
+          <a:schemeClr val="tx1"/>
+        </a:solidFill>
+        <a:latin typeface="+mn-lt"/>
+        <a:ea typeface="+mn-ea"/>
+        <a:cs typeface="+mn-cs"/>
+      </a:defRPr>
+    </a:lvl5pPr>
+    <a:lvl6pPr marL="2286000" algn="l" defTabSz="914400" rtl="0" eaLnBrk="1" latinLnBrk="0" hangingPunct="1">
+      <a:defRPr sz="1200" kern="1200">
+        <a:solidFill>
+          <a:schemeClr val="tx1"/>
+        </a:solidFill>
+        <a:latin typeface="+mn-lt"/>
+        <a:ea typeface="+mn-ea"/>
+        <a:cs typeface="+mn-cs"/>
+      </a:defRPr>
+    </a:lvl6pPr>
+    <a:lvl7pPr marL="2743200" algn="l" defTabSz="914400" rtl="0" eaLnBrk="1" latinLnBrk="0" hangingPunct="1">
+      <a:defRPr sz="1200" kern="1200">
+        <a:solidFill>
+          <a:schemeClr val="tx1"/>
+        </a:solidFill>
+        <a:latin typeface="+mn-lt"/>
+        <a:ea typeface="+mn-ea"/>
+        <a:cs typeface="+mn-cs"/>
+      </a:defRPr>
+    </a:lvl7pPr>
+    <a:lvl8pPr marL="3200400" algn="l" defTabSz="914400" rtl="0" eaLnBrk="1" latinLnBrk="0" hangingPunct="1">
+      <a:defRPr sz="1200" kern="1200">
+        <a:solidFill>
+          <a:schemeClr val="tx1"/>
+        </a:solidFill>
+        <a:latin typeface="+mn-lt"/>
+        <a:ea typeface="+mn-ea"/>
+        <a:cs typeface="+mn-cs"/>
+      </a:defRPr>
+    </a:lvl8pPr>
+    <a:lvl9pPr marL="3657600" algn="l" defTabSz="914400" rtl="0" eaLnBrk="1" latinLnBrk="0" hangingPunct="1">
+      <a:defRPr sz="1200" kern="1200">
+        <a:solidFill>
+          <a:schemeClr val="tx1"/>
+        </a:solidFill>
+        <a:latin typeface="+mn-lt"/>
+        <a:ea typeface="+mn-ea"/>
+        <a:cs typeface="+mn-cs"/>
+      </a:defRPr>
+    </a:lvl9pPr>
+  </p:notesStyle>
+</p:notesMaster>
+</file>
+
+<file path=ppt/notesSlides/notesSlide1.xml><?xml version="1.0" encoding="utf-8"?>
+<p:notes xmlns:a="http://schemas.openxmlformats.org/drawingml/2006/main" xmlns:r="http://schemas.openxmlformats.org/officeDocument/2006/relationships" xmlns:p="http://schemas.openxmlformats.org/presentationml/2006/main">
+  <p:cSld>
+    <p:spTree>
+      <p:nvGrpSpPr>
+        <p:cNvPr id="1" name=""/>
+        <p:cNvGrpSpPr/>
+        <p:nvPr/>
+      </p:nvGrpSpPr>
+      <p:grpSpPr>
+        <a:xfrm>
+          <a:off x="0" y="0"/>
+          <a:ext cx="0" cy="0"/>
+          <a:chOff x="0" y="0"/>
+          <a:chExt cx="0" cy="0"/>
+        </a:xfrm>
+      </p:grpSpPr>
+      <p:sp>
+        <p:nvSpPr>
+          <p:cNvPr id="2" name="Folienbildplatzhalter 1"/>
+          <p:cNvSpPr>
+            <a:spLocks noGrp="1" noRot="1" noChangeAspect="1"/>
+          </p:cNvSpPr>
+          <p:nvPr>
+            <p:ph type="sldImg"/>
+          </p:nvPr>
+        </p:nvSpPr>
+        <p:spPr/>
+      </p:sp>
+      <p:sp>
+        <p:nvSpPr>
+          <p:cNvPr id="3" name="Notizenplatzhalter 2"/>
+          <p:cNvSpPr>
+            <a:spLocks noGrp="1"/>
+          </p:cNvSpPr>
+          <p:nvPr>
+            <p:ph type="body" idx="1"/>
+          </p:nvPr>
+        </p:nvSpPr>
+        <p:spPr/>
+        <p:txBody>
+          <a:bodyPr/>
+          <a:lstStyle/>
+          <a:p>
+            <a:r>
+              <a:rPr lang="en-US" dirty="0" err="1"/>
+              <a:t>patNumeric</a:t>
+            </a:r>
+            <a:r>
+              <a:rPr lang="en-US" dirty="0"/>
+              <a:t> &lt;- </a:t>
+            </a:r>
+            <a:r>
+              <a:rPr lang="en-US" dirty="0" err="1"/>
+              <a:t>sapply</a:t>
+            </a:r>
+            <a:r>
+              <a:rPr lang="en-US" dirty="0"/>
+              <a:t>(</a:t>
+            </a:r>
+            <a:r>
+              <a:rPr lang="en-US" dirty="0" err="1"/>
+              <a:t>data$PatientId</a:t>
+            </a:r>
+            <a:r>
+              <a:rPr lang="en-US" dirty="0"/>
+              <a:t>, </a:t>
+            </a:r>
+            <a:r>
+              <a:rPr lang="en-US" dirty="0" err="1"/>
+              <a:t>is.numeric</a:t>
+            </a:r>
+            <a:r>
+              <a:rPr lang="en-US" dirty="0"/>
+              <a:t>)</a:t>
+            </a:r>
+          </a:p>
+          <a:p>
+            <a:r>
+              <a:rPr lang="en-US" dirty="0"/>
+              <a:t>all(</a:t>
+            </a:r>
+            <a:r>
+              <a:rPr lang="en-US" dirty="0" err="1"/>
+              <a:t>patNumeric</a:t>
+            </a:r>
+            <a:r>
+              <a:rPr lang="en-US" dirty="0"/>
+              <a:t>) </a:t>
+            </a:r>
+            <a:r>
+              <a:rPr lang="en-US" dirty="0">
+                <a:sym typeface="Wingdings" panose="05000000000000000000" pitchFamily="2" charset="2"/>
+              </a:rPr>
+              <a:t> </a:t>
+            </a:r>
+            <a:r>
+              <a:rPr lang="en-US" b="1" dirty="0">
+                <a:sym typeface="Wingdings" panose="05000000000000000000" pitchFamily="2" charset="2"/>
+              </a:rPr>
+              <a:t>TRUE</a:t>
+            </a:r>
+          </a:p>
+          <a:p>
+            <a:endParaRPr lang="en-US" dirty="0">
+              <a:sym typeface="Wingdings" panose="05000000000000000000" pitchFamily="2" charset="2"/>
+            </a:endParaRPr>
+          </a:p>
+          <a:p>
+            <a:r>
+              <a:rPr lang="en-US" dirty="0" err="1"/>
+              <a:t>appNumeric</a:t>
+            </a:r>
+            <a:r>
+              <a:rPr lang="en-US" dirty="0"/>
+              <a:t> &lt;- </a:t>
+            </a:r>
+            <a:r>
+              <a:rPr lang="en-US" dirty="0" err="1"/>
+              <a:t>sapply</a:t>
+            </a:r>
+            <a:r>
+              <a:rPr lang="en-US" dirty="0"/>
+              <a:t>(</a:t>
+            </a:r>
+            <a:r>
+              <a:rPr lang="en-US" dirty="0" err="1"/>
+              <a:t>data$AppointmentID</a:t>
+            </a:r>
+            <a:r>
+              <a:rPr lang="en-US" dirty="0"/>
+              <a:t>, </a:t>
+            </a:r>
+            <a:r>
+              <a:rPr lang="en-US" dirty="0" err="1"/>
+              <a:t>is.numeric</a:t>
+            </a:r>
+            <a:r>
+              <a:rPr lang="en-US" dirty="0"/>
+              <a:t>)</a:t>
+            </a:r>
+          </a:p>
+          <a:p>
+            <a:r>
+              <a:rPr lang="en-US" dirty="0"/>
+              <a:t>all(</a:t>
+            </a:r>
+            <a:r>
+              <a:rPr lang="en-US" dirty="0" err="1"/>
+              <a:t>appNumeric</a:t>
+            </a:r>
+            <a:r>
+              <a:rPr lang="en-US" dirty="0"/>
+              <a:t>) </a:t>
+            </a:r>
+            <a:r>
+              <a:rPr lang="en-US" dirty="0">
+                <a:sym typeface="Wingdings" panose="05000000000000000000" pitchFamily="2" charset="2"/>
+              </a:rPr>
+              <a:t> </a:t>
+            </a:r>
+            <a:r>
+              <a:rPr lang="en-US" b="1" dirty="0">
+                <a:sym typeface="Wingdings" panose="05000000000000000000" pitchFamily="2" charset="2"/>
+              </a:rPr>
+              <a:t>TRUE</a:t>
+            </a:r>
+          </a:p>
+          <a:p>
+            <a:endParaRPr lang="en-US" b="1" dirty="0">
+              <a:sym typeface="Wingdings" panose="05000000000000000000" pitchFamily="2" charset="2"/>
+            </a:endParaRPr>
+          </a:p>
+          <a:p>
+            <a:r>
+              <a:rPr lang="en-US" b="0" dirty="0"/>
+              <a:t>summary(</a:t>
+            </a:r>
+            <a:r>
+              <a:rPr lang="en-US" b="0" dirty="0" err="1"/>
+              <a:t>data$Gender</a:t>
+            </a:r>
+            <a:r>
+              <a:rPr lang="en-US" b="0" dirty="0"/>
+              <a:t>)</a:t>
+            </a:r>
+            <a:r>
+              <a:rPr lang="en-US" b="1" dirty="0"/>
+              <a:t> </a:t>
+            </a:r>
+            <a:r>
+              <a:rPr lang="en-US" b="1" dirty="0">
+                <a:sym typeface="Wingdings" panose="05000000000000000000" pitchFamily="2" charset="2"/>
+              </a:rPr>
+              <a:t> </a:t>
+            </a:r>
+            <a:r>
+              <a:rPr lang="de-CH" b="1" dirty="0">
+                <a:effectLst/>
+              </a:rPr>
+              <a:t>F 71839 / M 38687</a:t>
+            </a:r>
+          </a:p>
+          <a:p>
+            <a:endParaRPr lang="de-CH" b="1" dirty="0">
+              <a:effectLst/>
+            </a:endParaRPr>
+          </a:p>
+          <a:p>
+            <a:endParaRPr lang="en-US" b="1" dirty="0"/>
+          </a:p>
+          <a:p>
+            <a:endParaRPr lang="en-US" dirty="0"/>
+          </a:p>
+          <a:p>
+            <a:endParaRPr lang="en-US" dirty="0"/>
+          </a:p>
+          <a:p>
+            <a:endParaRPr lang="en-US" dirty="0"/>
+          </a:p>
+          <a:p>
+            <a:endParaRPr lang="en-US" dirty="0"/>
+          </a:p>
+          <a:p>
+            <a:endParaRPr lang="de-CH" dirty="0"/>
+          </a:p>
+        </p:txBody>
+      </p:sp>
+      <p:sp>
+        <p:nvSpPr>
+          <p:cNvPr id="4" name="Foliennummernplatzhalter 3"/>
+          <p:cNvSpPr>
+            <a:spLocks noGrp="1"/>
+          </p:cNvSpPr>
+          <p:nvPr>
+            <p:ph type="sldNum" sz="quarter" idx="5"/>
+          </p:nvPr>
+        </p:nvSpPr>
+        <p:spPr/>
+        <p:txBody>
+          <a:bodyPr/>
+          <a:lstStyle/>
+          <a:p>
+            <a:fld id="{A3E72A82-844A-4E08-9EB3-F7FF3B8B3A89}" type="slidenum">
+              <a:rPr lang="de-CH" smtClean="0"/>
+              <a:t>5</a:t>
+            </a:fld>
+            <a:endParaRPr lang="de-CH"/>
+          </a:p>
+        </p:txBody>
+      </p:sp>
+    </p:spTree>
+    <p:extLst>
+      <p:ext uri="{BB962C8B-B14F-4D97-AF65-F5344CB8AC3E}">
+        <p14:creationId xmlns:p14="http://schemas.microsoft.com/office/powerpoint/2010/main" val="3467603715"/>
+      </p:ext>
+    </p:extLst>
+  </p:cSld>
+  <p:clrMapOvr>
+    <a:masterClrMapping/>
+  </p:clrMapOvr>
+</p:notes>
+</file>
+
+<file path=ppt/notesSlides/notesSlide2.xml><?xml version="1.0" encoding="utf-8"?>
+<p:notes xmlns:a="http://schemas.openxmlformats.org/drawingml/2006/main" xmlns:r="http://schemas.openxmlformats.org/officeDocument/2006/relationships" xmlns:p="http://schemas.openxmlformats.org/presentationml/2006/main">
+  <p:cSld>
+    <p:spTree>
+      <p:nvGrpSpPr>
+        <p:cNvPr id="1" name=""/>
+        <p:cNvGrpSpPr/>
+        <p:nvPr/>
+      </p:nvGrpSpPr>
+      <p:grpSpPr>
+        <a:xfrm>
+          <a:off x="0" y="0"/>
+          <a:ext cx="0" cy="0"/>
+          <a:chOff x="0" y="0"/>
+          <a:chExt cx="0" cy="0"/>
+        </a:xfrm>
+      </p:grpSpPr>
+      <p:sp>
+        <p:nvSpPr>
+          <p:cNvPr id="2" name="Folienbildplatzhalter 1"/>
+          <p:cNvSpPr>
+            <a:spLocks noGrp="1" noRot="1" noChangeAspect="1"/>
+          </p:cNvSpPr>
+          <p:nvPr>
+            <p:ph type="sldImg"/>
+          </p:nvPr>
+        </p:nvSpPr>
+        <p:spPr/>
+      </p:sp>
+      <p:sp>
+        <p:nvSpPr>
+          <p:cNvPr id="3" name="Notizenplatzhalter 2"/>
+          <p:cNvSpPr>
+            <a:spLocks noGrp="1"/>
+          </p:cNvSpPr>
+          <p:nvPr>
+            <p:ph type="body" idx="1"/>
+          </p:nvPr>
+        </p:nvSpPr>
+        <p:spPr/>
+        <p:txBody>
+          <a:bodyPr/>
+          <a:lstStyle/>
+          <a:p>
+            <a:r>
+              <a:rPr lang="de-CH" dirty="0" err="1"/>
+              <a:t>Scholarship</a:t>
+            </a:r>
+            <a:r>
+              <a:rPr lang="de-CH" dirty="0"/>
+              <a:t>  - </a:t>
+            </a:r>
+            <a:r>
+              <a:rPr lang="de-CH" dirty="0" err="1"/>
+              <a:t>Alcoholism</a:t>
+            </a:r>
+            <a:r>
+              <a:rPr lang="de-CH" dirty="0"/>
+              <a:t>: </a:t>
+            </a:r>
+            <a:r>
+              <a:rPr lang="de-CH" dirty="0" err="1"/>
+              <a:t>factor</a:t>
+            </a:r>
+            <a:r>
+              <a:rPr lang="de-CH" dirty="0"/>
+              <a:t> mit 2 </a:t>
+            </a:r>
+            <a:r>
+              <a:rPr lang="de-CH" dirty="0" err="1"/>
+              <a:t>levels</a:t>
+            </a:r>
+            <a:endParaRPr lang="de-CH" sz="1200" kern="1200" dirty="0">
+              <a:solidFill>
+                <a:schemeClr val="tx1"/>
+              </a:solidFill>
+              <a:effectLst/>
+              <a:latin typeface="+mn-lt"/>
+              <a:ea typeface="+mn-ea"/>
+              <a:cs typeface="+mn-cs"/>
+            </a:endParaRPr>
+          </a:p>
+          <a:p>
+            <a:r>
+              <a:rPr lang="de-CH" sz="1200" b="1" kern="1200" dirty="0">
+                <a:solidFill>
+                  <a:schemeClr val="tx1"/>
+                </a:solidFill>
+                <a:effectLst/>
+                <a:latin typeface="+mn-lt"/>
+                <a:ea typeface="+mn-ea"/>
+                <a:cs typeface="+mn-cs"/>
+              </a:rPr>
+              <a:t>Variabel </a:t>
+            </a:r>
+            <a:r>
+              <a:rPr lang="de-CH" sz="1200" b="1" kern="1200" dirty="0" err="1">
+                <a:solidFill>
+                  <a:schemeClr val="tx1"/>
+                </a:solidFill>
+                <a:effectLst/>
+                <a:latin typeface="+mn-lt"/>
+                <a:ea typeface="+mn-ea"/>
+                <a:cs typeface="+mn-cs"/>
+              </a:rPr>
+              <a:t>Handcap</a:t>
+            </a:r>
+            <a:r>
+              <a:rPr lang="de-CH" sz="1200" kern="1200" dirty="0">
+                <a:solidFill>
+                  <a:schemeClr val="tx1"/>
+                </a:solidFill>
+                <a:effectLst/>
+                <a:latin typeface="+mn-lt"/>
+                <a:ea typeface="+mn-ea"/>
+                <a:cs typeface="+mn-cs"/>
+              </a:rPr>
+              <a:t> beinhaltet die Werte 0, 1, 2, 3 und 4. Es sollte eigentlich ein </a:t>
+            </a:r>
+            <a:r>
+              <a:rPr lang="de-CH" sz="1200" kern="1200" dirty="0" err="1">
+                <a:solidFill>
+                  <a:schemeClr val="tx1"/>
+                </a:solidFill>
+                <a:effectLst/>
+                <a:latin typeface="+mn-lt"/>
+                <a:ea typeface="+mn-ea"/>
+                <a:cs typeface="+mn-cs"/>
+              </a:rPr>
+              <a:t>boolean</a:t>
+            </a:r>
+            <a:r>
+              <a:rPr lang="de-CH" sz="1200" kern="1200" dirty="0">
+                <a:solidFill>
+                  <a:schemeClr val="tx1"/>
+                </a:solidFill>
+                <a:effectLst/>
+                <a:latin typeface="+mn-lt"/>
+                <a:ea typeface="+mn-ea"/>
+                <a:cs typeface="+mn-cs"/>
+              </a:rPr>
+              <a:t> sein. Doch laut Kommentar bedeutet 1 - 4verschiedene Arten von </a:t>
+            </a:r>
+            <a:r>
+              <a:rPr lang="de-CH" sz="1200" kern="1200" dirty="0" err="1">
+                <a:solidFill>
+                  <a:schemeClr val="tx1"/>
+                </a:solidFill>
+                <a:effectLst/>
+                <a:latin typeface="+mn-lt"/>
+                <a:ea typeface="+mn-ea"/>
+                <a:cs typeface="+mn-cs"/>
+              </a:rPr>
+              <a:t>Handycap</a:t>
+            </a:r>
+            <a:r>
+              <a:rPr lang="de-CH" sz="1200" kern="1200" dirty="0">
+                <a:solidFill>
+                  <a:schemeClr val="tx1"/>
+                </a:solidFill>
+                <a:effectLst/>
+                <a:latin typeface="+mn-lt"/>
+                <a:ea typeface="+mn-ea"/>
+                <a:cs typeface="+mn-cs"/>
+              </a:rPr>
+              <a:t>. Diese werden summiert und als 1 angeschaut. </a:t>
+            </a:r>
+          </a:p>
+          <a:p>
+            <a:endParaRPr lang="de-CH" dirty="0"/>
+          </a:p>
+          <a:p>
+            <a:endParaRPr lang="de-CH" dirty="0"/>
+          </a:p>
+          <a:p>
+            <a:endParaRPr lang="de-CH" dirty="0"/>
+          </a:p>
+        </p:txBody>
+      </p:sp>
+      <p:sp>
+        <p:nvSpPr>
+          <p:cNvPr id="4" name="Foliennummernplatzhalter 3"/>
+          <p:cNvSpPr>
+            <a:spLocks noGrp="1"/>
+          </p:cNvSpPr>
+          <p:nvPr>
+            <p:ph type="sldNum" sz="quarter" idx="5"/>
+          </p:nvPr>
+        </p:nvSpPr>
+        <p:spPr/>
+        <p:txBody>
+          <a:bodyPr/>
+          <a:lstStyle/>
+          <a:p>
+            <a:fld id="{A3E72A82-844A-4E08-9EB3-F7FF3B8B3A89}" type="slidenum">
+              <a:rPr lang="de-CH" smtClean="0"/>
+              <a:t>7</a:t>
+            </a:fld>
+            <a:endParaRPr lang="de-CH"/>
+          </a:p>
+        </p:txBody>
+      </p:sp>
+    </p:spTree>
+    <p:extLst>
+      <p:ext uri="{BB962C8B-B14F-4D97-AF65-F5344CB8AC3E}">
+        <p14:creationId xmlns:p14="http://schemas.microsoft.com/office/powerpoint/2010/main" val="3619195310"/>
+      </p:ext>
+    </p:extLst>
+  </p:cSld>
+  <p:clrMapOvr>
+    <a:masterClrMapping/>
+  </p:clrMapOvr>
+</p:notes>
+</file>
+
+<file path=ppt/notesSlides/notesSlide3.xml><?xml version="1.0" encoding="utf-8"?>
+<p:notes xmlns:a="http://schemas.openxmlformats.org/drawingml/2006/main" xmlns:r="http://schemas.openxmlformats.org/officeDocument/2006/relationships" xmlns:p="http://schemas.openxmlformats.org/presentationml/2006/main">
+  <p:cSld>
+    <p:spTree>
+      <p:nvGrpSpPr>
+        <p:cNvPr id="1" name=""/>
+        <p:cNvGrpSpPr/>
+        <p:nvPr/>
+      </p:nvGrpSpPr>
+      <p:grpSpPr>
+        <a:xfrm>
+          <a:off x="0" y="0"/>
+          <a:ext cx="0" cy="0"/>
+          <a:chOff x="0" y="0"/>
+          <a:chExt cx="0" cy="0"/>
+        </a:xfrm>
+      </p:grpSpPr>
+      <p:sp>
+        <p:nvSpPr>
+          <p:cNvPr id="2" name="Folienbildplatzhalter 1"/>
+          <p:cNvSpPr>
+            <a:spLocks noGrp="1" noRot="1" noChangeAspect="1"/>
+          </p:cNvSpPr>
+          <p:nvPr>
+            <p:ph type="sldImg"/>
+          </p:nvPr>
+        </p:nvSpPr>
+        <p:spPr/>
+      </p:sp>
+      <p:sp>
+        <p:nvSpPr>
+          <p:cNvPr id="3" name="Notizenplatzhalter 2"/>
+          <p:cNvSpPr>
+            <a:spLocks noGrp="1"/>
+          </p:cNvSpPr>
+          <p:nvPr>
+            <p:ph type="body" idx="1"/>
+          </p:nvPr>
+        </p:nvSpPr>
+        <p:spPr/>
+        <p:txBody>
+          <a:bodyPr/>
+          <a:lstStyle/>
+          <a:p>
+            <a:pPr lvl="1"/>
+            <a:r>
+              <a:rPr lang="de-CH" sz="1200" kern="1200" dirty="0">
+                <a:solidFill>
+                  <a:schemeClr val="tx1"/>
+                </a:solidFill>
+                <a:effectLst/>
+                <a:latin typeface="+mn-lt"/>
+                <a:ea typeface="+mn-ea"/>
+                <a:cs typeface="+mn-cs"/>
+              </a:rPr>
+              <a:t>Laut </a:t>
+            </a:r>
+            <a:r>
+              <a:rPr lang="de-CH" sz="1200" kern="1200" dirty="0" err="1">
+                <a:solidFill>
+                  <a:schemeClr val="tx1"/>
+                </a:solidFill>
+                <a:effectLst/>
+                <a:latin typeface="+mn-lt"/>
+                <a:ea typeface="+mn-ea"/>
+                <a:cs typeface="+mn-cs"/>
+              </a:rPr>
+              <a:t>Kaggel</a:t>
+            </a:r>
+            <a:r>
+              <a:rPr lang="de-CH" sz="1200" kern="1200" dirty="0">
+                <a:solidFill>
+                  <a:schemeClr val="tx1"/>
+                </a:solidFill>
+                <a:effectLst/>
+                <a:latin typeface="+mn-lt"/>
+                <a:ea typeface="+mn-ea"/>
+                <a:cs typeface="+mn-cs"/>
+              </a:rPr>
+              <a:t> ist es die Anzahl an empfangen SMS. Doch Datensatz beinhaltet nur 0 oder 1. Max Anzahl der empfangen SMS ist also 1. Deshalb sehen wir diese Variabel als </a:t>
+            </a:r>
+            <a:r>
+              <a:rPr lang="de-CH" sz="1200" kern="1200" dirty="0" err="1">
+                <a:solidFill>
+                  <a:schemeClr val="tx1"/>
+                </a:solidFill>
+                <a:effectLst/>
+                <a:latin typeface="+mn-lt"/>
+                <a:ea typeface="+mn-ea"/>
+                <a:cs typeface="+mn-cs"/>
+              </a:rPr>
+              <a:t>Factor</a:t>
+            </a:r>
+            <a:r>
+              <a:rPr lang="de-CH" sz="1200" kern="1200" dirty="0">
+                <a:solidFill>
+                  <a:schemeClr val="tx1"/>
+                </a:solidFill>
+                <a:effectLst/>
+                <a:latin typeface="+mn-lt"/>
+                <a:ea typeface="+mn-ea"/>
+                <a:cs typeface="+mn-cs"/>
+              </a:rPr>
+              <a:t> an</a:t>
+            </a:r>
+          </a:p>
+        </p:txBody>
+      </p:sp>
+      <p:sp>
+        <p:nvSpPr>
+          <p:cNvPr id="4" name="Foliennummernplatzhalter 3"/>
+          <p:cNvSpPr>
+            <a:spLocks noGrp="1"/>
+          </p:cNvSpPr>
+          <p:nvPr>
+            <p:ph type="sldNum" sz="quarter" idx="5"/>
+          </p:nvPr>
+        </p:nvSpPr>
+        <p:spPr/>
+        <p:txBody>
+          <a:bodyPr/>
+          <a:lstStyle/>
+          <a:p>
+            <a:fld id="{A3E72A82-844A-4E08-9EB3-F7FF3B8B3A89}" type="slidenum">
+              <a:rPr lang="de-CH" smtClean="0"/>
+              <a:t>8</a:t>
+            </a:fld>
+            <a:endParaRPr lang="de-CH"/>
+          </a:p>
+        </p:txBody>
+      </p:sp>
+    </p:spTree>
+    <p:extLst>
+      <p:ext uri="{BB962C8B-B14F-4D97-AF65-F5344CB8AC3E}">
+        <p14:creationId xmlns:p14="http://schemas.microsoft.com/office/powerpoint/2010/main" val="4192086950"/>
+      </p:ext>
+    </p:extLst>
+  </p:cSld>
+  <p:clrMapOvr>
+    <a:masterClrMapping/>
+  </p:clrMapOvr>
+</p:notes>
 </file>
 
 <file path=ppt/slideLayouts/slideLayout1.xml><?xml version="1.0" encoding="utf-8"?>
@@ -3510,14 +4499,22 @@
           <a:lstStyle/>
           <a:p>
             <a:r>
+              <a:rPr lang="de-DE" altLang="de-DE" dirty="0">
+                <a:solidFill>
+                  <a:srgbClr val="000000"/>
+                </a:solidFill>
+              </a:rPr>
+              <a:t>110`526</a:t>
+            </a:r>
+            <a:r>
               <a:rPr lang="de-CH" dirty="0"/>
-              <a:t>300’000 Datensätze</a:t>
+              <a:t> Datensätze</a:t>
             </a:r>
           </a:p>
           <a:p>
             <a:r>
               <a:rPr lang="de-CH" dirty="0"/>
-              <a:t>15 Variablen</a:t>
+              <a:t>14 Variablen</a:t>
             </a:r>
           </a:p>
           <a:p>
@@ -3528,13 +4525,196 @@
             </a:r>
             <a:r>
               <a:rPr lang="de-CH" dirty="0"/>
-              <a:t>: </a:t>
+              <a:t> &lt;</a:t>
             </a:r>
             <a:r>
               <a:rPr lang="de-CH" dirty="0" err="1"/>
               <a:t>factor</a:t>
             </a:r>
+            <a:r>
+              <a:rPr lang="de-CH" dirty="0"/>
+              <a:t>&gt;</a:t>
+            </a:r>
+          </a:p>
+          <a:p>
+            <a:pPr lvl="1"/>
             <a:endParaRPr lang="de-CH" dirty="0"/>
+          </a:p>
+          <a:p>
+            <a:r>
+              <a:rPr lang="de-CH" dirty="0" err="1"/>
+              <a:t>No</a:t>
+            </a:r>
+            <a:r>
+              <a:rPr lang="de-CH" dirty="0"/>
+              <a:t> NA</a:t>
+            </a:r>
+          </a:p>
+          <a:p>
+            <a:pPr lvl="1"/>
+            <a:r>
+              <a:rPr lang="de-CH" dirty="0" err="1">
+                <a:latin typeface="Lucida Console" panose="020B0609040504020204" pitchFamily="49" charset="0"/>
+              </a:rPr>
+              <a:t>sapply</a:t>
+            </a:r>
+            <a:r>
+              <a:rPr lang="de-CH" dirty="0">
+                <a:latin typeface="Lucida Console" panose="020B0609040504020204" pitchFamily="49" charset="0"/>
+              </a:rPr>
+              <a:t>(</a:t>
+            </a:r>
+            <a:r>
+              <a:rPr lang="de-CH" dirty="0" err="1">
+                <a:latin typeface="Lucida Console" panose="020B0609040504020204" pitchFamily="49" charset="0"/>
+              </a:rPr>
+              <a:t>data</a:t>
+            </a:r>
+            <a:r>
+              <a:rPr lang="de-CH" dirty="0">
+                <a:latin typeface="Lucida Console" panose="020B0609040504020204" pitchFamily="49" charset="0"/>
+              </a:rPr>
+              <a:t>, is.na)</a:t>
+            </a:r>
+            <a:endParaRPr lang="de-CH" dirty="0"/>
+          </a:p>
+          <a:p>
+            <a:r>
+              <a:rPr lang="de-CH" dirty="0" err="1"/>
+              <a:t>No</a:t>
+            </a:r>
+            <a:r>
+              <a:rPr lang="de-CH" dirty="0"/>
+              <a:t> null</a:t>
+            </a:r>
+          </a:p>
+          <a:p>
+            <a:pPr lvl="1"/>
+            <a:r>
+              <a:rPr lang="de-CH" dirty="0" err="1">
+                <a:latin typeface="Lucida Console" panose="020B0609040504020204" pitchFamily="49" charset="0"/>
+              </a:rPr>
+              <a:t>sapply</a:t>
+            </a:r>
+            <a:r>
+              <a:rPr lang="de-CH" dirty="0">
+                <a:latin typeface="Lucida Console" panose="020B0609040504020204" pitchFamily="49" charset="0"/>
+              </a:rPr>
+              <a:t>(</a:t>
+            </a:r>
+            <a:r>
+              <a:rPr lang="de-CH" dirty="0" err="1">
+                <a:latin typeface="Lucida Console" panose="020B0609040504020204" pitchFamily="49" charset="0"/>
+              </a:rPr>
+              <a:t>data</a:t>
+            </a:r>
+            <a:r>
+              <a:rPr lang="de-CH" dirty="0">
+                <a:latin typeface="Lucida Console" panose="020B0609040504020204" pitchFamily="49" charset="0"/>
+              </a:rPr>
+              <a:t>, </a:t>
+            </a:r>
+            <a:r>
+              <a:rPr lang="de-CH" dirty="0" err="1">
+                <a:latin typeface="Lucida Console" panose="020B0609040504020204" pitchFamily="49" charset="0"/>
+              </a:rPr>
+              <a:t>is.null</a:t>
+            </a:r>
+            <a:r>
+              <a:rPr lang="de-CH" dirty="0">
+                <a:latin typeface="Lucida Console" panose="020B0609040504020204" pitchFamily="49" charset="0"/>
+              </a:rPr>
+              <a:t>)</a:t>
+            </a:r>
+          </a:p>
+        </p:txBody>
+      </p:sp>
+      <p:sp>
+        <p:nvSpPr>
+          <p:cNvPr id="4" name="Rectangle 1">
+            <a:extLst>
+              <a:ext uri="{FF2B5EF4-FFF2-40B4-BE49-F238E27FC236}">
+                <a16:creationId xmlns:a16="http://schemas.microsoft.com/office/drawing/2014/main" id="{AEAB3B74-B163-4AF6-8087-662EA5C1922E}"/>
+              </a:ext>
+            </a:extLst>
+          </p:cNvPr>
+          <p:cNvSpPr>
+            <a:spLocks noChangeArrowheads="1"/>
+          </p:cNvSpPr>
+          <p:nvPr/>
+        </p:nvSpPr>
+        <p:spPr bwMode="auto">
+          <a:xfrm>
+            <a:off x="0" y="90100"/>
+            <a:ext cx="65" cy="276999"/>
+          </a:xfrm>
+          <a:prstGeom prst="rect">
+            <a:avLst/>
+          </a:prstGeom>
+          <a:solidFill>
+            <a:srgbClr val="FFFFFF"/>
+          </a:solidFill>
+          <a:ln>
+            <a:noFill/>
+          </a:ln>
+          <a:effectLst/>
+          <a:extLst>
+            <a:ext uri="{91240B29-F687-4F45-9708-019B960494DF}">
+              <a14:hiddenLine xmlns:a14="http://schemas.microsoft.com/office/drawing/2010/main" w="9525">
+                <a:solidFill>
+                  <a:schemeClr val="tx1"/>
+                </a:solidFill>
+                <a:miter lim="800000"/>
+                <a:headEnd/>
+                <a:tailEnd/>
+              </a14:hiddenLine>
+            </a:ext>
+            <a:ext uri="{AF507438-7753-43E0-B8FC-AC1667EBCBE1}">
+              <a14:hiddenEffects xmlns:a14="http://schemas.microsoft.com/office/drawing/2010/main">
+                <a:effectLst>
+                  <a:outerShdw dist="35921" dir="2700000" algn="ctr" rotWithShape="0">
+                    <a:schemeClr val="bg2"/>
+                  </a:outerShdw>
+                </a:effectLst>
+              </a14:hiddenEffects>
+            </a:ext>
+          </a:extLst>
+        </p:spPr>
+        <p:txBody>
+          <a:bodyPr vert="horz" wrap="none" lIns="0" tIns="0" rIns="0" bIns="0" numCol="1" anchor="ctr" anchorCtr="0" compatLnSpc="1">
+            <a:prstTxWarp prst="textNoShape">
+              <a:avLst/>
+            </a:prstTxWarp>
+            <a:spAutoFit/>
+          </a:bodyPr>
+          <a:lstStyle/>
+          <a:p>
+            <a:pPr marL="0" marR="0" lvl="0" indent="0" algn="l" defTabSz="914400" rtl="0" eaLnBrk="0" fontAlgn="base" latinLnBrk="0" hangingPunct="0">
+              <a:lnSpc>
+                <a:spcPct val="100000"/>
+              </a:lnSpc>
+              <a:spcBef>
+                <a:spcPct val="0"/>
+              </a:spcBef>
+              <a:spcAft>
+                <a:spcPct val="0"/>
+              </a:spcAft>
+              <a:buClrTx/>
+              <a:buSzTx/>
+              <a:buFontTx/>
+              <a:buNone/>
+              <a:tabLst/>
+            </a:pPr>
+            <a:endParaRPr kumimoji="0" lang="de-DE" altLang="de-DE" sz="1800" b="0" i="0" u="none" strike="noStrike" cap="none" normalizeH="0" baseline="0" dirty="0">
+              <a:ln>
+                <a:noFill/>
+              </a:ln>
+              <a:solidFill>
+                <a:schemeClr val="tx1"/>
+              </a:solidFill>
+              <a:effectLst/>
+              <a:latin typeface="Arial" panose="020B0604020202020204" pitchFamily="34" charset="0"/>
+            </a:endParaRPr>
           </a:p>
         </p:txBody>
       </p:sp>
@@ -3626,8 +4806,8 @@
           </a:prstGeom>
         </p:spPr>
       </p:pic>
-      <mc:AlternateContent xmlns:mc="http://schemas.openxmlformats.org/markup-compatibility/2006">
-        <mc:Choice xmlns:pslz="http://schemas.microsoft.com/office/powerpoint/2016/slidezoom" Requires="pslz">
+      <mc:AlternateContent xmlns:mc="http://schemas.openxmlformats.org/markup-compatibility/2006" xmlns:pslz="http://schemas.microsoft.com/office/powerpoint/2016/slidezoom">
+        <mc:Choice Requires="pslz">
           <p:graphicFrame>
             <p:nvGraphicFramePr>
               <p:cNvPr id="10" name="Folienzoom 9">
@@ -3684,7 +4864,7 @@
             </a:graphic>
           </p:graphicFrame>
         </mc:Choice>
-        <mc:Fallback>
+        <mc:Fallback xmlns="">
           <p:pic>
             <p:nvPicPr>
               <p:cNvPr id="10" name="Folienzoom 9">
@@ -3701,7 +4881,7 @@
               <p:nvPr/>
             </p:nvPicPr>
             <p:blipFill>
-              <a:blip r:embed="rId3"/>
+              <a:blip r:embed="rId5"/>
               <a:stretch>
                 <a:fillRect/>
               </a:stretch>
@@ -3820,6 +5000,3414 @@
 </file>
 
 <file path=ppt/slides/slide4.xml><?xml version="1.0" encoding="utf-8"?>
+<p:sld xmlns:a="http://schemas.openxmlformats.org/drawingml/2006/main" xmlns:r="http://schemas.openxmlformats.org/officeDocument/2006/relationships" xmlns:p="http://schemas.openxmlformats.org/presentationml/2006/main">
+  <p:cSld>
+    <p:spTree>
+      <p:nvGrpSpPr>
+        <p:cNvPr id="1" name=""/>
+        <p:cNvGrpSpPr/>
+        <p:nvPr/>
+      </p:nvGrpSpPr>
+      <p:grpSpPr>
+        <a:xfrm>
+          <a:off x="0" y="0"/>
+          <a:ext cx="0" cy="0"/>
+          <a:chOff x="0" y="0"/>
+          <a:chExt cx="0" cy="0"/>
+        </a:xfrm>
+      </p:grpSpPr>
+      <p:sp>
+        <p:nvSpPr>
+          <p:cNvPr id="2" name="Titel 1">
+            <a:extLst>
+              <a:ext uri="{FF2B5EF4-FFF2-40B4-BE49-F238E27FC236}">
+                <a16:creationId xmlns:a16="http://schemas.microsoft.com/office/drawing/2014/main" id="{5F860EDB-17ED-442B-A43E-190A1C711CA0}"/>
+              </a:ext>
+            </a:extLst>
+          </p:cNvPr>
+          <p:cNvSpPr>
+            <a:spLocks noGrp="1"/>
+          </p:cNvSpPr>
+          <p:nvPr>
+            <p:ph type="title"/>
+          </p:nvPr>
+        </p:nvSpPr>
+        <p:spPr/>
+        <p:txBody>
+          <a:bodyPr/>
+          <a:lstStyle/>
+          <a:p>
+            <a:r>
+              <a:rPr lang="de-CH" dirty="0"/>
+              <a:t>Data </a:t>
+            </a:r>
+            <a:r>
+              <a:rPr lang="de-CH" dirty="0" err="1"/>
+              <a:t>Cleaning</a:t>
+            </a:r>
+            <a:endParaRPr lang="de-CH" dirty="0"/>
+          </a:p>
+        </p:txBody>
+      </p:sp>
+      <p:sp>
+        <p:nvSpPr>
+          <p:cNvPr id="3" name="Textplatzhalter 2">
+            <a:extLst>
+              <a:ext uri="{FF2B5EF4-FFF2-40B4-BE49-F238E27FC236}">
+                <a16:creationId xmlns:a16="http://schemas.microsoft.com/office/drawing/2014/main" id="{DF5A062D-6FCC-489B-A268-CF417FE6A282}"/>
+              </a:ext>
+            </a:extLst>
+          </p:cNvPr>
+          <p:cNvSpPr>
+            <a:spLocks noGrp="1"/>
+          </p:cNvSpPr>
+          <p:nvPr>
+            <p:ph type="body" idx="1"/>
+          </p:nvPr>
+        </p:nvSpPr>
+        <p:spPr/>
+        <p:txBody>
+          <a:bodyPr/>
+          <a:lstStyle/>
+          <a:p>
+            <a:endParaRPr lang="de-CH"/>
+          </a:p>
+        </p:txBody>
+      </p:sp>
+    </p:spTree>
+    <p:extLst>
+      <p:ext uri="{BB962C8B-B14F-4D97-AF65-F5344CB8AC3E}">
+        <p14:creationId xmlns:p14="http://schemas.microsoft.com/office/powerpoint/2010/main" val="1640267596"/>
+      </p:ext>
+    </p:extLst>
+  </p:cSld>
+  <p:clrMapOvr>
+    <a:masterClrMapping/>
+  </p:clrMapOvr>
+</p:sld>
+</file>
+
+<file path=ppt/slides/slide5.xml><?xml version="1.0" encoding="utf-8"?>
+<p:sld xmlns:a="http://schemas.openxmlformats.org/drawingml/2006/main" xmlns:r="http://schemas.openxmlformats.org/officeDocument/2006/relationships" xmlns:p="http://schemas.openxmlformats.org/presentationml/2006/main">
+  <p:cSld>
+    <p:spTree>
+      <p:nvGrpSpPr>
+        <p:cNvPr id="1" name=""/>
+        <p:cNvGrpSpPr/>
+        <p:nvPr/>
+      </p:nvGrpSpPr>
+      <p:grpSpPr>
+        <a:xfrm>
+          <a:off x="0" y="0"/>
+          <a:ext cx="0" cy="0"/>
+          <a:chOff x="0" y="0"/>
+          <a:chExt cx="0" cy="0"/>
+        </a:xfrm>
+      </p:grpSpPr>
+      <p:sp>
+        <p:nvSpPr>
+          <p:cNvPr id="3" name="Inhaltsplatzhalter 2">
+            <a:extLst>
+              <a:ext uri="{FF2B5EF4-FFF2-40B4-BE49-F238E27FC236}">
+                <a16:creationId xmlns:a16="http://schemas.microsoft.com/office/drawing/2014/main" id="{D0352F83-1C43-4A33-917C-F9F2A2EF1121}"/>
+              </a:ext>
+            </a:extLst>
+          </p:cNvPr>
+          <p:cNvSpPr>
+            <a:spLocks noGrp="1"/>
+          </p:cNvSpPr>
+          <p:nvPr>
+            <p:ph idx="1"/>
+          </p:nvPr>
+        </p:nvSpPr>
+        <p:spPr>
+          <a:xfrm>
+            <a:off x="1068721" y="1057230"/>
+            <a:ext cx="10515600" cy="4351338"/>
+          </a:xfrm>
+        </p:spPr>
+        <p:txBody>
+          <a:bodyPr/>
+          <a:lstStyle/>
+          <a:p>
+            <a:r>
+              <a:rPr lang="de-DE" altLang="de-DE" b="1" dirty="0" err="1">
+                <a:solidFill>
+                  <a:srgbClr val="000000"/>
+                </a:solidFill>
+                <a:latin typeface="Lucida Console" panose="020B0609040504020204" pitchFamily="49" charset="0"/>
+              </a:rPr>
+              <a:t>PatientId</a:t>
+            </a:r>
+            <a:r>
+              <a:rPr lang="de-DE" altLang="de-DE" dirty="0">
+                <a:solidFill>
+                  <a:srgbClr val="000000"/>
+                </a:solidFill>
+                <a:latin typeface="Lucida Console" panose="020B0609040504020204" pitchFamily="49" charset="0"/>
+              </a:rPr>
+              <a:t> </a:t>
+            </a:r>
+            <a:r>
+              <a:rPr lang="de-DE" altLang="de-DE" i="1" dirty="0">
+                <a:solidFill>
+                  <a:srgbClr val="949494"/>
+                </a:solidFill>
+                <a:latin typeface="Lucida Console" panose="020B0609040504020204" pitchFamily="49" charset="0"/>
+              </a:rPr>
+              <a:t>&lt;</a:t>
+            </a:r>
+            <a:r>
+              <a:rPr lang="de-DE" altLang="de-DE" i="1" dirty="0" err="1">
+                <a:solidFill>
+                  <a:srgbClr val="949494"/>
+                </a:solidFill>
+                <a:latin typeface="Lucida Console" panose="020B0609040504020204" pitchFamily="49" charset="0"/>
+              </a:rPr>
+              <a:t>dbl</a:t>
+            </a:r>
+            <a:r>
+              <a:rPr lang="de-DE" altLang="de-DE" i="1" dirty="0">
+                <a:solidFill>
+                  <a:srgbClr val="949494"/>
+                </a:solidFill>
+                <a:latin typeface="Lucida Console" panose="020B0609040504020204" pitchFamily="49" charset="0"/>
+              </a:rPr>
+              <a:t>&gt;</a:t>
+            </a:r>
+            <a:r>
+              <a:rPr lang="de-DE" altLang="de-DE" dirty="0">
+                <a:solidFill>
+                  <a:srgbClr val="000000"/>
+                </a:solidFill>
+                <a:latin typeface="Lucida Console" panose="020B0609040504020204" pitchFamily="49" charset="0"/>
+              </a:rPr>
+              <a:t> 2.987250e+13, 5.589978e+14</a:t>
+            </a:r>
+          </a:p>
+          <a:p>
+            <a:endParaRPr lang="de-DE" dirty="0">
+              <a:solidFill>
+                <a:srgbClr val="000000"/>
+              </a:solidFill>
+              <a:latin typeface="Lucida Console" panose="020B0609040504020204" pitchFamily="49" charset="0"/>
+            </a:endParaRPr>
+          </a:p>
+          <a:p>
+            <a:r>
+              <a:rPr lang="de-DE" altLang="de-DE" b="1" dirty="0" err="1">
+                <a:solidFill>
+                  <a:srgbClr val="000000"/>
+                </a:solidFill>
+                <a:latin typeface="Lucida Console" panose="020B0609040504020204" pitchFamily="49" charset="0"/>
+              </a:rPr>
+              <a:t>AppointmentID</a:t>
+            </a:r>
+            <a:r>
+              <a:rPr lang="de-DE" altLang="de-DE" dirty="0">
+                <a:solidFill>
+                  <a:srgbClr val="000000"/>
+                </a:solidFill>
+                <a:latin typeface="Lucida Console" panose="020B0609040504020204" pitchFamily="49" charset="0"/>
+              </a:rPr>
+              <a:t> </a:t>
+            </a:r>
+            <a:r>
+              <a:rPr lang="de-DE" altLang="de-DE" i="1" dirty="0">
+                <a:solidFill>
+                  <a:srgbClr val="949494"/>
+                </a:solidFill>
+                <a:latin typeface="Lucida Console" panose="020B0609040504020204" pitchFamily="49" charset="0"/>
+              </a:rPr>
+              <a:t>&lt;</a:t>
+            </a:r>
+            <a:r>
+              <a:rPr lang="de-DE" altLang="de-DE" i="1" dirty="0" err="1">
+                <a:solidFill>
+                  <a:srgbClr val="949494"/>
+                </a:solidFill>
+                <a:latin typeface="Lucida Console" panose="020B0609040504020204" pitchFamily="49" charset="0"/>
+              </a:rPr>
+              <a:t>int</a:t>
+            </a:r>
+            <a:r>
+              <a:rPr lang="de-DE" altLang="de-DE" i="1" dirty="0">
+                <a:solidFill>
+                  <a:srgbClr val="949494"/>
+                </a:solidFill>
+                <a:latin typeface="Lucida Console" panose="020B0609040504020204" pitchFamily="49" charset="0"/>
+              </a:rPr>
+              <a:t>&gt;</a:t>
+            </a:r>
+            <a:r>
+              <a:rPr lang="de-DE" altLang="de-DE" dirty="0">
+                <a:solidFill>
+                  <a:srgbClr val="000000"/>
+                </a:solidFill>
+                <a:latin typeface="Lucida Console" panose="020B0609040504020204" pitchFamily="49" charset="0"/>
+              </a:rPr>
+              <a:t> 5642903, 5642503</a:t>
+            </a:r>
+          </a:p>
+          <a:p>
+            <a:endParaRPr lang="de-DE" altLang="de-DE" b="1" dirty="0">
+              <a:solidFill>
+                <a:srgbClr val="000000"/>
+              </a:solidFill>
+              <a:latin typeface="Lucida Console" panose="020B0609040504020204" pitchFamily="49" charset="0"/>
+            </a:endParaRPr>
+          </a:p>
+          <a:p>
+            <a:r>
+              <a:rPr lang="de-DE" altLang="de-DE" b="1" dirty="0">
+                <a:solidFill>
+                  <a:srgbClr val="000000"/>
+                </a:solidFill>
+                <a:latin typeface="Lucida Console" panose="020B0609040504020204" pitchFamily="49" charset="0"/>
+              </a:rPr>
+              <a:t>Gender</a:t>
+            </a:r>
+            <a:r>
+              <a:rPr lang="de-DE" altLang="de-DE" dirty="0">
+                <a:solidFill>
+                  <a:srgbClr val="000000"/>
+                </a:solidFill>
+                <a:latin typeface="Lucida Console" panose="020B0609040504020204" pitchFamily="49" charset="0"/>
+              </a:rPr>
+              <a:t> </a:t>
+            </a:r>
+            <a:r>
+              <a:rPr lang="de-DE" altLang="de-DE" i="1" dirty="0">
+                <a:solidFill>
+                  <a:srgbClr val="949494"/>
+                </a:solidFill>
+                <a:latin typeface="Lucida Console" panose="020B0609040504020204" pitchFamily="49" charset="0"/>
+              </a:rPr>
+              <a:t>&lt;</a:t>
+            </a:r>
+            <a:r>
+              <a:rPr lang="de-DE" altLang="de-DE" i="1" dirty="0" err="1">
+                <a:solidFill>
+                  <a:srgbClr val="949494"/>
+                </a:solidFill>
+                <a:latin typeface="Lucida Console" panose="020B0609040504020204" pitchFamily="49" charset="0"/>
+              </a:rPr>
+              <a:t>fct</a:t>
+            </a:r>
+            <a:r>
+              <a:rPr lang="de-DE" altLang="de-DE" i="1" dirty="0">
+                <a:solidFill>
+                  <a:srgbClr val="949494"/>
+                </a:solidFill>
+                <a:latin typeface="Lucida Console" panose="020B0609040504020204" pitchFamily="49" charset="0"/>
+              </a:rPr>
+              <a:t>&gt;</a:t>
+            </a:r>
+            <a:r>
+              <a:rPr lang="de-DE" altLang="de-DE" dirty="0">
+                <a:solidFill>
+                  <a:srgbClr val="000000"/>
+                </a:solidFill>
+                <a:latin typeface="Lucida Console" panose="020B0609040504020204" pitchFamily="49" charset="0"/>
+              </a:rPr>
+              <a:t> F, M, F, F, F, F, F</a:t>
+            </a:r>
+          </a:p>
+          <a:p>
+            <a:endParaRPr lang="de-DE" altLang="de-DE" dirty="0">
+              <a:solidFill>
+                <a:srgbClr val="000000"/>
+              </a:solidFill>
+              <a:latin typeface="Lucida Console" panose="020B0609040504020204" pitchFamily="49" charset="0"/>
+            </a:endParaRPr>
+          </a:p>
+          <a:p>
+            <a:r>
+              <a:rPr lang="de-DE" altLang="de-DE" b="1" dirty="0">
+                <a:solidFill>
+                  <a:srgbClr val="000000"/>
+                </a:solidFill>
+                <a:latin typeface="Lucida Console" panose="020B0609040504020204" pitchFamily="49" charset="0"/>
+              </a:rPr>
+              <a:t>Age</a:t>
+            </a:r>
+            <a:r>
+              <a:rPr lang="de-DE" altLang="de-DE" dirty="0">
+                <a:solidFill>
+                  <a:srgbClr val="000000"/>
+                </a:solidFill>
+                <a:latin typeface="Lucida Console" panose="020B0609040504020204" pitchFamily="49" charset="0"/>
+              </a:rPr>
+              <a:t> </a:t>
+            </a:r>
+            <a:r>
+              <a:rPr lang="de-DE" altLang="de-DE" i="1" dirty="0">
+                <a:solidFill>
+                  <a:srgbClr val="949494"/>
+                </a:solidFill>
+                <a:latin typeface="Lucida Console" panose="020B0609040504020204" pitchFamily="49" charset="0"/>
+              </a:rPr>
+              <a:t>&lt;</a:t>
+            </a:r>
+            <a:r>
+              <a:rPr lang="de-DE" altLang="de-DE" i="1" dirty="0" err="1">
+                <a:solidFill>
+                  <a:srgbClr val="949494"/>
+                </a:solidFill>
+                <a:latin typeface="Lucida Console" panose="020B0609040504020204" pitchFamily="49" charset="0"/>
+              </a:rPr>
+              <a:t>int</a:t>
+            </a:r>
+            <a:r>
+              <a:rPr lang="de-DE" altLang="de-DE" i="1" dirty="0">
+                <a:solidFill>
+                  <a:srgbClr val="949494"/>
+                </a:solidFill>
+                <a:latin typeface="Lucida Console" panose="020B0609040504020204" pitchFamily="49" charset="0"/>
+              </a:rPr>
+              <a:t>&gt;</a:t>
+            </a:r>
+            <a:r>
+              <a:rPr lang="de-DE" altLang="de-DE" dirty="0">
+                <a:solidFill>
+                  <a:srgbClr val="000000"/>
+                </a:solidFill>
+                <a:latin typeface="Lucida Console" panose="020B0609040504020204" pitchFamily="49" charset="0"/>
+              </a:rPr>
+              <a:t> 62, 56, 62, 8, 56, 76, 23</a:t>
+            </a:r>
+          </a:p>
+          <a:p>
+            <a:pPr lvl="1"/>
+            <a:r>
+              <a:rPr lang="de-DE" altLang="de-DE" dirty="0" err="1">
+                <a:solidFill>
+                  <a:srgbClr val="000000"/>
+                </a:solidFill>
+                <a:latin typeface="Lucida Console" panose="020B0609040504020204" pitchFamily="49" charset="0"/>
+              </a:rPr>
+              <a:t>range</a:t>
+            </a:r>
+            <a:r>
+              <a:rPr lang="de-DE" altLang="de-DE" dirty="0">
+                <a:solidFill>
+                  <a:srgbClr val="000000"/>
+                </a:solidFill>
+                <a:latin typeface="Lucida Console" panose="020B0609040504020204" pitchFamily="49" charset="0"/>
+              </a:rPr>
+              <a:t>(</a:t>
+            </a:r>
+            <a:r>
+              <a:rPr lang="de-DE" altLang="de-DE" dirty="0" err="1">
+                <a:solidFill>
+                  <a:srgbClr val="000000"/>
+                </a:solidFill>
+                <a:latin typeface="Lucida Console" panose="020B0609040504020204" pitchFamily="49" charset="0"/>
+              </a:rPr>
+              <a:t>data$Age</a:t>
+            </a:r>
+            <a:r>
+              <a:rPr lang="de-DE" altLang="de-DE" dirty="0">
+                <a:solidFill>
+                  <a:srgbClr val="000000"/>
+                </a:solidFill>
+                <a:latin typeface="Lucida Console" panose="020B0609040504020204" pitchFamily="49" charset="0"/>
+              </a:rPr>
+              <a:t>)</a:t>
+            </a:r>
+            <a:br>
+              <a:rPr lang="de-DE" altLang="de-DE" dirty="0">
+                <a:solidFill>
+                  <a:srgbClr val="000000"/>
+                </a:solidFill>
+                <a:latin typeface="Lucida Console" panose="020B0609040504020204" pitchFamily="49" charset="0"/>
+              </a:rPr>
+            </a:br>
+            <a:r>
+              <a:rPr lang="de-DE" altLang="de-DE" dirty="0">
+                <a:solidFill>
+                  <a:srgbClr val="000000"/>
+                </a:solidFill>
+                <a:latin typeface="Lucida Console" panose="020B0609040504020204" pitchFamily="49" charset="0"/>
+              </a:rPr>
+              <a:t>-1 115</a:t>
+            </a:r>
+            <a:endParaRPr lang="de-DE" altLang="de-DE" dirty="0">
+              <a:latin typeface="Arial" panose="020B0604020202020204" pitchFamily="34" charset="0"/>
+            </a:endParaRPr>
+          </a:p>
+          <a:p>
+            <a:endParaRPr lang="de-DE" altLang="de-DE" dirty="0">
+              <a:solidFill>
+                <a:srgbClr val="000000"/>
+              </a:solidFill>
+              <a:latin typeface="Lucida Console" panose="020B0609040504020204" pitchFamily="49" charset="0"/>
+            </a:endParaRPr>
+          </a:p>
+          <a:p>
+            <a:endParaRPr lang="de-DE" altLang="de-DE" dirty="0">
+              <a:latin typeface="Arial" panose="020B0604020202020204" pitchFamily="34" charset="0"/>
+            </a:endParaRPr>
+          </a:p>
+          <a:p>
+            <a:endParaRPr lang="de-DE" altLang="de-DE" sz="5400" dirty="0">
+              <a:latin typeface="Arial" panose="020B0604020202020204" pitchFamily="34" charset="0"/>
+            </a:endParaRPr>
+          </a:p>
+          <a:p>
+            <a:pPr marL="0" indent="0">
+              <a:buNone/>
+            </a:pPr>
+            <a:endParaRPr lang="de-CH" dirty="0"/>
+          </a:p>
+        </p:txBody>
+      </p:sp>
+      <p:sp>
+        <p:nvSpPr>
+          <p:cNvPr id="4" name="Rectangle 1">
+            <a:extLst>
+              <a:ext uri="{FF2B5EF4-FFF2-40B4-BE49-F238E27FC236}">
+                <a16:creationId xmlns:a16="http://schemas.microsoft.com/office/drawing/2014/main" id="{AECBCE39-4A5D-4D39-B1D8-E4D2C1A76168}"/>
+              </a:ext>
+            </a:extLst>
+          </p:cNvPr>
+          <p:cNvSpPr>
+            <a:spLocks noChangeArrowheads="1"/>
+          </p:cNvSpPr>
+          <p:nvPr/>
+        </p:nvSpPr>
+        <p:spPr bwMode="auto">
+          <a:xfrm>
+            <a:off x="230521" y="1227337"/>
+            <a:ext cx="65" cy="276999"/>
+          </a:xfrm>
+          <a:prstGeom prst="rect">
+            <a:avLst/>
+          </a:prstGeom>
+          <a:solidFill>
+            <a:srgbClr val="FFFFFF"/>
+          </a:solidFill>
+          <a:ln>
+            <a:noFill/>
+          </a:ln>
+          <a:effectLst/>
+          <a:extLst>
+            <a:ext uri="{91240B29-F687-4F45-9708-019B960494DF}">
+              <a14:hiddenLine xmlns:a14="http://schemas.microsoft.com/office/drawing/2010/main" w="9525">
+                <a:solidFill>
+                  <a:schemeClr val="tx1"/>
+                </a:solidFill>
+                <a:miter lim="800000"/>
+                <a:headEnd/>
+                <a:tailEnd/>
+              </a14:hiddenLine>
+            </a:ext>
+            <a:ext uri="{AF507438-7753-43E0-B8FC-AC1667EBCBE1}">
+              <a14:hiddenEffects xmlns:a14="http://schemas.microsoft.com/office/drawing/2010/main">
+                <a:effectLst>
+                  <a:outerShdw dist="35921" dir="2700000" algn="ctr" rotWithShape="0">
+                    <a:schemeClr val="bg2"/>
+                  </a:outerShdw>
+                </a:effectLst>
+              </a14:hiddenEffects>
+            </a:ext>
+          </a:extLst>
+        </p:spPr>
+        <p:txBody>
+          <a:bodyPr vert="horz" wrap="none" lIns="0" tIns="0" rIns="0" bIns="0" numCol="1" anchor="ctr" anchorCtr="0" compatLnSpc="1">
+            <a:prstTxWarp prst="textNoShape">
+              <a:avLst/>
+            </a:prstTxWarp>
+            <a:spAutoFit/>
+          </a:bodyPr>
+          <a:lstStyle/>
+          <a:p>
+            <a:pPr marL="0" marR="0" lvl="0" indent="0" algn="l" defTabSz="914400" rtl="0" eaLnBrk="0" fontAlgn="base" latinLnBrk="0" hangingPunct="0">
+              <a:lnSpc>
+                <a:spcPct val="100000"/>
+              </a:lnSpc>
+              <a:spcBef>
+                <a:spcPct val="0"/>
+              </a:spcBef>
+              <a:spcAft>
+                <a:spcPct val="0"/>
+              </a:spcAft>
+              <a:buClrTx/>
+              <a:buSzTx/>
+              <a:buFontTx/>
+              <a:buNone/>
+              <a:tabLst/>
+            </a:pPr>
+            <a:endParaRPr kumimoji="0" lang="de-DE" altLang="de-DE" sz="1800" b="0" i="0" u="none" strike="noStrike" cap="none" normalizeH="0" baseline="0" dirty="0">
+              <a:ln>
+                <a:noFill/>
+              </a:ln>
+              <a:solidFill>
+                <a:schemeClr val="tx1"/>
+              </a:solidFill>
+              <a:effectLst/>
+              <a:latin typeface="Arial" panose="020B0604020202020204" pitchFamily="34" charset="0"/>
+            </a:endParaRPr>
+          </a:p>
+        </p:txBody>
+      </p:sp>
+      <p:sp>
+        <p:nvSpPr>
+          <p:cNvPr id="5" name="Rectangle 2">
+            <a:extLst>
+              <a:ext uri="{FF2B5EF4-FFF2-40B4-BE49-F238E27FC236}">
+                <a16:creationId xmlns:a16="http://schemas.microsoft.com/office/drawing/2014/main" id="{34C956E7-7C2C-4DFF-8501-6175ED8D37B9}"/>
+              </a:ext>
+            </a:extLst>
+          </p:cNvPr>
+          <p:cNvSpPr>
+            <a:spLocks noChangeArrowheads="1"/>
+          </p:cNvSpPr>
+          <p:nvPr/>
+        </p:nvSpPr>
+        <p:spPr bwMode="auto">
+          <a:xfrm>
+            <a:off x="0" y="90100"/>
+            <a:ext cx="65" cy="276999"/>
+          </a:xfrm>
+          <a:prstGeom prst="rect">
+            <a:avLst/>
+          </a:prstGeom>
+          <a:solidFill>
+            <a:srgbClr val="FFFFFF"/>
+          </a:solidFill>
+          <a:ln>
+            <a:noFill/>
+          </a:ln>
+          <a:effectLst/>
+          <a:extLst>
+            <a:ext uri="{91240B29-F687-4F45-9708-019B960494DF}">
+              <a14:hiddenLine xmlns:a14="http://schemas.microsoft.com/office/drawing/2010/main" w="9525">
+                <a:solidFill>
+                  <a:schemeClr val="tx1"/>
+                </a:solidFill>
+                <a:miter lim="800000"/>
+                <a:headEnd/>
+                <a:tailEnd/>
+              </a14:hiddenLine>
+            </a:ext>
+            <a:ext uri="{AF507438-7753-43E0-B8FC-AC1667EBCBE1}">
+              <a14:hiddenEffects xmlns:a14="http://schemas.microsoft.com/office/drawing/2010/main">
+                <a:effectLst>
+                  <a:outerShdw dist="35921" dir="2700000" algn="ctr" rotWithShape="0">
+                    <a:schemeClr val="bg2"/>
+                  </a:outerShdw>
+                </a:effectLst>
+              </a14:hiddenEffects>
+            </a:ext>
+          </a:extLst>
+        </p:spPr>
+        <p:txBody>
+          <a:bodyPr vert="horz" wrap="none" lIns="0" tIns="0" rIns="0" bIns="0" numCol="1" anchor="ctr" anchorCtr="0" compatLnSpc="1">
+            <a:prstTxWarp prst="textNoShape">
+              <a:avLst/>
+            </a:prstTxWarp>
+            <a:spAutoFit/>
+          </a:bodyPr>
+          <a:lstStyle/>
+          <a:p>
+            <a:pPr marL="0" marR="0" lvl="0" indent="0" algn="l" defTabSz="914400" rtl="0" eaLnBrk="0" fontAlgn="base" latinLnBrk="0" hangingPunct="0">
+              <a:lnSpc>
+                <a:spcPct val="100000"/>
+              </a:lnSpc>
+              <a:spcBef>
+                <a:spcPct val="0"/>
+              </a:spcBef>
+              <a:spcAft>
+                <a:spcPct val="0"/>
+              </a:spcAft>
+              <a:buClrTx/>
+              <a:buSzTx/>
+              <a:buFontTx/>
+              <a:buNone/>
+              <a:tabLst/>
+            </a:pPr>
+            <a:endParaRPr kumimoji="0" lang="de-DE" altLang="de-DE" sz="1800" b="0" i="0" u="none" strike="noStrike" cap="none" normalizeH="0" baseline="0" dirty="0">
+              <a:ln>
+                <a:noFill/>
+              </a:ln>
+              <a:solidFill>
+                <a:schemeClr val="tx1"/>
+              </a:solidFill>
+              <a:effectLst/>
+              <a:latin typeface="Arial" panose="020B0604020202020204" pitchFamily="34" charset="0"/>
+            </a:endParaRPr>
+          </a:p>
+        </p:txBody>
+      </p:sp>
+      <p:sp>
+        <p:nvSpPr>
+          <p:cNvPr id="6" name="Rectangle 3">
+            <a:extLst>
+              <a:ext uri="{FF2B5EF4-FFF2-40B4-BE49-F238E27FC236}">
+                <a16:creationId xmlns:a16="http://schemas.microsoft.com/office/drawing/2014/main" id="{DDB4CFAD-1CB2-484B-B52A-A11DECF47AFE}"/>
+              </a:ext>
+            </a:extLst>
+          </p:cNvPr>
+          <p:cNvSpPr>
+            <a:spLocks noChangeArrowheads="1"/>
+          </p:cNvSpPr>
+          <p:nvPr/>
+        </p:nvSpPr>
+        <p:spPr bwMode="auto">
+          <a:xfrm>
+            <a:off x="0" y="90100"/>
+            <a:ext cx="65" cy="276999"/>
+          </a:xfrm>
+          <a:prstGeom prst="rect">
+            <a:avLst/>
+          </a:prstGeom>
+          <a:solidFill>
+            <a:srgbClr val="FFFFFF"/>
+          </a:solidFill>
+          <a:ln>
+            <a:noFill/>
+          </a:ln>
+          <a:effectLst/>
+          <a:extLst>
+            <a:ext uri="{91240B29-F687-4F45-9708-019B960494DF}">
+              <a14:hiddenLine xmlns:a14="http://schemas.microsoft.com/office/drawing/2010/main" w="9525">
+                <a:solidFill>
+                  <a:schemeClr val="tx1"/>
+                </a:solidFill>
+                <a:miter lim="800000"/>
+                <a:headEnd/>
+                <a:tailEnd/>
+              </a14:hiddenLine>
+            </a:ext>
+            <a:ext uri="{AF507438-7753-43E0-B8FC-AC1667EBCBE1}">
+              <a14:hiddenEffects xmlns:a14="http://schemas.microsoft.com/office/drawing/2010/main">
+                <a:effectLst>
+                  <a:outerShdw dist="35921" dir="2700000" algn="ctr" rotWithShape="0">
+                    <a:schemeClr val="bg2"/>
+                  </a:outerShdw>
+                </a:effectLst>
+              </a14:hiddenEffects>
+            </a:ext>
+          </a:extLst>
+        </p:spPr>
+        <p:txBody>
+          <a:bodyPr vert="horz" wrap="none" lIns="0" tIns="0" rIns="0" bIns="0" numCol="1" anchor="ctr" anchorCtr="0" compatLnSpc="1">
+            <a:prstTxWarp prst="textNoShape">
+              <a:avLst/>
+            </a:prstTxWarp>
+            <a:spAutoFit/>
+          </a:bodyPr>
+          <a:lstStyle/>
+          <a:p>
+            <a:pPr marL="0" marR="0" lvl="0" indent="0" algn="l" defTabSz="914400" rtl="0" eaLnBrk="0" fontAlgn="base" latinLnBrk="0" hangingPunct="0">
+              <a:lnSpc>
+                <a:spcPct val="100000"/>
+              </a:lnSpc>
+              <a:spcBef>
+                <a:spcPct val="0"/>
+              </a:spcBef>
+              <a:spcAft>
+                <a:spcPct val="0"/>
+              </a:spcAft>
+              <a:buClrTx/>
+              <a:buSzTx/>
+              <a:buFontTx/>
+              <a:buNone/>
+              <a:tabLst/>
+            </a:pPr>
+            <a:endParaRPr kumimoji="0" lang="de-DE" altLang="de-DE" sz="1800" b="0" i="0" u="none" strike="noStrike" cap="none" normalizeH="0" baseline="0" dirty="0">
+              <a:ln>
+                <a:noFill/>
+              </a:ln>
+              <a:solidFill>
+                <a:schemeClr val="tx1"/>
+              </a:solidFill>
+              <a:effectLst/>
+              <a:latin typeface="Arial" panose="020B0604020202020204" pitchFamily="34" charset="0"/>
+            </a:endParaRPr>
+          </a:p>
+        </p:txBody>
+      </p:sp>
+      <p:sp>
+        <p:nvSpPr>
+          <p:cNvPr id="7" name="Rectangle 4">
+            <a:extLst>
+              <a:ext uri="{FF2B5EF4-FFF2-40B4-BE49-F238E27FC236}">
+                <a16:creationId xmlns:a16="http://schemas.microsoft.com/office/drawing/2014/main" id="{63D3B991-BD06-41B7-A616-A01CE2EE2173}"/>
+              </a:ext>
+            </a:extLst>
+          </p:cNvPr>
+          <p:cNvSpPr>
+            <a:spLocks noChangeArrowheads="1"/>
+          </p:cNvSpPr>
+          <p:nvPr/>
+        </p:nvSpPr>
+        <p:spPr bwMode="auto">
+          <a:xfrm>
+            <a:off x="0" y="90100"/>
+            <a:ext cx="65" cy="276999"/>
+          </a:xfrm>
+          <a:prstGeom prst="rect">
+            <a:avLst/>
+          </a:prstGeom>
+          <a:solidFill>
+            <a:srgbClr val="FFFFFF"/>
+          </a:solidFill>
+          <a:ln>
+            <a:noFill/>
+          </a:ln>
+          <a:effectLst/>
+          <a:extLst>
+            <a:ext uri="{91240B29-F687-4F45-9708-019B960494DF}">
+              <a14:hiddenLine xmlns:a14="http://schemas.microsoft.com/office/drawing/2010/main" w="9525">
+                <a:solidFill>
+                  <a:schemeClr val="tx1"/>
+                </a:solidFill>
+                <a:miter lim="800000"/>
+                <a:headEnd/>
+                <a:tailEnd/>
+              </a14:hiddenLine>
+            </a:ext>
+            <a:ext uri="{AF507438-7753-43E0-B8FC-AC1667EBCBE1}">
+              <a14:hiddenEffects xmlns:a14="http://schemas.microsoft.com/office/drawing/2010/main">
+                <a:effectLst>
+                  <a:outerShdw dist="35921" dir="2700000" algn="ctr" rotWithShape="0">
+                    <a:schemeClr val="bg2"/>
+                  </a:outerShdw>
+                </a:effectLst>
+              </a14:hiddenEffects>
+            </a:ext>
+          </a:extLst>
+        </p:spPr>
+        <p:txBody>
+          <a:bodyPr vert="horz" wrap="none" lIns="0" tIns="0" rIns="0" bIns="0" numCol="1" anchor="ctr" anchorCtr="0" compatLnSpc="1">
+            <a:prstTxWarp prst="textNoShape">
+              <a:avLst/>
+            </a:prstTxWarp>
+            <a:spAutoFit/>
+          </a:bodyPr>
+          <a:lstStyle/>
+          <a:p>
+            <a:pPr marL="0" marR="0" lvl="0" indent="0" algn="l" defTabSz="914400" rtl="0" eaLnBrk="0" fontAlgn="base" latinLnBrk="0" hangingPunct="0">
+              <a:lnSpc>
+                <a:spcPct val="100000"/>
+              </a:lnSpc>
+              <a:spcBef>
+                <a:spcPct val="0"/>
+              </a:spcBef>
+              <a:spcAft>
+                <a:spcPct val="0"/>
+              </a:spcAft>
+              <a:buClrTx/>
+              <a:buSzTx/>
+              <a:buFontTx/>
+              <a:buNone/>
+              <a:tabLst/>
+            </a:pPr>
+            <a:endParaRPr kumimoji="0" lang="de-DE" altLang="de-DE" sz="1800" b="0" i="0" u="none" strike="noStrike" cap="none" normalizeH="0" baseline="0" dirty="0">
+              <a:ln>
+                <a:noFill/>
+              </a:ln>
+              <a:solidFill>
+                <a:schemeClr val="tx1"/>
+              </a:solidFill>
+              <a:effectLst/>
+              <a:latin typeface="Arial" panose="020B0604020202020204" pitchFamily="34" charset="0"/>
+            </a:endParaRPr>
+          </a:p>
+        </p:txBody>
+      </p:sp>
+      <p:pic>
+        <p:nvPicPr>
+          <p:cNvPr id="8" name="Grafik 7">
+            <a:extLst>
+              <a:ext uri="{FF2B5EF4-FFF2-40B4-BE49-F238E27FC236}">
+                <a16:creationId xmlns:a16="http://schemas.microsoft.com/office/drawing/2014/main" id="{CC51BDEF-4128-410E-A50D-BA12440B1DBF}"/>
+              </a:ext>
+            </a:extLst>
+          </p:cNvPr>
+          <p:cNvPicPr>
+            <a:picLocks noChangeAspect="1"/>
+          </p:cNvPicPr>
+          <p:nvPr/>
+        </p:nvPicPr>
+        <p:blipFill>
+          <a:blip r:embed="rId3"/>
+          <a:stretch>
+            <a:fillRect/>
+          </a:stretch>
+        </p:blipFill>
+        <p:spPr>
+          <a:xfrm>
+            <a:off x="5757161" y="839258"/>
+            <a:ext cx="6204318" cy="5361757"/>
+          </a:xfrm>
+          <a:prstGeom prst="rect">
+            <a:avLst/>
+          </a:prstGeom>
+          <a:ln>
+            <a:noFill/>
+          </a:ln>
+          <a:effectLst>
+            <a:outerShdw blurRad="292100" dist="139700" dir="2700000" algn="tl" rotWithShape="0">
+              <a:srgbClr val="333333">
+                <a:alpha val="65000"/>
+              </a:srgbClr>
+            </a:outerShdw>
+          </a:effectLst>
+        </p:spPr>
+      </p:pic>
+      <p:sp>
+        <p:nvSpPr>
+          <p:cNvPr id="9" name="Rechteck: abgerundete Ecken 8">
+            <a:extLst>
+              <a:ext uri="{FF2B5EF4-FFF2-40B4-BE49-F238E27FC236}">
+                <a16:creationId xmlns:a16="http://schemas.microsoft.com/office/drawing/2014/main" id="{3EC25BE6-A306-4A8C-9F51-4CB083F33DAE}"/>
+              </a:ext>
+            </a:extLst>
+          </p:cNvPr>
+          <p:cNvSpPr/>
+          <p:nvPr/>
+        </p:nvSpPr>
+        <p:spPr>
+          <a:xfrm>
+            <a:off x="6096001" y="3181191"/>
+            <a:ext cx="4192920" cy="384202"/>
+          </a:xfrm>
+          <a:prstGeom prst="roundRect">
+            <a:avLst/>
+          </a:prstGeom>
+          <a:solidFill>
+            <a:schemeClr val="accent4">
+              <a:alpha val="50000"/>
+            </a:schemeClr>
+          </a:solidFill>
+          <a:ln>
+            <a:noFill/>
+          </a:ln>
+        </p:spPr>
+        <p:style>
+          <a:lnRef idx="0">
+            <a:scrgbClr r="0" g="0" b="0"/>
+          </a:lnRef>
+          <a:fillRef idx="0">
+            <a:scrgbClr r="0" g="0" b="0"/>
+          </a:fillRef>
+          <a:effectRef idx="0">
+            <a:scrgbClr r="0" g="0" b="0"/>
+          </a:effectRef>
+          <a:fontRef idx="minor">
+            <a:schemeClr val="lt1"/>
+          </a:fontRef>
+        </p:style>
+        <p:txBody>
+          <a:bodyPr rtlCol="0" anchor="ctr"/>
+          <a:lstStyle/>
+          <a:p>
+            <a:pPr algn="ctr"/>
+            <a:endParaRPr lang="de-CH" dirty="0"/>
+          </a:p>
+        </p:txBody>
+      </p:sp>
+    </p:spTree>
+    <p:extLst>
+      <p:ext uri="{BB962C8B-B14F-4D97-AF65-F5344CB8AC3E}">
+        <p14:creationId xmlns:p14="http://schemas.microsoft.com/office/powerpoint/2010/main" val="2671915956"/>
+      </p:ext>
+    </p:extLst>
+  </p:cSld>
+  <p:clrMapOvr>
+    <a:masterClrMapping/>
+  </p:clrMapOvr>
+  <p:timing>
+    <p:tnLst>
+      <p:par>
+        <p:cTn id="1" dur="indefinite" restart="never" nodeType="tmRoot">
+          <p:childTnLst>
+            <p:seq concurrent="1" nextAc="seek">
+              <p:cTn id="2" dur="indefinite" nodeType="mainSeq">
+                <p:childTnLst>
+                  <p:par>
+                    <p:cTn id="3" fill="hold">
+                      <p:stCondLst>
+                        <p:cond delay="indefinite"/>
+                      </p:stCondLst>
+                      <p:childTnLst>
+                        <p:par>
+                          <p:cTn id="4" fill="hold">
+                            <p:stCondLst>
+                              <p:cond delay="0"/>
+                            </p:stCondLst>
+                            <p:childTnLst>
+                              <p:par>
+                                <p:cTn id="5" presetID="1" presetClass="entr" presetSubtype="0" fill="hold" nodeType="clickEffect">
+                                  <p:stCondLst>
+                                    <p:cond delay="0"/>
+                                  </p:stCondLst>
+                                  <p:childTnLst>
+                                    <p:set>
+                                      <p:cBhvr>
+                                        <p:cTn id="6" dur="1" fill="hold">
+                                          <p:stCondLst>
+                                            <p:cond delay="0"/>
+                                          </p:stCondLst>
+                                        </p:cTn>
+                                        <p:tgtEl>
+                                          <p:spTgt spid="8"/>
+                                        </p:tgtEl>
+                                        <p:attrNameLst>
+                                          <p:attrName>style.visibility</p:attrName>
+                                        </p:attrNameLst>
+                                      </p:cBhvr>
+                                      <p:to>
+                                        <p:strVal val="visible"/>
+                                      </p:to>
+                                    </p:set>
+                                  </p:childTnLst>
+                                </p:cTn>
+                              </p:par>
+                            </p:childTnLst>
+                          </p:cTn>
+                        </p:par>
+                      </p:childTnLst>
+                    </p:cTn>
+                  </p:par>
+                </p:childTnLst>
+              </p:cTn>
+              <p:prevCondLst>
+                <p:cond evt="onPrev" delay="0">
+                  <p:tgtEl>
+                    <p:sldTgt/>
+                  </p:tgtEl>
+                </p:cond>
+              </p:prevCondLst>
+              <p:nextCondLst>
+                <p:cond evt="onNext" delay="0">
+                  <p:tgtEl>
+                    <p:sldTgt/>
+                  </p:tgtEl>
+                </p:cond>
+              </p:nextCondLst>
+            </p:seq>
+          </p:childTnLst>
+        </p:cTn>
+      </p:par>
+    </p:tnLst>
+  </p:timing>
+</p:sld>
+</file>
+
+<file path=ppt/slides/slide6.xml><?xml version="1.0" encoding="utf-8"?>
+<p:sld xmlns:a="http://schemas.openxmlformats.org/drawingml/2006/main" xmlns:r="http://schemas.openxmlformats.org/officeDocument/2006/relationships" xmlns:p="http://schemas.openxmlformats.org/presentationml/2006/main">
+  <p:cSld>
+    <p:spTree>
+      <p:nvGrpSpPr>
+        <p:cNvPr id="1" name=""/>
+        <p:cNvGrpSpPr/>
+        <p:nvPr/>
+      </p:nvGrpSpPr>
+      <p:grpSpPr>
+        <a:xfrm>
+          <a:off x="0" y="0"/>
+          <a:ext cx="0" cy="0"/>
+          <a:chOff x="0" y="0"/>
+          <a:chExt cx="0" cy="0"/>
+        </a:xfrm>
+      </p:grpSpPr>
+      <p:sp>
+        <p:nvSpPr>
+          <p:cNvPr id="3" name="Inhaltsplatzhalter 2">
+            <a:extLst>
+              <a:ext uri="{FF2B5EF4-FFF2-40B4-BE49-F238E27FC236}">
+                <a16:creationId xmlns:a16="http://schemas.microsoft.com/office/drawing/2014/main" id="{D0352F83-1C43-4A33-917C-F9F2A2EF1121}"/>
+              </a:ext>
+            </a:extLst>
+          </p:cNvPr>
+          <p:cNvSpPr>
+            <a:spLocks noGrp="1"/>
+          </p:cNvSpPr>
+          <p:nvPr>
+            <p:ph idx="1"/>
+          </p:nvPr>
+        </p:nvSpPr>
+        <p:spPr>
+          <a:xfrm>
+            <a:off x="1068721" y="995758"/>
+            <a:ext cx="10515600" cy="4351338"/>
+          </a:xfrm>
+        </p:spPr>
+        <p:txBody>
+          <a:bodyPr/>
+          <a:lstStyle/>
+          <a:p>
+            <a:pPr eaLnBrk="0" fontAlgn="base" hangingPunct="0">
+              <a:lnSpc>
+                <a:spcPct val="100000"/>
+              </a:lnSpc>
+              <a:spcBef>
+                <a:spcPct val="0"/>
+              </a:spcBef>
+              <a:spcAft>
+                <a:spcPct val="0"/>
+              </a:spcAft>
+            </a:pPr>
+            <a:r>
+              <a:rPr lang="de-DE" altLang="de-DE" b="1" dirty="0" err="1">
+                <a:solidFill>
+                  <a:srgbClr val="000000"/>
+                </a:solidFill>
+                <a:latin typeface="Lucida Console" panose="020B0609040504020204" pitchFamily="49" charset="0"/>
+              </a:rPr>
+              <a:t>ScheduledDay</a:t>
+            </a:r>
+            <a:r>
+              <a:rPr lang="de-DE" altLang="de-DE" dirty="0">
+                <a:solidFill>
+                  <a:srgbClr val="000000"/>
+                </a:solidFill>
+                <a:latin typeface="Lucida Console" panose="020B0609040504020204" pitchFamily="49" charset="0"/>
+              </a:rPr>
+              <a:t> </a:t>
+            </a:r>
+            <a:r>
+              <a:rPr lang="de-DE" altLang="de-DE" i="1" dirty="0">
+                <a:solidFill>
+                  <a:srgbClr val="949494"/>
+                </a:solidFill>
+                <a:latin typeface="Lucida Console" panose="020B0609040504020204" pitchFamily="49" charset="0"/>
+              </a:rPr>
+              <a:t>&lt;</a:t>
+            </a:r>
+            <a:r>
+              <a:rPr lang="de-DE" altLang="de-DE" i="1" dirty="0" err="1">
+                <a:solidFill>
+                  <a:srgbClr val="949494"/>
+                </a:solidFill>
+                <a:latin typeface="Lucida Console" panose="020B0609040504020204" pitchFamily="49" charset="0"/>
+              </a:rPr>
+              <a:t>fct</a:t>
+            </a:r>
+            <a:r>
+              <a:rPr lang="de-DE" altLang="de-DE" i="1" dirty="0">
+                <a:solidFill>
+                  <a:srgbClr val="949494"/>
+                </a:solidFill>
+                <a:latin typeface="Lucida Console" panose="020B0609040504020204" pitchFamily="49" charset="0"/>
+              </a:rPr>
+              <a:t>&gt;</a:t>
+            </a:r>
+            <a:r>
+              <a:rPr lang="de-DE" altLang="de-DE" dirty="0">
+                <a:solidFill>
+                  <a:srgbClr val="000000"/>
+                </a:solidFill>
+                <a:latin typeface="Lucida Console" panose="020B0609040504020204" pitchFamily="49" charset="0"/>
+              </a:rPr>
+              <a:t> 2016-04-27T08:36:51Z</a:t>
+            </a:r>
+          </a:p>
+          <a:p>
+            <a:pPr lvl="1" eaLnBrk="0" fontAlgn="base" hangingPunct="0">
+              <a:lnSpc>
+                <a:spcPct val="100000"/>
+              </a:lnSpc>
+              <a:spcBef>
+                <a:spcPct val="0"/>
+              </a:spcBef>
+              <a:spcAft>
+                <a:spcPct val="0"/>
+              </a:spcAft>
+            </a:pPr>
+            <a:r>
+              <a:rPr lang="de-DE" altLang="de-DE" i="1" dirty="0">
+                <a:solidFill>
+                  <a:srgbClr val="949494"/>
+                </a:solidFill>
+                <a:latin typeface="Lucida Console" panose="020B0609040504020204" pitchFamily="49" charset="0"/>
+              </a:rPr>
+              <a:t>&lt;date&gt;</a:t>
+            </a:r>
+            <a:r>
+              <a:rPr lang="de-DE" altLang="de-DE" dirty="0">
+                <a:solidFill>
+                  <a:srgbClr val="000000"/>
+                </a:solidFill>
+                <a:latin typeface="Lucida Console" panose="020B0609040504020204" pitchFamily="49" charset="0"/>
+              </a:rPr>
+              <a:t> 2016-04-27</a:t>
+            </a:r>
+            <a:endParaRPr lang="de-DE" altLang="de-DE" dirty="0">
+              <a:latin typeface="Arial" panose="020B0604020202020204" pitchFamily="34" charset="0"/>
+            </a:endParaRPr>
+          </a:p>
+          <a:p>
+            <a:pPr marL="0" lvl="0" indent="0" eaLnBrk="0" fontAlgn="base" hangingPunct="0">
+              <a:lnSpc>
+                <a:spcPct val="100000"/>
+              </a:lnSpc>
+              <a:spcBef>
+                <a:spcPct val="0"/>
+              </a:spcBef>
+              <a:spcAft>
+                <a:spcPct val="0"/>
+              </a:spcAft>
+              <a:buNone/>
+            </a:pPr>
+            <a:endParaRPr lang="de-DE" altLang="de-DE" dirty="0">
+              <a:solidFill>
+                <a:srgbClr val="000000"/>
+              </a:solidFill>
+              <a:latin typeface="Lucida Console" panose="020B0609040504020204" pitchFamily="49" charset="0"/>
+            </a:endParaRPr>
+          </a:p>
+          <a:p>
+            <a:pPr eaLnBrk="0" fontAlgn="base" hangingPunct="0">
+              <a:lnSpc>
+                <a:spcPct val="100000"/>
+              </a:lnSpc>
+              <a:spcBef>
+                <a:spcPct val="0"/>
+              </a:spcBef>
+              <a:spcAft>
+                <a:spcPct val="0"/>
+              </a:spcAft>
+            </a:pPr>
+            <a:r>
+              <a:rPr lang="de-DE" altLang="de-DE" b="1" dirty="0" err="1">
+                <a:solidFill>
+                  <a:srgbClr val="000000"/>
+                </a:solidFill>
+                <a:latin typeface="Lucida Console" panose="020B0609040504020204" pitchFamily="49" charset="0"/>
+              </a:rPr>
+              <a:t>AppointmentDay</a:t>
+            </a:r>
+            <a:r>
+              <a:rPr lang="de-DE" altLang="de-DE" dirty="0">
+                <a:solidFill>
+                  <a:srgbClr val="000000"/>
+                </a:solidFill>
+                <a:latin typeface="Lucida Console" panose="020B0609040504020204" pitchFamily="49" charset="0"/>
+              </a:rPr>
+              <a:t> </a:t>
+            </a:r>
+            <a:r>
+              <a:rPr lang="de-DE" altLang="de-DE" i="1" dirty="0">
+                <a:solidFill>
+                  <a:srgbClr val="949494"/>
+                </a:solidFill>
+                <a:latin typeface="Lucida Console" panose="020B0609040504020204" pitchFamily="49" charset="0"/>
+              </a:rPr>
+              <a:t>&lt;</a:t>
+            </a:r>
+            <a:r>
+              <a:rPr lang="de-DE" altLang="de-DE" i="1" dirty="0" err="1">
+                <a:solidFill>
+                  <a:srgbClr val="949494"/>
+                </a:solidFill>
+                <a:latin typeface="Lucida Console" panose="020B0609040504020204" pitchFamily="49" charset="0"/>
+              </a:rPr>
+              <a:t>fct</a:t>
+            </a:r>
+            <a:r>
+              <a:rPr lang="de-DE" altLang="de-DE" i="1" dirty="0">
+                <a:solidFill>
+                  <a:srgbClr val="949494"/>
+                </a:solidFill>
+                <a:latin typeface="Lucida Console" panose="020B0609040504020204" pitchFamily="49" charset="0"/>
+              </a:rPr>
+              <a:t>&gt;</a:t>
+            </a:r>
+            <a:r>
+              <a:rPr lang="de-DE" altLang="de-DE" dirty="0">
+                <a:solidFill>
+                  <a:srgbClr val="000000"/>
+                </a:solidFill>
+                <a:latin typeface="Lucida Console" panose="020B0609040504020204" pitchFamily="49" charset="0"/>
+              </a:rPr>
+              <a:t> 2016-04-29T00:00:00Z</a:t>
+            </a:r>
+          </a:p>
+          <a:p>
+            <a:pPr lvl="1" eaLnBrk="0" fontAlgn="base" hangingPunct="0">
+              <a:lnSpc>
+                <a:spcPct val="100000"/>
+              </a:lnSpc>
+              <a:spcBef>
+                <a:spcPct val="0"/>
+              </a:spcBef>
+              <a:spcAft>
+                <a:spcPct val="0"/>
+              </a:spcAft>
+            </a:pPr>
+            <a:r>
+              <a:rPr lang="de-DE" altLang="de-DE" i="1" dirty="0">
+                <a:solidFill>
+                  <a:srgbClr val="949494"/>
+                </a:solidFill>
+                <a:latin typeface="Lucida Console" panose="020B0609040504020204" pitchFamily="49" charset="0"/>
+              </a:rPr>
+              <a:t>&lt;date&gt;</a:t>
+            </a:r>
+            <a:r>
+              <a:rPr lang="de-DE" altLang="de-DE" dirty="0">
+                <a:solidFill>
+                  <a:srgbClr val="000000"/>
+                </a:solidFill>
+                <a:latin typeface="Lucida Console" panose="020B0609040504020204" pitchFamily="49" charset="0"/>
+              </a:rPr>
+              <a:t> 2016-04-29</a:t>
+            </a:r>
+          </a:p>
+          <a:p>
+            <a:pPr lvl="1" eaLnBrk="0" fontAlgn="base" hangingPunct="0">
+              <a:lnSpc>
+                <a:spcPct val="100000"/>
+              </a:lnSpc>
+              <a:spcBef>
+                <a:spcPct val="0"/>
+              </a:spcBef>
+              <a:spcAft>
+                <a:spcPct val="0"/>
+              </a:spcAft>
+            </a:pPr>
+            <a:r>
+              <a:rPr lang="de-DE" altLang="de-DE" dirty="0">
+                <a:solidFill>
+                  <a:srgbClr val="000000"/>
+                </a:solidFill>
+                <a:latin typeface="Lucida Console" panose="020B0609040504020204" pitchFamily="49" charset="0"/>
+              </a:rPr>
+              <a:t>Immer: T00:00:00Z</a:t>
+            </a:r>
+            <a:endParaRPr lang="de-DE" altLang="de-DE" dirty="0">
+              <a:latin typeface="Arial" panose="020B0604020202020204" pitchFamily="34" charset="0"/>
+            </a:endParaRPr>
+          </a:p>
+          <a:p>
+            <a:pPr marL="457200" lvl="1" indent="0" eaLnBrk="0" fontAlgn="base" hangingPunct="0">
+              <a:lnSpc>
+                <a:spcPct val="100000"/>
+              </a:lnSpc>
+              <a:spcBef>
+                <a:spcPct val="0"/>
+              </a:spcBef>
+              <a:spcAft>
+                <a:spcPct val="0"/>
+              </a:spcAft>
+              <a:buNone/>
+            </a:pPr>
+            <a:endParaRPr lang="de-DE" altLang="de-DE" dirty="0">
+              <a:solidFill>
+                <a:srgbClr val="000000"/>
+              </a:solidFill>
+              <a:latin typeface="Lucida Console" panose="020B0609040504020204" pitchFamily="49" charset="0"/>
+            </a:endParaRPr>
+          </a:p>
+          <a:p>
+            <a:pPr eaLnBrk="0" fontAlgn="base" hangingPunct="0">
+              <a:lnSpc>
+                <a:spcPct val="100000"/>
+              </a:lnSpc>
+              <a:spcBef>
+                <a:spcPct val="0"/>
+              </a:spcBef>
+              <a:spcAft>
+                <a:spcPct val="0"/>
+              </a:spcAft>
+            </a:pPr>
+            <a:endParaRPr lang="de-DE" altLang="de-DE" sz="5400" dirty="0">
+              <a:latin typeface="Arial" panose="020B0604020202020204" pitchFamily="34" charset="0"/>
+            </a:endParaRPr>
+          </a:p>
+          <a:p>
+            <a:pPr marL="0" lvl="0" indent="0" eaLnBrk="0" fontAlgn="base" hangingPunct="0">
+              <a:lnSpc>
+                <a:spcPct val="100000"/>
+              </a:lnSpc>
+              <a:spcBef>
+                <a:spcPct val="0"/>
+              </a:spcBef>
+              <a:spcAft>
+                <a:spcPct val="0"/>
+              </a:spcAft>
+              <a:buNone/>
+            </a:pPr>
+            <a:endParaRPr lang="de-DE" altLang="de-DE" dirty="0">
+              <a:solidFill>
+                <a:srgbClr val="000000"/>
+              </a:solidFill>
+              <a:latin typeface="Lucida Console" panose="020B0609040504020204" pitchFamily="49" charset="0"/>
+            </a:endParaRPr>
+          </a:p>
+          <a:p>
+            <a:endParaRPr lang="de-DE" dirty="0">
+              <a:solidFill>
+                <a:srgbClr val="000000"/>
+              </a:solidFill>
+              <a:latin typeface="Lucida Console" panose="020B0609040504020204" pitchFamily="49" charset="0"/>
+            </a:endParaRPr>
+          </a:p>
+          <a:p>
+            <a:endParaRPr lang="de-DE" altLang="de-DE" dirty="0">
+              <a:solidFill>
+                <a:srgbClr val="000000"/>
+              </a:solidFill>
+              <a:latin typeface="Lucida Console" panose="020B0609040504020204" pitchFamily="49" charset="0"/>
+            </a:endParaRPr>
+          </a:p>
+          <a:p>
+            <a:endParaRPr lang="de-DE" altLang="de-DE" sz="5400" dirty="0">
+              <a:latin typeface="Arial" panose="020B0604020202020204" pitchFamily="34" charset="0"/>
+            </a:endParaRPr>
+          </a:p>
+          <a:p>
+            <a:pPr marL="0" indent="0">
+              <a:buNone/>
+            </a:pPr>
+            <a:endParaRPr lang="de-CH" dirty="0"/>
+          </a:p>
+        </p:txBody>
+      </p:sp>
+      <p:sp>
+        <p:nvSpPr>
+          <p:cNvPr id="4" name="Rectangle 1">
+            <a:extLst>
+              <a:ext uri="{FF2B5EF4-FFF2-40B4-BE49-F238E27FC236}">
+                <a16:creationId xmlns:a16="http://schemas.microsoft.com/office/drawing/2014/main" id="{AECBCE39-4A5D-4D39-B1D8-E4D2C1A76168}"/>
+              </a:ext>
+            </a:extLst>
+          </p:cNvPr>
+          <p:cNvSpPr>
+            <a:spLocks noChangeArrowheads="1"/>
+          </p:cNvSpPr>
+          <p:nvPr/>
+        </p:nvSpPr>
+        <p:spPr bwMode="auto">
+          <a:xfrm>
+            <a:off x="230521" y="1227337"/>
+            <a:ext cx="65" cy="276999"/>
+          </a:xfrm>
+          <a:prstGeom prst="rect">
+            <a:avLst/>
+          </a:prstGeom>
+          <a:solidFill>
+            <a:srgbClr val="FFFFFF"/>
+          </a:solidFill>
+          <a:ln>
+            <a:noFill/>
+          </a:ln>
+          <a:effectLst/>
+          <a:extLst>
+            <a:ext uri="{91240B29-F687-4F45-9708-019B960494DF}">
+              <a14:hiddenLine xmlns:a14="http://schemas.microsoft.com/office/drawing/2010/main" w="9525">
+                <a:solidFill>
+                  <a:schemeClr val="tx1"/>
+                </a:solidFill>
+                <a:miter lim="800000"/>
+                <a:headEnd/>
+                <a:tailEnd/>
+              </a14:hiddenLine>
+            </a:ext>
+            <a:ext uri="{AF507438-7753-43E0-B8FC-AC1667EBCBE1}">
+              <a14:hiddenEffects xmlns:a14="http://schemas.microsoft.com/office/drawing/2010/main">
+                <a:effectLst>
+                  <a:outerShdw dist="35921" dir="2700000" algn="ctr" rotWithShape="0">
+                    <a:schemeClr val="bg2"/>
+                  </a:outerShdw>
+                </a:effectLst>
+              </a14:hiddenEffects>
+            </a:ext>
+          </a:extLst>
+        </p:spPr>
+        <p:txBody>
+          <a:bodyPr vert="horz" wrap="none" lIns="0" tIns="0" rIns="0" bIns="0" numCol="1" anchor="ctr" anchorCtr="0" compatLnSpc="1">
+            <a:prstTxWarp prst="textNoShape">
+              <a:avLst/>
+            </a:prstTxWarp>
+            <a:spAutoFit/>
+          </a:bodyPr>
+          <a:lstStyle/>
+          <a:p>
+            <a:pPr marL="0" marR="0" lvl="0" indent="0" algn="l" defTabSz="914400" rtl="0" eaLnBrk="0" fontAlgn="base" latinLnBrk="0" hangingPunct="0">
+              <a:lnSpc>
+                <a:spcPct val="100000"/>
+              </a:lnSpc>
+              <a:spcBef>
+                <a:spcPct val="0"/>
+              </a:spcBef>
+              <a:spcAft>
+                <a:spcPct val="0"/>
+              </a:spcAft>
+              <a:buClrTx/>
+              <a:buSzTx/>
+              <a:buFontTx/>
+              <a:buNone/>
+              <a:tabLst/>
+            </a:pPr>
+            <a:endParaRPr kumimoji="0" lang="de-DE" altLang="de-DE" sz="1800" b="0" i="0" u="none" strike="noStrike" cap="none" normalizeH="0" baseline="0" dirty="0">
+              <a:ln>
+                <a:noFill/>
+              </a:ln>
+              <a:solidFill>
+                <a:schemeClr val="tx1"/>
+              </a:solidFill>
+              <a:effectLst/>
+              <a:latin typeface="Arial" panose="020B0604020202020204" pitchFamily="34" charset="0"/>
+            </a:endParaRPr>
+          </a:p>
+        </p:txBody>
+      </p:sp>
+      <p:sp>
+        <p:nvSpPr>
+          <p:cNvPr id="5" name="Rectangle 2">
+            <a:extLst>
+              <a:ext uri="{FF2B5EF4-FFF2-40B4-BE49-F238E27FC236}">
+                <a16:creationId xmlns:a16="http://schemas.microsoft.com/office/drawing/2014/main" id="{34C956E7-7C2C-4DFF-8501-6175ED8D37B9}"/>
+              </a:ext>
+            </a:extLst>
+          </p:cNvPr>
+          <p:cNvSpPr>
+            <a:spLocks noChangeArrowheads="1"/>
+          </p:cNvSpPr>
+          <p:nvPr/>
+        </p:nvSpPr>
+        <p:spPr bwMode="auto">
+          <a:xfrm>
+            <a:off x="0" y="90100"/>
+            <a:ext cx="65" cy="276999"/>
+          </a:xfrm>
+          <a:prstGeom prst="rect">
+            <a:avLst/>
+          </a:prstGeom>
+          <a:solidFill>
+            <a:srgbClr val="FFFFFF"/>
+          </a:solidFill>
+          <a:ln>
+            <a:noFill/>
+          </a:ln>
+          <a:effectLst/>
+          <a:extLst>
+            <a:ext uri="{91240B29-F687-4F45-9708-019B960494DF}">
+              <a14:hiddenLine xmlns:a14="http://schemas.microsoft.com/office/drawing/2010/main" w="9525">
+                <a:solidFill>
+                  <a:schemeClr val="tx1"/>
+                </a:solidFill>
+                <a:miter lim="800000"/>
+                <a:headEnd/>
+                <a:tailEnd/>
+              </a14:hiddenLine>
+            </a:ext>
+            <a:ext uri="{AF507438-7753-43E0-B8FC-AC1667EBCBE1}">
+              <a14:hiddenEffects xmlns:a14="http://schemas.microsoft.com/office/drawing/2010/main">
+                <a:effectLst>
+                  <a:outerShdw dist="35921" dir="2700000" algn="ctr" rotWithShape="0">
+                    <a:schemeClr val="bg2"/>
+                  </a:outerShdw>
+                </a:effectLst>
+              </a14:hiddenEffects>
+            </a:ext>
+          </a:extLst>
+        </p:spPr>
+        <p:txBody>
+          <a:bodyPr vert="horz" wrap="none" lIns="0" tIns="0" rIns="0" bIns="0" numCol="1" anchor="ctr" anchorCtr="0" compatLnSpc="1">
+            <a:prstTxWarp prst="textNoShape">
+              <a:avLst/>
+            </a:prstTxWarp>
+            <a:spAutoFit/>
+          </a:bodyPr>
+          <a:lstStyle/>
+          <a:p>
+            <a:pPr marL="0" marR="0" lvl="0" indent="0" algn="l" defTabSz="914400" rtl="0" eaLnBrk="0" fontAlgn="base" latinLnBrk="0" hangingPunct="0">
+              <a:lnSpc>
+                <a:spcPct val="100000"/>
+              </a:lnSpc>
+              <a:spcBef>
+                <a:spcPct val="0"/>
+              </a:spcBef>
+              <a:spcAft>
+                <a:spcPct val="0"/>
+              </a:spcAft>
+              <a:buClrTx/>
+              <a:buSzTx/>
+              <a:buFontTx/>
+              <a:buNone/>
+              <a:tabLst/>
+            </a:pPr>
+            <a:endParaRPr kumimoji="0" lang="de-DE" altLang="de-DE" sz="1800" b="0" i="0" u="none" strike="noStrike" cap="none" normalizeH="0" baseline="0" dirty="0">
+              <a:ln>
+                <a:noFill/>
+              </a:ln>
+              <a:solidFill>
+                <a:schemeClr val="tx1"/>
+              </a:solidFill>
+              <a:effectLst/>
+              <a:latin typeface="Arial" panose="020B0604020202020204" pitchFamily="34" charset="0"/>
+            </a:endParaRPr>
+          </a:p>
+        </p:txBody>
+      </p:sp>
+      <p:sp>
+        <p:nvSpPr>
+          <p:cNvPr id="6" name="Rectangle 1">
+            <a:extLst>
+              <a:ext uri="{FF2B5EF4-FFF2-40B4-BE49-F238E27FC236}">
+                <a16:creationId xmlns:a16="http://schemas.microsoft.com/office/drawing/2014/main" id="{F9FA6A91-2014-4655-95E9-05A3F342A5DC}"/>
+              </a:ext>
+            </a:extLst>
+          </p:cNvPr>
+          <p:cNvSpPr>
+            <a:spLocks noChangeArrowheads="1"/>
+          </p:cNvSpPr>
+          <p:nvPr/>
+        </p:nvSpPr>
+        <p:spPr bwMode="auto">
+          <a:xfrm>
+            <a:off x="0" y="90100"/>
+            <a:ext cx="65" cy="276999"/>
+          </a:xfrm>
+          <a:prstGeom prst="rect">
+            <a:avLst/>
+          </a:prstGeom>
+          <a:solidFill>
+            <a:srgbClr val="FFFFFF"/>
+          </a:solidFill>
+          <a:ln>
+            <a:noFill/>
+          </a:ln>
+          <a:effectLst/>
+          <a:extLst>
+            <a:ext uri="{91240B29-F687-4F45-9708-019B960494DF}">
+              <a14:hiddenLine xmlns:a14="http://schemas.microsoft.com/office/drawing/2010/main" w="9525">
+                <a:solidFill>
+                  <a:schemeClr val="tx1"/>
+                </a:solidFill>
+                <a:miter lim="800000"/>
+                <a:headEnd/>
+                <a:tailEnd/>
+              </a14:hiddenLine>
+            </a:ext>
+            <a:ext uri="{AF507438-7753-43E0-B8FC-AC1667EBCBE1}">
+              <a14:hiddenEffects xmlns:a14="http://schemas.microsoft.com/office/drawing/2010/main">
+                <a:effectLst>
+                  <a:outerShdw dist="35921" dir="2700000" algn="ctr" rotWithShape="0">
+                    <a:schemeClr val="bg2"/>
+                  </a:outerShdw>
+                </a:effectLst>
+              </a14:hiddenEffects>
+            </a:ext>
+          </a:extLst>
+        </p:spPr>
+        <p:txBody>
+          <a:bodyPr vert="horz" wrap="none" lIns="0" tIns="0" rIns="0" bIns="0" numCol="1" anchor="ctr" anchorCtr="0" compatLnSpc="1">
+            <a:prstTxWarp prst="textNoShape">
+              <a:avLst/>
+            </a:prstTxWarp>
+            <a:spAutoFit/>
+          </a:bodyPr>
+          <a:lstStyle/>
+          <a:p>
+            <a:pPr marL="0" marR="0" lvl="0" indent="0" algn="l" defTabSz="914400" rtl="0" eaLnBrk="0" fontAlgn="base" latinLnBrk="0" hangingPunct="0">
+              <a:lnSpc>
+                <a:spcPct val="100000"/>
+              </a:lnSpc>
+              <a:spcBef>
+                <a:spcPct val="0"/>
+              </a:spcBef>
+              <a:spcAft>
+                <a:spcPct val="0"/>
+              </a:spcAft>
+              <a:buClrTx/>
+              <a:buSzTx/>
+              <a:buFontTx/>
+              <a:buNone/>
+              <a:tabLst/>
+            </a:pPr>
+            <a:endParaRPr kumimoji="0" lang="de-DE" altLang="de-DE" sz="1800" b="0" i="0" u="none" strike="noStrike" cap="none" normalizeH="0" baseline="0" dirty="0">
+              <a:ln>
+                <a:noFill/>
+              </a:ln>
+              <a:solidFill>
+                <a:schemeClr val="tx1"/>
+              </a:solidFill>
+              <a:effectLst/>
+              <a:latin typeface="Arial" panose="020B0604020202020204" pitchFamily="34" charset="0"/>
+            </a:endParaRPr>
+          </a:p>
+        </p:txBody>
+      </p:sp>
+      <p:sp>
+        <p:nvSpPr>
+          <p:cNvPr id="7" name="Rectangle 2">
+            <a:extLst>
+              <a:ext uri="{FF2B5EF4-FFF2-40B4-BE49-F238E27FC236}">
+                <a16:creationId xmlns:a16="http://schemas.microsoft.com/office/drawing/2014/main" id="{1639DC98-A0B3-4583-BF8A-33197334FDF3}"/>
+              </a:ext>
+            </a:extLst>
+          </p:cNvPr>
+          <p:cNvSpPr>
+            <a:spLocks noChangeArrowheads="1"/>
+          </p:cNvSpPr>
+          <p:nvPr/>
+        </p:nvSpPr>
+        <p:spPr bwMode="auto">
+          <a:xfrm>
+            <a:off x="0" y="90100"/>
+            <a:ext cx="65" cy="276999"/>
+          </a:xfrm>
+          <a:prstGeom prst="rect">
+            <a:avLst/>
+          </a:prstGeom>
+          <a:solidFill>
+            <a:srgbClr val="FFFFFF"/>
+          </a:solidFill>
+          <a:ln>
+            <a:noFill/>
+          </a:ln>
+          <a:effectLst/>
+          <a:extLst>
+            <a:ext uri="{91240B29-F687-4F45-9708-019B960494DF}">
+              <a14:hiddenLine xmlns:a14="http://schemas.microsoft.com/office/drawing/2010/main" w="9525">
+                <a:solidFill>
+                  <a:schemeClr val="tx1"/>
+                </a:solidFill>
+                <a:miter lim="800000"/>
+                <a:headEnd/>
+                <a:tailEnd/>
+              </a14:hiddenLine>
+            </a:ext>
+            <a:ext uri="{AF507438-7753-43E0-B8FC-AC1667EBCBE1}">
+              <a14:hiddenEffects xmlns:a14="http://schemas.microsoft.com/office/drawing/2010/main">
+                <a:effectLst>
+                  <a:outerShdw dist="35921" dir="2700000" algn="ctr" rotWithShape="0">
+                    <a:schemeClr val="bg2"/>
+                  </a:outerShdw>
+                </a:effectLst>
+              </a14:hiddenEffects>
+            </a:ext>
+          </a:extLst>
+        </p:spPr>
+        <p:txBody>
+          <a:bodyPr vert="horz" wrap="none" lIns="0" tIns="0" rIns="0" bIns="0" numCol="1" anchor="ctr" anchorCtr="0" compatLnSpc="1">
+            <a:prstTxWarp prst="textNoShape">
+              <a:avLst/>
+            </a:prstTxWarp>
+            <a:spAutoFit/>
+          </a:bodyPr>
+          <a:lstStyle/>
+          <a:p>
+            <a:pPr marL="0" marR="0" lvl="0" indent="0" algn="l" defTabSz="914400" rtl="0" eaLnBrk="0" fontAlgn="base" latinLnBrk="0" hangingPunct="0">
+              <a:lnSpc>
+                <a:spcPct val="100000"/>
+              </a:lnSpc>
+              <a:spcBef>
+                <a:spcPct val="0"/>
+              </a:spcBef>
+              <a:spcAft>
+                <a:spcPct val="0"/>
+              </a:spcAft>
+              <a:buClrTx/>
+              <a:buSzTx/>
+              <a:buFontTx/>
+              <a:buNone/>
+              <a:tabLst/>
+            </a:pPr>
+            <a:endParaRPr kumimoji="0" lang="de-DE" altLang="de-DE" sz="1800" b="0" i="0" u="none" strike="noStrike" cap="none" normalizeH="0" baseline="0" dirty="0">
+              <a:ln>
+                <a:noFill/>
+              </a:ln>
+              <a:solidFill>
+                <a:schemeClr val="tx1"/>
+              </a:solidFill>
+              <a:effectLst/>
+              <a:latin typeface="Arial" panose="020B0604020202020204" pitchFamily="34" charset="0"/>
+            </a:endParaRPr>
+          </a:p>
+        </p:txBody>
+      </p:sp>
+      <p:sp>
+        <p:nvSpPr>
+          <p:cNvPr id="8" name="Rectangle 3">
+            <a:extLst>
+              <a:ext uri="{FF2B5EF4-FFF2-40B4-BE49-F238E27FC236}">
+                <a16:creationId xmlns:a16="http://schemas.microsoft.com/office/drawing/2014/main" id="{64BA156C-4E3D-478B-9CFC-411A0DB4854D}"/>
+              </a:ext>
+            </a:extLst>
+          </p:cNvPr>
+          <p:cNvSpPr>
+            <a:spLocks noChangeArrowheads="1"/>
+          </p:cNvSpPr>
+          <p:nvPr/>
+        </p:nvSpPr>
+        <p:spPr bwMode="auto">
+          <a:xfrm>
+            <a:off x="0" y="90100"/>
+            <a:ext cx="65" cy="276999"/>
+          </a:xfrm>
+          <a:prstGeom prst="rect">
+            <a:avLst/>
+          </a:prstGeom>
+          <a:solidFill>
+            <a:srgbClr val="FFFFFF"/>
+          </a:solidFill>
+          <a:ln>
+            <a:noFill/>
+          </a:ln>
+          <a:effectLst/>
+          <a:extLst>
+            <a:ext uri="{91240B29-F687-4F45-9708-019B960494DF}">
+              <a14:hiddenLine xmlns:a14="http://schemas.microsoft.com/office/drawing/2010/main" w="9525">
+                <a:solidFill>
+                  <a:schemeClr val="tx1"/>
+                </a:solidFill>
+                <a:miter lim="800000"/>
+                <a:headEnd/>
+                <a:tailEnd/>
+              </a14:hiddenLine>
+            </a:ext>
+            <a:ext uri="{AF507438-7753-43E0-B8FC-AC1667EBCBE1}">
+              <a14:hiddenEffects xmlns:a14="http://schemas.microsoft.com/office/drawing/2010/main">
+                <a:effectLst>
+                  <a:outerShdw dist="35921" dir="2700000" algn="ctr" rotWithShape="0">
+                    <a:schemeClr val="bg2"/>
+                  </a:outerShdw>
+                </a:effectLst>
+              </a14:hiddenEffects>
+            </a:ext>
+          </a:extLst>
+        </p:spPr>
+        <p:txBody>
+          <a:bodyPr vert="horz" wrap="none" lIns="0" tIns="0" rIns="0" bIns="0" numCol="1" anchor="ctr" anchorCtr="0" compatLnSpc="1">
+            <a:prstTxWarp prst="textNoShape">
+              <a:avLst/>
+            </a:prstTxWarp>
+            <a:spAutoFit/>
+          </a:bodyPr>
+          <a:lstStyle/>
+          <a:p>
+            <a:pPr marL="0" marR="0" lvl="0" indent="0" algn="l" defTabSz="914400" rtl="0" eaLnBrk="0" fontAlgn="base" latinLnBrk="0" hangingPunct="0">
+              <a:lnSpc>
+                <a:spcPct val="100000"/>
+              </a:lnSpc>
+              <a:spcBef>
+                <a:spcPct val="0"/>
+              </a:spcBef>
+              <a:spcAft>
+                <a:spcPct val="0"/>
+              </a:spcAft>
+              <a:buClrTx/>
+              <a:buSzTx/>
+              <a:buFontTx/>
+              <a:buNone/>
+              <a:tabLst/>
+            </a:pPr>
+            <a:endParaRPr kumimoji="0" lang="de-DE" altLang="de-DE" sz="1800" b="0" i="0" u="none" strike="noStrike" cap="none" normalizeH="0" baseline="0" dirty="0">
+              <a:ln>
+                <a:noFill/>
+              </a:ln>
+              <a:solidFill>
+                <a:schemeClr val="tx1"/>
+              </a:solidFill>
+              <a:effectLst/>
+              <a:latin typeface="Arial" panose="020B0604020202020204" pitchFamily="34" charset="0"/>
+            </a:endParaRPr>
+          </a:p>
+        </p:txBody>
+      </p:sp>
+      <p:sp>
+        <p:nvSpPr>
+          <p:cNvPr id="9" name="Rectangle 4">
+            <a:extLst>
+              <a:ext uri="{FF2B5EF4-FFF2-40B4-BE49-F238E27FC236}">
+                <a16:creationId xmlns:a16="http://schemas.microsoft.com/office/drawing/2014/main" id="{3E420309-436A-42DC-820C-D5461E0762F9}"/>
+              </a:ext>
+            </a:extLst>
+          </p:cNvPr>
+          <p:cNvSpPr>
+            <a:spLocks noChangeArrowheads="1"/>
+          </p:cNvSpPr>
+          <p:nvPr/>
+        </p:nvSpPr>
+        <p:spPr bwMode="auto">
+          <a:xfrm>
+            <a:off x="0" y="90100"/>
+            <a:ext cx="65" cy="276999"/>
+          </a:xfrm>
+          <a:prstGeom prst="rect">
+            <a:avLst/>
+          </a:prstGeom>
+          <a:solidFill>
+            <a:srgbClr val="FFFFFF"/>
+          </a:solidFill>
+          <a:ln>
+            <a:noFill/>
+          </a:ln>
+          <a:effectLst/>
+          <a:extLst>
+            <a:ext uri="{91240B29-F687-4F45-9708-019B960494DF}">
+              <a14:hiddenLine xmlns:a14="http://schemas.microsoft.com/office/drawing/2010/main" w="9525">
+                <a:solidFill>
+                  <a:schemeClr val="tx1"/>
+                </a:solidFill>
+                <a:miter lim="800000"/>
+                <a:headEnd/>
+                <a:tailEnd/>
+              </a14:hiddenLine>
+            </a:ext>
+            <a:ext uri="{AF507438-7753-43E0-B8FC-AC1667EBCBE1}">
+              <a14:hiddenEffects xmlns:a14="http://schemas.microsoft.com/office/drawing/2010/main">
+                <a:effectLst>
+                  <a:outerShdw dist="35921" dir="2700000" algn="ctr" rotWithShape="0">
+                    <a:schemeClr val="bg2"/>
+                  </a:outerShdw>
+                </a:effectLst>
+              </a14:hiddenEffects>
+            </a:ext>
+          </a:extLst>
+        </p:spPr>
+        <p:txBody>
+          <a:bodyPr vert="horz" wrap="none" lIns="0" tIns="0" rIns="0" bIns="0" numCol="1" anchor="ctr" anchorCtr="0" compatLnSpc="1">
+            <a:prstTxWarp prst="textNoShape">
+              <a:avLst/>
+            </a:prstTxWarp>
+            <a:spAutoFit/>
+          </a:bodyPr>
+          <a:lstStyle/>
+          <a:p>
+            <a:pPr marL="0" marR="0" lvl="0" indent="0" algn="l" defTabSz="914400" rtl="0" eaLnBrk="0" fontAlgn="base" latinLnBrk="0" hangingPunct="0">
+              <a:lnSpc>
+                <a:spcPct val="100000"/>
+              </a:lnSpc>
+              <a:spcBef>
+                <a:spcPct val="0"/>
+              </a:spcBef>
+              <a:spcAft>
+                <a:spcPct val="0"/>
+              </a:spcAft>
+              <a:buClrTx/>
+              <a:buSzTx/>
+              <a:buFontTx/>
+              <a:buNone/>
+              <a:tabLst/>
+            </a:pPr>
+            <a:endParaRPr kumimoji="0" lang="de-DE" altLang="de-DE" sz="1800" b="0" i="0" u="none" strike="noStrike" cap="none" normalizeH="0" baseline="0" dirty="0">
+              <a:ln>
+                <a:noFill/>
+              </a:ln>
+              <a:solidFill>
+                <a:schemeClr val="tx1"/>
+              </a:solidFill>
+              <a:effectLst/>
+              <a:latin typeface="Arial" panose="020B0604020202020204" pitchFamily="34" charset="0"/>
+            </a:endParaRPr>
+          </a:p>
+        </p:txBody>
+      </p:sp>
+    </p:spTree>
+    <p:extLst>
+      <p:ext uri="{BB962C8B-B14F-4D97-AF65-F5344CB8AC3E}">
+        <p14:creationId xmlns:p14="http://schemas.microsoft.com/office/powerpoint/2010/main" val="662025034"/>
+      </p:ext>
+    </p:extLst>
+  </p:cSld>
+  <p:clrMapOvr>
+    <a:masterClrMapping/>
+  </p:clrMapOvr>
+</p:sld>
+</file>
+
+<file path=ppt/slides/slide7.xml><?xml version="1.0" encoding="utf-8"?>
+<p:sld xmlns:a="http://schemas.openxmlformats.org/drawingml/2006/main" xmlns:r="http://schemas.openxmlformats.org/officeDocument/2006/relationships" xmlns:p="http://schemas.openxmlformats.org/presentationml/2006/main">
+  <p:cSld>
+    <p:spTree>
+      <p:nvGrpSpPr>
+        <p:cNvPr id="1" name=""/>
+        <p:cNvGrpSpPr/>
+        <p:nvPr/>
+      </p:nvGrpSpPr>
+      <p:grpSpPr>
+        <a:xfrm>
+          <a:off x="0" y="0"/>
+          <a:ext cx="0" cy="0"/>
+          <a:chOff x="0" y="0"/>
+          <a:chExt cx="0" cy="0"/>
+        </a:xfrm>
+      </p:grpSpPr>
+      <p:sp>
+        <p:nvSpPr>
+          <p:cNvPr id="4" name="Rectangle 1">
+            <a:extLst>
+              <a:ext uri="{FF2B5EF4-FFF2-40B4-BE49-F238E27FC236}">
+                <a16:creationId xmlns:a16="http://schemas.microsoft.com/office/drawing/2014/main" id="{ECAEE7CF-F5E0-4FFE-BCF7-1394D430A1A8}"/>
+              </a:ext>
+            </a:extLst>
+          </p:cNvPr>
+          <p:cNvSpPr>
+            <a:spLocks noGrp="1" noChangeArrowheads="1"/>
+          </p:cNvSpPr>
+          <p:nvPr>
+            <p:ph idx="1"/>
+          </p:nvPr>
+        </p:nvSpPr>
+        <p:spPr bwMode="auto">
+          <a:xfrm>
+            <a:off x="1191326" y="991904"/>
+            <a:ext cx="7155805" cy="3877985"/>
+          </a:xfrm>
+          <a:prstGeom prst="rect">
+            <a:avLst/>
+          </a:prstGeom>
+          <a:solidFill>
+            <a:srgbClr val="FFFFFF"/>
+          </a:solidFill>
+          <a:ln>
+            <a:noFill/>
+          </a:ln>
+          <a:effectLst/>
+          <a:extLst>
+            <a:ext uri="{91240B29-F687-4F45-9708-019B960494DF}">
+              <a14:hiddenLine xmlns:a14="http://schemas.microsoft.com/office/drawing/2010/main" w="9525">
+                <a:solidFill>
+                  <a:schemeClr val="tx1"/>
+                </a:solidFill>
+                <a:miter lim="800000"/>
+                <a:headEnd/>
+                <a:tailEnd/>
+              </a14:hiddenLine>
+            </a:ext>
+            <a:ext uri="{AF507438-7753-43E0-B8FC-AC1667EBCBE1}">
+              <a14:hiddenEffects xmlns:a14="http://schemas.microsoft.com/office/drawing/2010/main">
+                <a:effectLst>
+                  <a:outerShdw dist="35921" dir="2700000" algn="ctr" rotWithShape="0">
+                    <a:schemeClr val="bg2"/>
+                  </a:outerShdw>
+                </a:effectLst>
+              </a14:hiddenEffects>
+            </a:ext>
+          </a:extLst>
+        </p:spPr>
+        <p:txBody>
+          <a:bodyPr vert="horz" wrap="none" lIns="0" tIns="0" rIns="0" bIns="0" numCol="1" anchor="ctr" anchorCtr="0" compatLnSpc="1">
+            <a:prstTxWarp prst="textNoShape">
+              <a:avLst/>
+            </a:prstTxWarp>
+            <a:spAutoFit/>
+          </a:bodyPr>
+          <a:lstStyle/>
+          <a:p>
+            <a:pPr eaLnBrk="0" fontAlgn="base" hangingPunct="0">
+              <a:lnSpc>
+                <a:spcPct val="100000"/>
+              </a:lnSpc>
+              <a:spcBef>
+                <a:spcPct val="0"/>
+              </a:spcBef>
+              <a:spcAft>
+                <a:spcPct val="0"/>
+              </a:spcAft>
+            </a:pPr>
+            <a:r>
+              <a:rPr kumimoji="0" lang="de-DE" altLang="de-DE" b="1" i="0" u="none" strike="noStrike" cap="none" normalizeH="0" baseline="0" dirty="0" err="1">
+                <a:ln>
+                  <a:noFill/>
+                </a:ln>
+                <a:solidFill>
+                  <a:srgbClr val="000000"/>
+                </a:solidFill>
+                <a:effectLst/>
+                <a:latin typeface="Lucida Console" panose="020B0609040504020204" pitchFamily="49" charset="0"/>
+              </a:rPr>
+              <a:t>Scholarship</a:t>
+            </a:r>
+            <a:r>
+              <a:rPr kumimoji="0" lang="de-DE" altLang="de-DE" b="0" i="0" u="none" strike="noStrike" cap="none" normalizeH="0" baseline="0" dirty="0">
+                <a:ln>
+                  <a:noFill/>
+                </a:ln>
+                <a:solidFill>
+                  <a:srgbClr val="000000"/>
+                </a:solidFill>
+                <a:effectLst/>
+                <a:latin typeface="Lucida Console" panose="020B0609040504020204" pitchFamily="49" charset="0"/>
+              </a:rPr>
+              <a:t> </a:t>
+            </a:r>
+            <a:r>
+              <a:rPr kumimoji="0" lang="de-DE" altLang="de-DE" b="0" i="1" u="none" strike="noStrike" cap="none" normalizeH="0" baseline="0" dirty="0">
+                <a:ln>
+                  <a:noFill/>
+                </a:ln>
+                <a:solidFill>
+                  <a:srgbClr val="949494"/>
+                </a:solidFill>
+                <a:effectLst/>
+                <a:latin typeface="Lucida Console" panose="020B0609040504020204" pitchFamily="49" charset="0"/>
+              </a:rPr>
+              <a:t>&lt;</a:t>
+            </a:r>
+            <a:r>
+              <a:rPr kumimoji="0" lang="de-DE" altLang="de-DE" b="0" i="1" u="none" strike="noStrike" cap="none" normalizeH="0" baseline="0" dirty="0" err="1">
+                <a:ln>
+                  <a:noFill/>
+                </a:ln>
+                <a:solidFill>
+                  <a:srgbClr val="949494"/>
+                </a:solidFill>
+                <a:effectLst/>
+                <a:latin typeface="Lucida Console" panose="020B0609040504020204" pitchFamily="49" charset="0"/>
+              </a:rPr>
+              <a:t>fct</a:t>
+            </a:r>
+            <a:r>
+              <a:rPr kumimoji="0" lang="de-DE" altLang="de-DE" b="0" i="1" u="none" strike="noStrike" cap="none" normalizeH="0" baseline="0" dirty="0">
+                <a:ln>
+                  <a:noFill/>
+                </a:ln>
+                <a:solidFill>
+                  <a:srgbClr val="949494"/>
+                </a:solidFill>
+                <a:effectLst/>
+                <a:latin typeface="Lucida Console" panose="020B0609040504020204" pitchFamily="49" charset="0"/>
+              </a:rPr>
+              <a:t>&gt;</a:t>
+            </a:r>
+            <a:r>
+              <a:rPr kumimoji="0" lang="de-DE" altLang="de-DE" b="0" i="0" u="none" strike="noStrike" cap="none" normalizeH="0" baseline="0" dirty="0">
+                <a:ln>
+                  <a:noFill/>
+                </a:ln>
+                <a:solidFill>
+                  <a:srgbClr val="000000"/>
+                </a:solidFill>
+                <a:effectLst/>
+                <a:latin typeface="Lucida Console" panose="020B0609040504020204" pitchFamily="49" charset="0"/>
+              </a:rPr>
+              <a:t> 0, 0, 0, 0, 0</a:t>
+            </a:r>
+          </a:p>
+          <a:p>
+            <a:pPr eaLnBrk="0" fontAlgn="base" hangingPunct="0">
+              <a:lnSpc>
+                <a:spcPct val="100000"/>
+              </a:lnSpc>
+              <a:spcBef>
+                <a:spcPct val="0"/>
+              </a:spcBef>
+              <a:spcAft>
+                <a:spcPct val="0"/>
+              </a:spcAft>
+            </a:pPr>
+            <a:endParaRPr kumimoji="0" lang="de-DE" altLang="de-DE" b="0" i="0" u="none" strike="noStrike" cap="none" normalizeH="0" baseline="0" dirty="0">
+              <a:ln>
+                <a:noFill/>
+              </a:ln>
+              <a:solidFill>
+                <a:srgbClr val="000000"/>
+              </a:solidFill>
+              <a:effectLst/>
+              <a:latin typeface="Lucida Console" panose="020B0609040504020204" pitchFamily="49" charset="0"/>
+            </a:endParaRPr>
+          </a:p>
+          <a:p>
+            <a:pPr eaLnBrk="0" fontAlgn="base" hangingPunct="0">
+              <a:lnSpc>
+                <a:spcPct val="100000"/>
+              </a:lnSpc>
+              <a:spcBef>
+                <a:spcPct val="0"/>
+              </a:spcBef>
+              <a:spcAft>
+                <a:spcPct val="0"/>
+              </a:spcAft>
+            </a:pPr>
+            <a:r>
+              <a:rPr kumimoji="0" lang="de-DE" altLang="de-DE" b="1" i="0" u="none" strike="noStrike" cap="none" normalizeH="0" baseline="0" dirty="0" err="1">
+                <a:ln>
+                  <a:noFill/>
+                </a:ln>
+                <a:solidFill>
+                  <a:srgbClr val="000000"/>
+                </a:solidFill>
+                <a:effectLst/>
+                <a:latin typeface="Lucida Console" panose="020B0609040504020204" pitchFamily="49" charset="0"/>
+              </a:rPr>
+              <a:t>Hipertension</a:t>
+            </a:r>
+            <a:r>
+              <a:rPr kumimoji="0" lang="de-DE" altLang="de-DE" b="0" i="0" u="none" strike="noStrike" cap="none" normalizeH="0" baseline="0" dirty="0">
+                <a:ln>
+                  <a:noFill/>
+                </a:ln>
+                <a:solidFill>
+                  <a:srgbClr val="000000"/>
+                </a:solidFill>
+                <a:effectLst/>
+                <a:latin typeface="Lucida Console" panose="020B0609040504020204" pitchFamily="49" charset="0"/>
+              </a:rPr>
+              <a:t> </a:t>
+            </a:r>
+            <a:r>
+              <a:rPr kumimoji="0" lang="de-DE" altLang="de-DE" b="0" i="1" u="none" strike="noStrike" cap="none" normalizeH="0" baseline="0" dirty="0">
+                <a:ln>
+                  <a:noFill/>
+                </a:ln>
+                <a:solidFill>
+                  <a:srgbClr val="949494"/>
+                </a:solidFill>
+                <a:effectLst/>
+                <a:latin typeface="Lucida Console" panose="020B0609040504020204" pitchFamily="49" charset="0"/>
+              </a:rPr>
+              <a:t>&lt;</a:t>
+            </a:r>
+            <a:r>
+              <a:rPr kumimoji="0" lang="de-DE" altLang="de-DE" b="0" i="1" u="none" strike="noStrike" cap="none" normalizeH="0" baseline="0" dirty="0" err="1">
+                <a:ln>
+                  <a:noFill/>
+                </a:ln>
+                <a:solidFill>
+                  <a:srgbClr val="949494"/>
+                </a:solidFill>
+                <a:effectLst/>
+                <a:latin typeface="Lucida Console" panose="020B0609040504020204" pitchFamily="49" charset="0"/>
+              </a:rPr>
+              <a:t>fct</a:t>
+            </a:r>
+            <a:r>
+              <a:rPr kumimoji="0" lang="de-DE" altLang="de-DE" b="0" i="1" u="none" strike="noStrike" cap="none" normalizeH="0" baseline="0" dirty="0">
+                <a:ln>
+                  <a:noFill/>
+                </a:ln>
+                <a:solidFill>
+                  <a:srgbClr val="949494"/>
+                </a:solidFill>
+                <a:effectLst/>
+                <a:latin typeface="Lucida Console" panose="020B0609040504020204" pitchFamily="49" charset="0"/>
+              </a:rPr>
+              <a:t>&gt;</a:t>
+            </a:r>
+            <a:r>
+              <a:rPr kumimoji="0" lang="de-DE" altLang="de-DE" b="0" i="0" u="none" strike="noStrike" cap="none" normalizeH="0" baseline="0" dirty="0">
+                <a:ln>
+                  <a:noFill/>
+                </a:ln>
+                <a:solidFill>
+                  <a:srgbClr val="000000"/>
+                </a:solidFill>
+                <a:effectLst/>
+                <a:latin typeface="Lucida Console" panose="020B0609040504020204" pitchFamily="49" charset="0"/>
+              </a:rPr>
+              <a:t> 1, 0, 0, 0, 1</a:t>
+            </a:r>
+          </a:p>
+          <a:p>
+            <a:pPr eaLnBrk="0" fontAlgn="base" hangingPunct="0">
+              <a:lnSpc>
+                <a:spcPct val="100000"/>
+              </a:lnSpc>
+              <a:spcBef>
+                <a:spcPct val="0"/>
+              </a:spcBef>
+              <a:spcAft>
+                <a:spcPct val="0"/>
+              </a:spcAft>
+            </a:pPr>
+            <a:endParaRPr kumimoji="0" lang="de-DE" altLang="de-DE" b="0" i="0" u="none" strike="noStrike" cap="none" normalizeH="0" baseline="0" dirty="0">
+              <a:ln>
+                <a:noFill/>
+              </a:ln>
+              <a:solidFill>
+                <a:srgbClr val="000000"/>
+              </a:solidFill>
+              <a:effectLst/>
+              <a:latin typeface="Lucida Console" panose="020B0609040504020204" pitchFamily="49" charset="0"/>
+            </a:endParaRPr>
+          </a:p>
+          <a:p>
+            <a:pPr eaLnBrk="0" fontAlgn="base" hangingPunct="0">
+              <a:lnSpc>
+                <a:spcPct val="100000"/>
+              </a:lnSpc>
+              <a:spcBef>
+                <a:spcPct val="0"/>
+              </a:spcBef>
+              <a:spcAft>
+                <a:spcPct val="0"/>
+              </a:spcAft>
+            </a:pPr>
+            <a:r>
+              <a:rPr kumimoji="0" lang="de-DE" altLang="de-DE" b="1" i="0" u="none" strike="noStrike" cap="none" normalizeH="0" baseline="0" dirty="0">
+                <a:ln>
+                  <a:noFill/>
+                </a:ln>
+                <a:solidFill>
+                  <a:srgbClr val="000000"/>
+                </a:solidFill>
+                <a:effectLst/>
+                <a:latin typeface="Lucida Console" panose="020B0609040504020204" pitchFamily="49" charset="0"/>
+              </a:rPr>
+              <a:t>Diabetes</a:t>
+            </a:r>
+            <a:r>
+              <a:rPr kumimoji="0" lang="de-DE" altLang="de-DE" b="0" i="0" u="none" strike="noStrike" cap="none" normalizeH="0" baseline="0" dirty="0">
+                <a:ln>
+                  <a:noFill/>
+                </a:ln>
+                <a:solidFill>
+                  <a:srgbClr val="000000"/>
+                </a:solidFill>
+                <a:effectLst/>
+                <a:latin typeface="Lucida Console" panose="020B0609040504020204" pitchFamily="49" charset="0"/>
+              </a:rPr>
+              <a:t> </a:t>
+            </a:r>
+            <a:r>
+              <a:rPr kumimoji="0" lang="de-DE" altLang="de-DE" b="0" i="1" u="none" strike="noStrike" cap="none" normalizeH="0" baseline="0" dirty="0">
+                <a:ln>
+                  <a:noFill/>
+                </a:ln>
+                <a:solidFill>
+                  <a:srgbClr val="949494"/>
+                </a:solidFill>
+                <a:effectLst/>
+                <a:latin typeface="Lucida Console" panose="020B0609040504020204" pitchFamily="49" charset="0"/>
+              </a:rPr>
+              <a:t>&lt;</a:t>
+            </a:r>
+            <a:r>
+              <a:rPr kumimoji="0" lang="de-DE" altLang="de-DE" b="0" i="1" u="none" strike="noStrike" cap="none" normalizeH="0" baseline="0" dirty="0" err="1">
+                <a:ln>
+                  <a:noFill/>
+                </a:ln>
+                <a:solidFill>
+                  <a:srgbClr val="949494"/>
+                </a:solidFill>
+                <a:effectLst/>
+                <a:latin typeface="Lucida Console" panose="020B0609040504020204" pitchFamily="49" charset="0"/>
+              </a:rPr>
+              <a:t>fct</a:t>
+            </a:r>
+            <a:r>
+              <a:rPr kumimoji="0" lang="de-DE" altLang="de-DE" b="0" i="1" u="none" strike="noStrike" cap="none" normalizeH="0" baseline="0" dirty="0">
+                <a:ln>
+                  <a:noFill/>
+                </a:ln>
+                <a:solidFill>
+                  <a:srgbClr val="949494"/>
+                </a:solidFill>
+                <a:effectLst/>
+                <a:latin typeface="Lucida Console" panose="020B0609040504020204" pitchFamily="49" charset="0"/>
+              </a:rPr>
+              <a:t>&gt;</a:t>
+            </a:r>
+            <a:r>
+              <a:rPr kumimoji="0" lang="de-DE" altLang="de-DE" b="0" i="0" u="none" strike="noStrike" cap="none" normalizeH="0" baseline="0" dirty="0">
+                <a:ln>
+                  <a:noFill/>
+                </a:ln>
+                <a:solidFill>
+                  <a:srgbClr val="000000"/>
+                </a:solidFill>
+                <a:effectLst/>
+                <a:latin typeface="Lucida Console" panose="020B0609040504020204" pitchFamily="49" charset="0"/>
+              </a:rPr>
+              <a:t> 0, 0, 0, 0, 1</a:t>
+            </a:r>
+          </a:p>
+          <a:p>
+            <a:pPr marL="0" indent="0" eaLnBrk="0" fontAlgn="base" hangingPunct="0">
+              <a:lnSpc>
+                <a:spcPct val="100000"/>
+              </a:lnSpc>
+              <a:spcBef>
+                <a:spcPct val="0"/>
+              </a:spcBef>
+              <a:spcAft>
+                <a:spcPct val="0"/>
+              </a:spcAft>
+              <a:buNone/>
+            </a:pPr>
+            <a:endParaRPr kumimoji="0" lang="de-DE" altLang="de-DE" b="0" i="0" u="none" strike="noStrike" cap="none" normalizeH="0" baseline="0" dirty="0">
+              <a:ln>
+                <a:noFill/>
+              </a:ln>
+              <a:solidFill>
+                <a:srgbClr val="000000"/>
+              </a:solidFill>
+              <a:effectLst/>
+              <a:latin typeface="Lucida Console" panose="020B0609040504020204" pitchFamily="49" charset="0"/>
+            </a:endParaRPr>
+          </a:p>
+          <a:p>
+            <a:pPr eaLnBrk="0" fontAlgn="base" hangingPunct="0">
+              <a:lnSpc>
+                <a:spcPct val="100000"/>
+              </a:lnSpc>
+              <a:spcBef>
+                <a:spcPct val="0"/>
+              </a:spcBef>
+              <a:spcAft>
+                <a:spcPct val="0"/>
+              </a:spcAft>
+            </a:pPr>
+            <a:r>
+              <a:rPr kumimoji="0" lang="de-DE" altLang="de-DE" b="1" i="0" u="none" strike="noStrike" cap="none" normalizeH="0" baseline="0" dirty="0" err="1">
+                <a:ln>
+                  <a:noFill/>
+                </a:ln>
+                <a:solidFill>
+                  <a:srgbClr val="000000"/>
+                </a:solidFill>
+                <a:effectLst/>
+                <a:latin typeface="Lucida Console" panose="020B0609040504020204" pitchFamily="49" charset="0"/>
+              </a:rPr>
+              <a:t>Alcoholism</a:t>
+            </a:r>
+            <a:r>
+              <a:rPr kumimoji="0" lang="de-DE" altLang="de-DE" b="0" i="0" u="none" strike="noStrike" cap="none" normalizeH="0" baseline="0" dirty="0">
+                <a:ln>
+                  <a:noFill/>
+                </a:ln>
+                <a:solidFill>
+                  <a:srgbClr val="000000"/>
+                </a:solidFill>
+                <a:effectLst/>
+                <a:latin typeface="Lucida Console" panose="020B0609040504020204" pitchFamily="49" charset="0"/>
+              </a:rPr>
+              <a:t> </a:t>
+            </a:r>
+            <a:r>
+              <a:rPr kumimoji="0" lang="de-DE" altLang="de-DE" b="0" i="1" u="none" strike="noStrike" cap="none" normalizeH="0" baseline="0" dirty="0">
+                <a:ln>
+                  <a:noFill/>
+                </a:ln>
+                <a:solidFill>
+                  <a:srgbClr val="949494"/>
+                </a:solidFill>
+                <a:effectLst/>
+                <a:latin typeface="Lucida Console" panose="020B0609040504020204" pitchFamily="49" charset="0"/>
+              </a:rPr>
+              <a:t>&lt;</a:t>
+            </a:r>
+            <a:r>
+              <a:rPr kumimoji="0" lang="de-DE" altLang="de-DE" b="0" i="1" u="none" strike="noStrike" cap="none" normalizeH="0" baseline="0" dirty="0" err="1">
+                <a:ln>
+                  <a:noFill/>
+                </a:ln>
+                <a:solidFill>
+                  <a:srgbClr val="949494"/>
+                </a:solidFill>
+                <a:effectLst/>
+                <a:latin typeface="Lucida Console" panose="020B0609040504020204" pitchFamily="49" charset="0"/>
+              </a:rPr>
+              <a:t>fct</a:t>
+            </a:r>
+            <a:r>
+              <a:rPr kumimoji="0" lang="de-DE" altLang="de-DE" b="0" i="1" u="none" strike="noStrike" cap="none" normalizeH="0" baseline="0" dirty="0">
+                <a:ln>
+                  <a:noFill/>
+                </a:ln>
+                <a:solidFill>
+                  <a:srgbClr val="949494"/>
+                </a:solidFill>
+                <a:effectLst/>
+                <a:latin typeface="Lucida Console" panose="020B0609040504020204" pitchFamily="49" charset="0"/>
+              </a:rPr>
+              <a:t>&gt;</a:t>
+            </a:r>
+            <a:r>
+              <a:rPr kumimoji="0" lang="de-DE" altLang="de-DE" b="0" i="0" u="none" strike="noStrike" cap="none" normalizeH="0" baseline="0" dirty="0">
+                <a:ln>
+                  <a:noFill/>
+                </a:ln>
+                <a:solidFill>
+                  <a:srgbClr val="000000"/>
+                </a:solidFill>
+                <a:effectLst/>
+                <a:latin typeface="Lucida Console" panose="020B0609040504020204" pitchFamily="49" charset="0"/>
+              </a:rPr>
+              <a:t> 0, 0, 0, 0, 0</a:t>
+            </a:r>
+          </a:p>
+          <a:p>
+            <a:pPr eaLnBrk="0" fontAlgn="base" hangingPunct="0">
+              <a:lnSpc>
+                <a:spcPct val="100000"/>
+              </a:lnSpc>
+              <a:spcBef>
+                <a:spcPct val="0"/>
+              </a:spcBef>
+              <a:spcAft>
+                <a:spcPct val="0"/>
+              </a:spcAft>
+            </a:pPr>
+            <a:endParaRPr kumimoji="0" lang="de-DE" altLang="de-DE" b="0" i="0" u="none" strike="noStrike" cap="none" normalizeH="0" baseline="0" dirty="0">
+              <a:ln>
+                <a:noFill/>
+              </a:ln>
+              <a:solidFill>
+                <a:srgbClr val="000000"/>
+              </a:solidFill>
+              <a:effectLst/>
+              <a:latin typeface="Lucida Console" panose="020B0609040504020204" pitchFamily="49" charset="0"/>
+            </a:endParaRPr>
+          </a:p>
+          <a:p>
+            <a:pPr eaLnBrk="0" fontAlgn="base" hangingPunct="0">
+              <a:lnSpc>
+                <a:spcPct val="100000"/>
+              </a:lnSpc>
+              <a:spcBef>
+                <a:spcPct val="0"/>
+              </a:spcBef>
+              <a:spcAft>
+                <a:spcPct val="0"/>
+              </a:spcAft>
+            </a:pPr>
+            <a:r>
+              <a:rPr kumimoji="0" lang="de-DE" altLang="de-DE" b="1" i="0" u="none" strike="noStrike" cap="none" normalizeH="0" baseline="0" dirty="0" err="1">
+                <a:ln>
+                  <a:noFill/>
+                </a:ln>
+                <a:solidFill>
+                  <a:srgbClr val="000000"/>
+                </a:solidFill>
+                <a:effectLst/>
+                <a:latin typeface="Lucida Console" panose="020B0609040504020204" pitchFamily="49" charset="0"/>
+              </a:rPr>
+              <a:t>Handcap</a:t>
+            </a:r>
+            <a:r>
+              <a:rPr kumimoji="0" lang="de-DE" altLang="de-DE" b="0" i="0" u="none" strike="noStrike" cap="none" normalizeH="0" baseline="0" dirty="0">
+                <a:ln>
+                  <a:noFill/>
+                </a:ln>
+                <a:solidFill>
+                  <a:srgbClr val="000000"/>
+                </a:solidFill>
+                <a:effectLst/>
+                <a:latin typeface="Lucida Console" panose="020B0609040504020204" pitchFamily="49" charset="0"/>
+              </a:rPr>
+              <a:t> </a:t>
+            </a:r>
+            <a:r>
+              <a:rPr kumimoji="0" lang="de-DE" altLang="de-DE" b="0" i="1" u="none" strike="noStrike" cap="none" normalizeH="0" baseline="0" dirty="0">
+                <a:ln>
+                  <a:noFill/>
+                </a:ln>
+                <a:solidFill>
+                  <a:srgbClr val="949494"/>
+                </a:solidFill>
+                <a:effectLst/>
+                <a:latin typeface="Lucida Console" panose="020B0609040504020204" pitchFamily="49" charset="0"/>
+              </a:rPr>
+              <a:t>&lt;</a:t>
+            </a:r>
+            <a:r>
+              <a:rPr kumimoji="0" lang="de-DE" altLang="de-DE" b="0" i="1" u="none" strike="noStrike" cap="none" normalizeH="0" baseline="0" dirty="0" err="1">
+                <a:ln>
+                  <a:noFill/>
+                </a:ln>
+                <a:solidFill>
+                  <a:srgbClr val="949494"/>
+                </a:solidFill>
+                <a:effectLst/>
+                <a:latin typeface="Lucida Console" panose="020B0609040504020204" pitchFamily="49" charset="0"/>
+              </a:rPr>
+              <a:t>fct</a:t>
+            </a:r>
+            <a:r>
+              <a:rPr kumimoji="0" lang="de-DE" altLang="de-DE" b="0" i="1" u="none" strike="noStrike" cap="none" normalizeH="0" baseline="0" dirty="0">
+                <a:ln>
+                  <a:noFill/>
+                </a:ln>
+                <a:solidFill>
+                  <a:srgbClr val="949494"/>
+                </a:solidFill>
+                <a:effectLst/>
+                <a:latin typeface="Lucida Console" panose="020B0609040504020204" pitchFamily="49" charset="0"/>
+              </a:rPr>
+              <a:t>&gt;</a:t>
+            </a:r>
+            <a:r>
+              <a:rPr kumimoji="0" lang="de-DE" altLang="de-DE" b="0" i="0" u="none" strike="noStrike" cap="none" normalizeH="0" baseline="0" dirty="0">
+                <a:ln>
+                  <a:noFill/>
+                </a:ln>
+                <a:solidFill>
+                  <a:srgbClr val="000000"/>
+                </a:solidFill>
+                <a:effectLst/>
+                <a:latin typeface="Lucida Console" panose="020B0609040504020204" pitchFamily="49" charset="0"/>
+              </a:rPr>
+              <a:t> 0, 0, 0, 0, 0</a:t>
+            </a:r>
+          </a:p>
+        </p:txBody>
+      </p:sp>
+      <p:pic>
+        <p:nvPicPr>
+          <p:cNvPr id="7" name="Grafik 6">
+            <a:extLst>
+              <a:ext uri="{FF2B5EF4-FFF2-40B4-BE49-F238E27FC236}">
+                <a16:creationId xmlns:a16="http://schemas.microsoft.com/office/drawing/2014/main" id="{9F19E096-4520-4342-A5FF-38EFDED93E48}"/>
+              </a:ext>
+            </a:extLst>
+          </p:cNvPr>
+          <p:cNvPicPr>
+            <a:picLocks noChangeAspect="1"/>
+          </p:cNvPicPr>
+          <p:nvPr/>
+        </p:nvPicPr>
+        <p:blipFill>
+          <a:blip r:embed="rId3"/>
+          <a:stretch>
+            <a:fillRect/>
+          </a:stretch>
+        </p:blipFill>
+        <p:spPr>
+          <a:xfrm>
+            <a:off x="476241" y="941533"/>
+            <a:ext cx="10877559" cy="1827787"/>
+          </a:xfrm>
+          <a:prstGeom prst="rect">
+            <a:avLst/>
+          </a:prstGeom>
+        </p:spPr>
+      </p:pic>
+      <p:pic>
+        <p:nvPicPr>
+          <p:cNvPr id="8" name="Grafik 7">
+            <a:extLst>
+              <a:ext uri="{FF2B5EF4-FFF2-40B4-BE49-F238E27FC236}">
+                <a16:creationId xmlns:a16="http://schemas.microsoft.com/office/drawing/2014/main" id="{A062EDD5-1280-469F-8D74-FCB2F1391772}"/>
+              </a:ext>
+            </a:extLst>
+          </p:cNvPr>
+          <p:cNvPicPr>
+            <a:picLocks noChangeAspect="1"/>
+          </p:cNvPicPr>
+          <p:nvPr/>
+        </p:nvPicPr>
+        <p:blipFill>
+          <a:blip r:embed="rId4"/>
+          <a:stretch>
+            <a:fillRect/>
+          </a:stretch>
+        </p:blipFill>
+        <p:spPr>
+          <a:xfrm>
+            <a:off x="476241" y="3680562"/>
+            <a:ext cx="11576547" cy="2728760"/>
+          </a:xfrm>
+          <a:prstGeom prst="rect">
+            <a:avLst/>
+          </a:prstGeom>
+        </p:spPr>
+      </p:pic>
+    </p:spTree>
+    <p:extLst>
+      <p:ext uri="{BB962C8B-B14F-4D97-AF65-F5344CB8AC3E}">
+        <p14:creationId xmlns:p14="http://schemas.microsoft.com/office/powerpoint/2010/main" val="941550182"/>
+      </p:ext>
+    </p:extLst>
+  </p:cSld>
+  <p:clrMapOvr>
+    <a:masterClrMapping/>
+  </p:clrMapOvr>
+  <p:timing>
+    <p:tnLst>
+      <p:par>
+        <p:cTn id="1" dur="indefinite" restart="never" nodeType="tmRoot">
+          <p:childTnLst>
+            <p:seq concurrent="1" nextAc="seek">
+              <p:cTn id="2" dur="indefinite" nodeType="mainSeq">
+                <p:childTnLst>
+                  <p:par>
+                    <p:cTn id="3" fill="hold">
+                      <p:stCondLst>
+                        <p:cond delay="indefinite"/>
+                      </p:stCondLst>
+                      <p:childTnLst>
+                        <p:par>
+                          <p:cTn id="4" fill="hold">
+                            <p:stCondLst>
+                              <p:cond delay="0"/>
+                            </p:stCondLst>
+                            <p:childTnLst>
+                              <p:par>
+                                <p:cTn id="5" presetID="10" presetClass="exit" presetSubtype="0" fill="hold" nodeType="clickEffect">
+                                  <p:stCondLst>
+                                    <p:cond delay="0"/>
+                                  </p:stCondLst>
+                                  <p:childTnLst>
+                                    <p:animEffect transition="out" filter="fade">
+                                      <p:cBhvr>
+                                        <p:cTn id="6" dur="500"/>
+                                        <p:tgtEl>
+                                          <p:spTgt spid="4">
+                                            <p:txEl>
+                                              <p:pRg st="0" end="0"/>
+                                            </p:txEl>
+                                          </p:spTgt>
+                                        </p:tgtEl>
+                                      </p:cBhvr>
+                                    </p:animEffect>
+                                    <p:set>
+                                      <p:cBhvr>
+                                        <p:cTn id="7" dur="1" fill="hold">
+                                          <p:stCondLst>
+                                            <p:cond delay="499"/>
+                                          </p:stCondLst>
+                                        </p:cTn>
+                                        <p:tgtEl>
+                                          <p:spTgt spid="4">
+                                            <p:txEl>
+                                              <p:pRg st="0" end="0"/>
+                                            </p:txEl>
+                                          </p:spTgt>
+                                        </p:tgtEl>
+                                        <p:attrNameLst>
+                                          <p:attrName>style.visibility</p:attrName>
+                                        </p:attrNameLst>
+                                      </p:cBhvr>
+                                      <p:to>
+                                        <p:strVal val="hidden"/>
+                                      </p:to>
+                                    </p:set>
+                                  </p:childTnLst>
+                                </p:cTn>
+                              </p:par>
+                              <p:par>
+                                <p:cTn id="8" presetID="10" presetClass="exit" presetSubtype="0" fill="hold" nodeType="withEffect">
+                                  <p:stCondLst>
+                                    <p:cond delay="0"/>
+                                  </p:stCondLst>
+                                  <p:childTnLst>
+                                    <p:animEffect transition="out" filter="fade">
+                                      <p:cBhvr>
+                                        <p:cTn id="9" dur="500"/>
+                                        <p:tgtEl>
+                                          <p:spTgt spid="4">
+                                            <p:txEl>
+                                              <p:pRg st="2" end="2"/>
+                                            </p:txEl>
+                                          </p:spTgt>
+                                        </p:tgtEl>
+                                      </p:cBhvr>
+                                    </p:animEffect>
+                                    <p:set>
+                                      <p:cBhvr>
+                                        <p:cTn id="10" dur="1" fill="hold">
+                                          <p:stCondLst>
+                                            <p:cond delay="499"/>
+                                          </p:stCondLst>
+                                        </p:cTn>
+                                        <p:tgtEl>
+                                          <p:spTgt spid="4">
+                                            <p:txEl>
+                                              <p:pRg st="2" end="2"/>
+                                            </p:txEl>
+                                          </p:spTgt>
+                                        </p:tgtEl>
+                                        <p:attrNameLst>
+                                          <p:attrName>style.visibility</p:attrName>
+                                        </p:attrNameLst>
+                                      </p:cBhvr>
+                                      <p:to>
+                                        <p:strVal val="hidden"/>
+                                      </p:to>
+                                    </p:set>
+                                  </p:childTnLst>
+                                </p:cTn>
+                              </p:par>
+                              <p:par>
+                                <p:cTn id="11" presetID="10" presetClass="exit" presetSubtype="0" fill="hold" nodeType="withEffect">
+                                  <p:stCondLst>
+                                    <p:cond delay="0"/>
+                                  </p:stCondLst>
+                                  <p:childTnLst>
+                                    <p:animEffect transition="out" filter="fade">
+                                      <p:cBhvr>
+                                        <p:cTn id="12" dur="500"/>
+                                        <p:tgtEl>
+                                          <p:spTgt spid="4">
+                                            <p:txEl>
+                                              <p:pRg st="4" end="4"/>
+                                            </p:txEl>
+                                          </p:spTgt>
+                                        </p:tgtEl>
+                                      </p:cBhvr>
+                                    </p:animEffect>
+                                    <p:set>
+                                      <p:cBhvr>
+                                        <p:cTn id="13" dur="1" fill="hold">
+                                          <p:stCondLst>
+                                            <p:cond delay="499"/>
+                                          </p:stCondLst>
+                                        </p:cTn>
+                                        <p:tgtEl>
+                                          <p:spTgt spid="4">
+                                            <p:txEl>
+                                              <p:pRg st="4" end="4"/>
+                                            </p:txEl>
+                                          </p:spTgt>
+                                        </p:tgtEl>
+                                        <p:attrNameLst>
+                                          <p:attrName>style.visibility</p:attrName>
+                                        </p:attrNameLst>
+                                      </p:cBhvr>
+                                      <p:to>
+                                        <p:strVal val="hidden"/>
+                                      </p:to>
+                                    </p:set>
+                                  </p:childTnLst>
+                                </p:cTn>
+                              </p:par>
+                              <p:par>
+                                <p:cTn id="14" presetID="10" presetClass="exit" presetSubtype="0" fill="hold" nodeType="withEffect">
+                                  <p:stCondLst>
+                                    <p:cond delay="0"/>
+                                  </p:stCondLst>
+                                  <p:childTnLst>
+                                    <p:animEffect transition="out" filter="fade">
+                                      <p:cBhvr>
+                                        <p:cTn id="15" dur="500"/>
+                                        <p:tgtEl>
+                                          <p:spTgt spid="4">
+                                            <p:txEl>
+                                              <p:pRg st="6" end="6"/>
+                                            </p:txEl>
+                                          </p:spTgt>
+                                        </p:tgtEl>
+                                      </p:cBhvr>
+                                    </p:animEffect>
+                                    <p:set>
+                                      <p:cBhvr>
+                                        <p:cTn id="16" dur="1" fill="hold">
+                                          <p:stCondLst>
+                                            <p:cond delay="499"/>
+                                          </p:stCondLst>
+                                        </p:cTn>
+                                        <p:tgtEl>
+                                          <p:spTgt spid="4">
+                                            <p:txEl>
+                                              <p:pRg st="6" end="6"/>
+                                            </p:txEl>
+                                          </p:spTgt>
+                                        </p:tgtEl>
+                                        <p:attrNameLst>
+                                          <p:attrName>style.visibility</p:attrName>
+                                        </p:attrNameLst>
+                                      </p:cBhvr>
+                                      <p:to>
+                                        <p:strVal val="hidden"/>
+                                      </p:to>
+                                    </p:set>
+                                  </p:childTnLst>
+                                </p:cTn>
+                              </p:par>
+                              <p:par>
+                                <p:cTn id="17" presetID="10" presetClass="exit" presetSubtype="0" fill="hold" nodeType="withEffect">
+                                  <p:stCondLst>
+                                    <p:cond delay="0"/>
+                                  </p:stCondLst>
+                                  <p:childTnLst>
+                                    <p:animEffect transition="out" filter="fade">
+                                      <p:cBhvr>
+                                        <p:cTn id="18" dur="500"/>
+                                        <p:tgtEl>
+                                          <p:spTgt spid="4">
+                                            <p:txEl>
+                                              <p:pRg st="8" end="8"/>
+                                            </p:txEl>
+                                          </p:spTgt>
+                                        </p:tgtEl>
+                                      </p:cBhvr>
+                                    </p:animEffect>
+                                    <p:set>
+                                      <p:cBhvr>
+                                        <p:cTn id="19" dur="1" fill="hold">
+                                          <p:stCondLst>
+                                            <p:cond delay="499"/>
+                                          </p:stCondLst>
+                                        </p:cTn>
+                                        <p:tgtEl>
+                                          <p:spTgt spid="4">
+                                            <p:txEl>
+                                              <p:pRg st="8" end="8"/>
+                                            </p:txEl>
+                                          </p:spTgt>
+                                        </p:tgtEl>
+                                        <p:attrNameLst>
+                                          <p:attrName>style.visibility</p:attrName>
+                                        </p:attrNameLst>
+                                      </p:cBhvr>
+                                      <p:to>
+                                        <p:strVal val="hidden"/>
+                                      </p:to>
+                                    </p:set>
+                                  </p:childTnLst>
+                                </p:cTn>
+                              </p:par>
+                              <p:par>
+                                <p:cTn id="20" presetID="10" presetClass="entr" presetSubtype="0" fill="hold" nodeType="withEffect">
+                                  <p:stCondLst>
+                                    <p:cond delay="0"/>
+                                  </p:stCondLst>
+                                  <p:childTnLst>
+                                    <p:set>
+                                      <p:cBhvr>
+                                        <p:cTn id="21" dur="1" fill="hold">
+                                          <p:stCondLst>
+                                            <p:cond delay="0"/>
+                                          </p:stCondLst>
+                                        </p:cTn>
+                                        <p:tgtEl>
+                                          <p:spTgt spid="7"/>
+                                        </p:tgtEl>
+                                        <p:attrNameLst>
+                                          <p:attrName>style.visibility</p:attrName>
+                                        </p:attrNameLst>
+                                      </p:cBhvr>
+                                      <p:to>
+                                        <p:strVal val="visible"/>
+                                      </p:to>
+                                    </p:set>
+                                    <p:animEffect transition="in" filter="fade">
+                                      <p:cBhvr>
+                                        <p:cTn id="22" dur="500"/>
+                                        <p:tgtEl>
+                                          <p:spTgt spid="7"/>
+                                        </p:tgtEl>
+                                      </p:cBhvr>
+                                    </p:animEffect>
+                                  </p:childTnLst>
+                                </p:cTn>
+                              </p:par>
+                            </p:childTnLst>
+                          </p:cTn>
+                        </p:par>
+                      </p:childTnLst>
+                    </p:cTn>
+                  </p:par>
+                  <p:par>
+                    <p:cTn id="23" fill="hold">
+                      <p:stCondLst>
+                        <p:cond delay="indefinite"/>
+                      </p:stCondLst>
+                      <p:childTnLst>
+                        <p:par>
+                          <p:cTn id="24" fill="hold">
+                            <p:stCondLst>
+                              <p:cond delay="0"/>
+                            </p:stCondLst>
+                            <p:childTnLst>
+                              <p:par>
+                                <p:cTn id="25" presetID="10" presetClass="entr" presetSubtype="0" fill="hold" nodeType="clickEffect">
+                                  <p:stCondLst>
+                                    <p:cond delay="0"/>
+                                  </p:stCondLst>
+                                  <p:childTnLst>
+                                    <p:set>
+                                      <p:cBhvr>
+                                        <p:cTn id="26" dur="1" fill="hold">
+                                          <p:stCondLst>
+                                            <p:cond delay="0"/>
+                                          </p:stCondLst>
+                                        </p:cTn>
+                                        <p:tgtEl>
+                                          <p:spTgt spid="8"/>
+                                        </p:tgtEl>
+                                        <p:attrNameLst>
+                                          <p:attrName>style.visibility</p:attrName>
+                                        </p:attrNameLst>
+                                      </p:cBhvr>
+                                      <p:to>
+                                        <p:strVal val="visible"/>
+                                      </p:to>
+                                    </p:set>
+                                    <p:animEffect transition="in" filter="fade">
+                                      <p:cBhvr>
+                                        <p:cTn id="27" dur="500"/>
+                                        <p:tgtEl>
+                                          <p:spTgt spid="8"/>
+                                        </p:tgtEl>
+                                      </p:cBhvr>
+                                    </p:animEffect>
+                                  </p:childTnLst>
+                                </p:cTn>
+                              </p:par>
+                            </p:childTnLst>
+                          </p:cTn>
+                        </p:par>
+                      </p:childTnLst>
+                    </p:cTn>
+                  </p:par>
+                </p:childTnLst>
+              </p:cTn>
+              <p:prevCondLst>
+                <p:cond evt="onPrev" delay="0">
+                  <p:tgtEl>
+                    <p:sldTgt/>
+                  </p:tgtEl>
+                </p:cond>
+              </p:prevCondLst>
+              <p:nextCondLst>
+                <p:cond evt="onNext" delay="0">
+                  <p:tgtEl>
+                    <p:sldTgt/>
+                  </p:tgtEl>
+                </p:cond>
+              </p:nextCondLst>
+            </p:seq>
+          </p:childTnLst>
+        </p:cTn>
+      </p:par>
+    </p:tnLst>
+  </p:timing>
+</p:sld>
+</file>
+
+<file path=ppt/slides/slide8.xml><?xml version="1.0" encoding="utf-8"?>
+<p:sld xmlns:a="http://schemas.openxmlformats.org/drawingml/2006/main" xmlns:r="http://schemas.openxmlformats.org/officeDocument/2006/relationships" xmlns:p="http://schemas.openxmlformats.org/presentationml/2006/main">
+  <p:cSld>
+    <p:spTree>
+      <p:nvGrpSpPr>
+        <p:cNvPr id="1" name=""/>
+        <p:cNvGrpSpPr/>
+        <p:nvPr/>
+      </p:nvGrpSpPr>
+      <p:grpSpPr>
+        <a:xfrm>
+          <a:off x="0" y="0"/>
+          <a:ext cx="0" cy="0"/>
+          <a:chOff x="0" y="0"/>
+          <a:chExt cx="0" cy="0"/>
+        </a:xfrm>
+      </p:grpSpPr>
+      <p:sp>
+        <p:nvSpPr>
+          <p:cNvPr id="3" name="Inhaltsplatzhalter 2">
+            <a:extLst>
+              <a:ext uri="{FF2B5EF4-FFF2-40B4-BE49-F238E27FC236}">
+                <a16:creationId xmlns:a16="http://schemas.microsoft.com/office/drawing/2014/main" id="{7870684D-0968-4546-99AA-8EA2E78DD90E}"/>
+              </a:ext>
+            </a:extLst>
+          </p:cNvPr>
+          <p:cNvSpPr>
+            <a:spLocks noGrp="1"/>
+          </p:cNvSpPr>
+          <p:nvPr>
+            <p:ph idx="1"/>
+          </p:nvPr>
+        </p:nvSpPr>
+        <p:spPr>
+          <a:xfrm>
+            <a:off x="838200" y="1260143"/>
+            <a:ext cx="10515600" cy="4351338"/>
+          </a:xfrm>
+        </p:spPr>
+        <p:txBody>
+          <a:bodyPr/>
+          <a:lstStyle/>
+          <a:p>
+            <a:r>
+              <a:rPr lang="de-DE" altLang="de-DE" dirty="0" err="1">
+                <a:solidFill>
+                  <a:srgbClr val="000000"/>
+                </a:solidFill>
+                <a:latin typeface="Lucida Console" panose="020B0609040504020204" pitchFamily="49" charset="0"/>
+              </a:rPr>
+              <a:t>SMS_received</a:t>
+            </a:r>
+            <a:r>
+              <a:rPr lang="de-DE" altLang="de-DE" dirty="0">
+                <a:solidFill>
+                  <a:srgbClr val="000000"/>
+                </a:solidFill>
+                <a:latin typeface="Lucida Console" panose="020B0609040504020204" pitchFamily="49" charset="0"/>
+              </a:rPr>
+              <a:t> </a:t>
+            </a:r>
+            <a:r>
+              <a:rPr lang="de-DE" altLang="de-DE" i="1" dirty="0">
+                <a:solidFill>
+                  <a:srgbClr val="949494"/>
+                </a:solidFill>
+                <a:latin typeface="Lucida Console" panose="020B0609040504020204" pitchFamily="49" charset="0"/>
+              </a:rPr>
+              <a:t>&lt;</a:t>
+            </a:r>
+            <a:r>
+              <a:rPr lang="de-DE" altLang="de-DE" i="1" dirty="0" err="1">
+                <a:solidFill>
+                  <a:srgbClr val="949494"/>
+                </a:solidFill>
+                <a:latin typeface="Lucida Console" panose="020B0609040504020204" pitchFamily="49" charset="0"/>
+              </a:rPr>
+              <a:t>int</a:t>
+            </a:r>
+            <a:r>
+              <a:rPr lang="de-DE" altLang="de-DE" i="1" dirty="0">
+                <a:solidFill>
+                  <a:srgbClr val="949494"/>
+                </a:solidFill>
+                <a:latin typeface="Lucida Console" panose="020B0609040504020204" pitchFamily="49" charset="0"/>
+              </a:rPr>
+              <a:t>&gt;</a:t>
+            </a:r>
+            <a:r>
+              <a:rPr lang="de-DE" altLang="de-DE" dirty="0">
+                <a:solidFill>
+                  <a:srgbClr val="000000"/>
+                </a:solidFill>
+                <a:latin typeface="Lucida Console" panose="020B0609040504020204" pitchFamily="49" charset="0"/>
+              </a:rPr>
+              <a:t> 0, 0, 0, 0, 0</a:t>
+            </a:r>
+          </a:p>
+          <a:p>
+            <a:pPr lvl="1"/>
+            <a:r>
+              <a:rPr lang="de-DE" altLang="de-DE" dirty="0" err="1">
+                <a:solidFill>
+                  <a:srgbClr val="000000"/>
+                </a:solidFill>
+                <a:latin typeface="Lucida Console" panose="020B0609040504020204" pitchFamily="49" charset="0"/>
+              </a:rPr>
+              <a:t>range</a:t>
+            </a:r>
+            <a:r>
+              <a:rPr lang="de-DE" altLang="de-DE" dirty="0">
+                <a:solidFill>
+                  <a:srgbClr val="000000"/>
+                </a:solidFill>
+                <a:latin typeface="Lucida Console" panose="020B0609040504020204" pitchFamily="49" charset="0"/>
+              </a:rPr>
+              <a:t>(</a:t>
+            </a:r>
+            <a:r>
+              <a:rPr lang="de-DE" altLang="de-DE" dirty="0" err="1">
+                <a:solidFill>
+                  <a:srgbClr val="000000"/>
+                </a:solidFill>
+                <a:latin typeface="Lucida Console" panose="020B0609040504020204" pitchFamily="49" charset="0"/>
+              </a:rPr>
+              <a:t>data$SMS_received</a:t>
+            </a:r>
+            <a:r>
+              <a:rPr lang="de-DE" altLang="de-DE" dirty="0">
+                <a:solidFill>
+                  <a:srgbClr val="000000"/>
+                </a:solidFill>
+                <a:latin typeface="Lucida Console" panose="020B0609040504020204" pitchFamily="49" charset="0"/>
+              </a:rPr>
+              <a:t>)</a:t>
+            </a:r>
+            <a:br>
+              <a:rPr lang="de-DE" altLang="de-DE" dirty="0">
+                <a:solidFill>
+                  <a:srgbClr val="000000"/>
+                </a:solidFill>
+                <a:latin typeface="Lucida Console" panose="020B0609040504020204" pitchFamily="49" charset="0"/>
+              </a:rPr>
+            </a:br>
+            <a:r>
+              <a:rPr lang="de-DE" altLang="de-DE" dirty="0">
+                <a:solidFill>
+                  <a:srgbClr val="000000"/>
+                </a:solidFill>
+                <a:latin typeface="Lucida Console" panose="020B0609040504020204" pitchFamily="49" charset="0"/>
+              </a:rPr>
+              <a:t>[1] 0 1</a:t>
+            </a:r>
+            <a:endParaRPr lang="de-DE" altLang="de-DE" dirty="0">
+              <a:latin typeface="Arial" panose="020B0604020202020204" pitchFamily="34" charset="0"/>
+            </a:endParaRPr>
+          </a:p>
+          <a:p>
+            <a:endParaRPr lang="de-DE" altLang="de-DE" dirty="0">
+              <a:solidFill>
+                <a:srgbClr val="000000"/>
+              </a:solidFill>
+              <a:latin typeface="Lucida Console" panose="020B0609040504020204" pitchFamily="49" charset="0"/>
+            </a:endParaRPr>
+          </a:p>
+          <a:p>
+            <a:r>
+              <a:rPr lang="de-DE" altLang="de-DE" dirty="0" err="1">
+                <a:solidFill>
+                  <a:srgbClr val="000000"/>
+                </a:solidFill>
+                <a:latin typeface="Lucida Console" panose="020B0609040504020204" pitchFamily="49" charset="0"/>
+              </a:rPr>
+              <a:t>No.show</a:t>
+            </a:r>
+            <a:r>
+              <a:rPr lang="de-DE" altLang="de-DE" dirty="0">
+                <a:solidFill>
+                  <a:srgbClr val="000000"/>
+                </a:solidFill>
+                <a:latin typeface="Lucida Console" panose="020B0609040504020204" pitchFamily="49" charset="0"/>
+              </a:rPr>
+              <a:t> </a:t>
+            </a:r>
+            <a:r>
+              <a:rPr lang="de-DE" altLang="de-DE" i="1" dirty="0">
+                <a:solidFill>
+                  <a:srgbClr val="949494"/>
+                </a:solidFill>
+                <a:latin typeface="Lucida Console" panose="020B0609040504020204" pitchFamily="49" charset="0"/>
+              </a:rPr>
+              <a:t>&lt;</a:t>
+            </a:r>
+            <a:r>
+              <a:rPr lang="de-DE" altLang="de-DE" i="1" dirty="0" err="1">
+                <a:solidFill>
+                  <a:srgbClr val="949494"/>
+                </a:solidFill>
+                <a:latin typeface="Lucida Console" panose="020B0609040504020204" pitchFamily="49" charset="0"/>
+              </a:rPr>
+              <a:t>fct</a:t>
+            </a:r>
+            <a:r>
+              <a:rPr lang="de-DE" altLang="de-DE" i="1" dirty="0">
+                <a:solidFill>
+                  <a:srgbClr val="949494"/>
+                </a:solidFill>
+                <a:latin typeface="Lucida Console" panose="020B0609040504020204" pitchFamily="49" charset="0"/>
+              </a:rPr>
+              <a:t>&gt;</a:t>
+            </a:r>
+            <a:r>
+              <a:rPr lang="de-DE" altLang="de-DE" dirty="0">
+                <a:solidFill>
+                  <a:srgbClr val="000000"/>
+                </a:solidFill>
+                <a:latin typeface="Lucida Console" panose="020B0609040504020204" pitchFamily="49" charset="0"/>
+              </a:rPr>
+              <a:t> </a:t>
+            </a:r>
+            <a:r>
+              <a:rPr lang="de-DE" altLang="de-DE" dirty="0" err="1">
+                <a:solidFill>
+                  <a:srgbClr val="000000"/>
+                </a:solidFill>
+                <a:latin typeface="Lucida Console" panose="020B0609040504020204" pitchFamily="49" charset="0"/>
+              </a:rPr>
+              <a:t>No</a:t>
+            </a:r>
+            <a:r>
+              <a:rPr lang="de-DE" altLang="de-DE" dirty="0">
+                <a:solidFill>
+                  <a:srgbClr val="000000"/>
+                </a:solidFill>
+                <a:latin typeface="Lucida Console" panose="020B0609040504020204" pitchFamily="49" charset="0"/>
+              </a:rPr>
+              <a:t>, </a:t>
+            </a:r>
+            <a:r>
+              <a:rPr lang="de-DE" altLang="de-DE" dirty="0" err="1">
+                <a:solidFill>
+                  <a:srgbClr val="000000"/>
+                </a:solidFill>
+                <a:latin typeface="Lucida Console" panose="020B0609040504020204" pitchFamily="49" charset="0"/>
+              </a:rPr>
+              <a:t>No</a:t>
+            </a:r>
+            <a:r>
+              <a:rPr lang="de-DE" altLang="de-DE" dirty="0">
+                <a:solidFill>
+                  <a:srgbClr val="000000"/>
+                </a:solidFill>
+                <a:latin typeface="Lucida Console" panose="020B0609040504020204" pitchFamily="49" charset="0"/>
+              </a:rPr>
+              <a:t>, </a:t>
+            </a:r>
+            <a:r>
+              <a:rPr lang="de-DE" altLang="de-DE" dirty="0" err="1">
+                <a:solidFill>
+                  <a:srgbClr val="000000"/>
+                </a:solidFill>
+                <a:latin typeface="Lucida Console" panose="020B0609040504020204" pitchFamily="49" charset="0"/>
+              </a:rPr>
+              <a:t>No</a:t>
+            </a:r>
+            <a:r>
+              <a:rPr lang="de-DE" altLang="de-DE" dirty="0">
+                <a:solidFill>
+                  <a:srgbClr val="000000"/>
+                </a:solidFill>
+                <a:latin typeface="Lucida Console" panose="020B0609040504020204" pitchFamily="49" charset="0"/>
+              </a:rPr>
+              <a:t>, </a:t>
+            </a:r>
+            <a:r>
+              <a:rPr lang="de-DE" altLang="de-DE" dirty="0" err="1">
+                <a:solidFill>
+                  <a:srgbClr val="000000"/>
+                </a:solidFill>
+                <a:latin typeface="Lucida Console" panose="020B0609040504020204" pitchFamily="49" charset="0"/>
+              </a:rPr>
+              <a:t>No</a:t>
+            </a:r>
+            <a:r>
+              <a:rPr lang="de-DE" altLang="de-DE" dirty="0">
+                <a:solidFill>
+                  <a:srgbClr val="000000"/>
+                </a:solidFill>
+                <a:latin typeface="Lucida Console" panose="020B0609040504020204" pitchFamily="49" charset="0"/>
+              </a:rPr>
+              <a:t>, </a:t>
+            </a:r>
+            <a:r>
+              <a:rPr lang="de-DE" altLang="de-DE" dirty="0" err="1">
+                <a:solidFill>
+                  <a:srgbClr val="000000"/>
+                </a:solidFill>
+                <a:latin typeface="Lucida Console" panose="020B0609040504020204" pitchFamily="49" charset="0"/>
+              </a:rPr>
+              <a:t>No</a:t>
+            </a:r>
+            <a:r>
+              <a:rPr lang="de-DE" altLang="de-DE" dirty="0">
+                <a:solidFill>
+                  <a:srgbClr val="000000"/>
+                </a:solidFill>
+                <a:latin typeface="Lucida Console" panose="020B0609040504020204" pitchFamily="49" charset="0"/>
+              </a:rPr>
+              <a:t>, </a:t>
+            </a:r>
+            <a:r>
+              <a:rPr lang="de-DE" altLang="de-DE" dirty="0" err="1">
+                <a:solidFill>
+                  <a:srgbClr val="000000"/>
+                </a:solidFill>
+                <a:latin typeface="Lucida Console" panose="020B0609040504020204" pitchFamily="49" charset="0"/>
+              </a:rPr>
+              <a:t>No</a:t>
+            </a:r>
+            <a:r>
+              <a:rPr lang="de-DE" altLang="de-DE" dirty="0">
+                <a:solidFill>
+                  <a:srgbClr val="000000"/>
+                </a:solidFill>
+                <a:latin typeface="Lucida Console" panose="020B0609040504020204" pitchFamily="49" charset="0"/>
+              </a:rPr>
+              <a:t>,</a:t>
+            </a:r>
+            <a:endParaRPr lang="de-DE" altLang="de-DE" sz="5400" dirty="0">
+              <a:latin typeface="Arial" panose="020B0604020202020204" pitchFamily="34" charset="0"/>
+            </a:endParaRPr>
+          </a:p>
+          <a:p>
+            <a:endParaRPr lang="de-CH" dirty="0"/>
+          </a:p>
+        </p:txBody>
+      </p:sp>
+      <p:sp>
+        <p:nvSpPr>
+          <p:cNvPr id="4" name="Rectangle 1">
+            <a:extLst>
+              <a:ext uri="{FF2B5EF4-FFF2-40B4-BE49-F238E27FC236}">
+                <a16:creationId xmlns:a16="http://schemas.microsoft.com/office/drawing/2014/main" id="{7D244ABB-F3E7-474A-864A-E6DA08298F5A}"/>
+              </a:ext>
+            </a:extLst>
+          </p:cNvPr>
+          <p:cNvSpPr>
+            <a:spLocks noChangeArrowheads="1"/>
+          </p:cNvSpPr>
+          <p:nvPr/>
+        </p:nvSpPr>
+        <p:spPr bwMode="auto">
+          <a:xfrm>
+            <a:off x="0" y="90100"/>
+            <a:ext cx="65" cy="276999"/>
+          </a:xfrm>
+          <a:prstGeom prst="rect">
+            <a:avLst/>
+          </a:prstGeom>
+          <a:solidFill>
+            <a:srgbClr val="FFFFFF"/>
+          </a:solidFill>
+          <a:ln>
+            <a:noFill/>
+          </a:ln>
+          <a:effectLst/>
+          <a:extLst>
+            <a:ext uri="{91240B29-F687-4F45-9708-019B960494DF}">
+              <a14:hiddenLine xmlns:a14="http://schemas.microsoft.com/office/drawing/2010/main" w="9525">
+                <a:solidFill>
+                  <a:schemeClr val="tx1"/>
+                </a:solidFill>
+                <a:miter lim="800000"/>
+                <a:headEnd/>
+                <a:tailEnd/>
+              </a14:hiddenLine>
+            </a:ext>
+            <a:ext uri="{AF507438-7753-43E0-B8FC-AC1667EBCBE1}">
+              <a14:hiddenEffects xmlns:a14="http://schemas.microsoft.com/office/drawing/2010/main">
+                <a:effectLst>
+                  <a:outerShdw dist="35921" dir="2700000" algn="ctr" rotWithShape="0">
+                    <a:schemeClr val="bg2"/>
+                  </a:outerShdw>
+                </a:effectLst>
+              </a14:hiddenEffects>
+            </a:ext>
+          </a:extLst>
+        </p:spPr>
+        <p:txBody>
+          <a:bodyPr vert="horz" wrap="none" lIns="0" tIns="0" rIns="0" bIns="0" numCol="1" anchor="ctr" anchorCtr="0" compatLnSpc="1">
+            <a:prstTxWarp prst="textNoShape">
+              <a:avLst/>
+            </a:prstTxWarp>
+            <a:spAutoFit/>
+          </a:bodyPr>
+          <a:lstStyle/>
+          <a:p>
+            <a:pPr marL="0" marR="0" lvl="0" indent="0" algn="l" defTabSz="914400" rtl="0" eaLnBrk="0" fontAlgn="base" latinLnBrk="0" hangingPunct="0">
+              <a:lnSpc>
+                <a:spcPct val="100000"/>
+              </a:lnSpc>
+              <a:spcBef>
+                <a:spcPct val="0"/>
+              </a:spcBef>
+              <a:spcAft>
+                <a:spcPct val="0"/>
+              </a:spcAft>
+              <a:buClrTx/>
+              <a:buSzTx/>
+              <a:buFontTx/>
+              <a:buNone/>
+              <a:tabLst/>
+            </a:pPr>
+            <a:endParaRPr kumimoji="0" lang="de-DE" altLang="de-DE" sz="1800" b="0" i="0" u="none" strike="noStrike" cap="none" normalizeH="0" baseline="0" dirty="0">
+              <a:ln>
+                <a:noFill/>
+              </a:ln>
+              <a:solidFill>
+                <a:schemeClr val="tx1"/>
+              </a:solidFill>
+              <a:effectLst/>
+              <a:latin typeface="Arial" panose="020B0604020202020204" pitchFamily="34" charset="0"/>
+            </a:endParaRPr>
+          </a:p>
+        </p:txBody>
+      </p:sp>
+    </p:spTree>
+    <p:extLst>
+      <p:ext uri="{BB962C8B-B14F-4D97-AF65-F5344CB8AC3E}">
+        <p14:creationId xmlns:p14="http://schemas.microsoft.com/office/powerpoint/2010/main" val="1733827384"/>
+      </p:ext>
+    </p:extLst>
+  </p:cSld>
+  <p:clrMapOvr>
+    <a:masterClrMapping/>
+  </p:clrMapOvr>
+</p:sld>
+</file>
+
+<file path=ppt/slides/slide9.xml><?xml version="1.0" encoding="utf-8"?>
 <p:sld xmlns:a="http://schemas.openxmlformats.org/drawingml/2006/main" xmlns:r="http://schemas.openxmlformats.org/officeDocument/2006/relationships" xmlns:p="http://schemas.openxmlformats.org/presentationml/2006/main">
   <p:cSld>
     <p:spTree>
@@ -4172,4 +8760,299 @@
     </a:ext>
   </a:extLst>
 </a:theme>
+</file>
+
+<file path=ppt/theme/theme2.xml><?xml version="1.0" encoding="utf-8"?>
+<a:theme xmlns:a="http://schemas.openxmlformats.org/drawingml/2006/main" name="Office">
+  <a:themeElements>
+    <a:clrScheme name="Office">
+      <a:dk1>
+        <a:sysClr val="windowText" lastClr="000000"/>
+      </a:dk1>
+      <a:lt1>
+        <a:sysClr val="window" lastClr="FFFFFF"/>
+      </a:lt1>
+      <a:dk2>
+        <a:srgbClr val="44546A"/>
+      </a:dk2>
+      <a:lt2>
+        <a:srgbClr val="E7E6E6"/>
+      </a:lt2>
+      <a:accent1>
+        <a:srgbClr val="4472C4"/>
+      </a:accent1>
+      <a:accent2>
+        <a:srgbClr val="ED7D31"/>
+      </a:accent2>
+      <a:accent3>
+        <a:srgbClr val="A5A5A5"/>
+      </a:accent3>
+      <a:accent4>
+        <a:srgbClr val="FFC000"/>
+      </a:accent4>
+      <a:accent5>
+        <a:srgbClr val="5B9BD5"/>
+      </a:accent5>
+      <a:accent6>
+        <a:srgbClr val="70AD47"/>
+      </a:accent6>
+      <a:hlink>
+        <a:srgbClr val="0563C1"/>
+      </a:hlink>
+      <a:folHlink>
+        <a:srgbClr val="954F72"/>
+      </a:folHlink>
+    </a:clrScheme>
+    <a:fontScheme name="Office">
+      <a:majorFont>
+        <a:latin typeface="Calibri Light" panose="020F0302020204030204"/>
+        <a:ea typeface=""/>
+        <a:cs typeface=""/>
+        <a:font script="Jpan" typeface="游ゴシック Light"/>
+        <a:font script="Hang" typeface="맑은 고딕"/>
+        <a:font script="Hans" typeface="等线 Light"/>
+        <a:font script="Hant" typeface="新細明體"/>
+        <a:font script="Arab" typeface="Times New Roman"/>
+        <a:font script="Hebr" typeface="Times New Roman"/>
+        <a:font script="Thai" typeface="Angsana New"/>
+        <a:font script="Ethi" typeface="Nyala"/>
+        <a:font script="Beng" typeface="Vrinda"/>
+        <a:font script="Gujr" typeface="Shruti"/>
+        <a:font script="Khmr" typeface="MoolBoran"/>
+        <a:font script="Knda" typeface="Tunga"/>
+        <a:font script="Guru" typeface="Raavi"/>
+        <a:font script="Cans" typeface="Euphemia"/>
+        <a:font script="Cher" typeface="Plantagenet Cherokee"/>
+        <a:font script="Yiii" typeface="Microsoft Yi Baiti"/>
+        <a:font script="Tibt" typeface="Microsoft Himalaya"/>
+        <a:font script="Thaa" typeface="MV Boli"/>
+        <a:font script="Deva" typeface="Mangal"/>
+        <a:font script="Telu" typeface="Gautami"/>
+        <a:font script="Taml" typeface="Latha"/>
+        <a:font script="Syrc" typeface="Estrangelo Edessa"/>
+        <a:font script="Orya" typeface="Kalinga"/>
+        <a:font script="Mlym" typeface="Kartika"/>
+        <a:font script="Laoo" typeface="DokChampa"/>
+        <a:font script="Sinh" typeface="Iskoola Pota"/>
+        <a:font script="Mong" typeface="Mongolian Baiti"/>
+        <a:font script="Viet" typeface="Times New Roman"/>
+        <a:font script="Uigh" typeface="Microsoft Uighur"/>
+        <a:font script="Geor" typeface="Sylfaen"/>
+        <a:font script="Armn" typeface="Arial"/>
+        <a:font script="Bugi" typeface="Leelawadee UI"/>
+        <a:font script="Bopo" typeface="Microsoft JhengHei"/>
+        <a:font script="Java" typeface="Javanese Text"/>
+        <a:font script="Lisu" typeface="Segoe UI"/>
+        <a:font script="Mymr" typeface="Myanmar Text"/>
+        <a:font script="Nkoo" typeface="Ebrima"/>
+        <a:font script="Olck" typeface="Nirmala UI"/>
+        <a:font script="Osma" typeface="Ebrima"/>
+        <a:font script="Phag" typeface="Phagspa"/>
+        <a:font script="Syrn" typeface="Estrangelo Edessa"/>
+        <a:font script="Syrj" typeface="Estrangelo Edessa"/>
+        <a:font script="Syre" typeface="Estrangelo Edessa"/>
+        <a:font script="Sora" typeface="Nirmala UI"/>
+        <a:font script="Tale" typeface="Microsoft Tai Le"/>
+        <a:font script="Talu" typeface="Microsoft New Tai Lue"/>
+        <a:font script="Tfng" typeface="Ebrima"/>
+      </a:majorFont>
+      <a:minorFont>
+        <a:latin typeface="Calibri" panose="020F0502020204030204"/>
+        <a:ea typeface=""/>
+        <a:cs typeface=""/>
+        <a:font script="Jpan" typeface="游ゴシック"/>
+        <a:font script="Hang" typeface="맑은 고딕"/>
+        <a:font script="Hans" typeface="等线"/>
+        <a:font script="Hant" typeface="新細明體"/>
+        <a:font script="Arab" typeface="Arial"/>
+        <a:font script="Hebr" typeface="Arial"/>
+        <a:font script="Thai" typeface="Cordia New"/>
+        <a:font script="Ethi" typeface="Nyala"/>
+        <a:font script="Beng" typeface="Vrinda"/>
+        <a:font script="Gujr" typeface="Shruti"/>
+        <a:font script="Khmr" typeface="DaunPenh"/>
+        <a:font script="Knda" typeface="Tunga"/>
+        <a:font script="Guru" typeface="Raavi"/>
+        <a:font script="Cans" typeface="Euphemia"/>
+        <a:font script="Cher" typeface="Plantagenet Cherokee"/>
+        <a:font script="Yiii" typeface="Microsoft Yi Baiti"/>
+        <a:font script="Tibt" typeface="Microsoft Himalaya"/>
+        <a:font script="Thaa" typeface="MV Boli"/>
+        <a:font script="Deva" typeface="Mangal"/>
+        <a:font script="Telu" typeface="Gautami"/>
+        <a:font script="Taml" typeface="Latha"/>
+        <a:font script="Syrc" typeface="Estrangelo Edessa"/>
+        <a:font script="Orya" typeface="Kalinga"/>
+        <a:font script="Mlym" typeface="Kartika"/>
+        <a:font script="Laoo" typeface="DokChampa"/>
+        <a:font script="Sinh" typeface="Iskoola Pota"/>
+        <a:font script="Mong" typeface="Mongolian Baiti"/>
+        <a:font script="Viet" typeface="Arial"/>
+        <a:font script="Uigh" typeface="Microsoft Uighur"/>
+        <a:font script="Geor" typeface="Sylfaen"/>
+        <a:font script="Armn" typeface="Arial"/>
+        <a:font script="Bugi" typeface="Leelawadee UI"/>
+        <a:font script="Bopo" typeface="Microsoft JhengHei"/>
+        <a:font script="Java" typeface="Javanese Text"/>
+        <a:font script="Lisu" typeface="Segoe UI"/>
+        <a:font script="Mymr" typeface="Myanmar Text"/>
+        <a:font script="Nkoo" typeface="Ebrima"/>
+        <a:font script="Olck" typeface="Nirmala UI"/>
+        <a:font script="Osma" typeface="Ebrima"/>
+        <a:font script="Phag" typeface="Phagspa"/>
+        <a:font script="Syrn" typeface="Estrangelo Edessa"/>
+        <a:font script="Syrj" typeface="Estrangelo Edessa"/>
+        <a:font script="Syre" typeface="Estrangelo Edessa"/>
+        <a:font script="Sora" typeface="Nirmala UI"/>
+        <a:font script="Tale" typeface="Microsoft Tai Le"/>
+        <a:font script="Talu" typeface="Microsoft New Tai Lue"/>
+        <a:font script="Tfng" typeface="Ebrima"/>
+      </a:minorFont>
+    </a:fontScheme>
+    <a:fmtScheme name="Office">
+      <a:fillStyleLst>
+        <a:solidFill>
+          <a:schemeClr val="phClr"/>
+        </a:solidFill>
+        <a:gradFill rotWithShape="1">
+          <a:gsLst>
+            <a:gs pos="0">
+              <a:schemeClr val="phClr">
+                <a:lumMod val="110000"/>
+                <a:satMod val="105000"/>
+                <a:tint val="67000"/>
+              </a:schemeClr>
+            </a:gs>
+            <a:gs pos="50000">
+              <a:schemeClr val="phClr">
+                <a:lumMod val="105000"/>
+                <a:satMod val="103000"/>
+                <a:tint val="73000"/>
+              </a:schemeClr>
+            </a:gs>
+            <a:gs pos="100000">
+              <a:schemeClr val="phClr">
+                <a:lumMod val="105000"/>
+                <a:satMod val="109000"/>
+                <a:tint val="81000"/>
+              </a:schemeClr>
+            </a:gs>
+          </a:gsLst>
+          <a:lin ang="5400000" scaled="0"/>
+        </a:gradFill>
+        <a:gradFill rotWithShape="1">
+          <a:gsLst>
+            <a:gs pos="0">
+              <a:schemeClr val="phClr">
+                <a:satMod val="103000"/>
+                <a:lumMod val="102000"/>
+                <a:tint val="94000"/>
+              </a:schemeClr>
+            </a:gs>
+            <a:gs pos="50000">
+              <a:schemeClr val="phClr">
+                <a:satMod val="110000"/>
+                <a:lumMod val="100000"/>
+                <a:shade val="100000"/>
+              </a:schemeClr>
+            </a:gs>
+            <a:gs pos="100000">
+              <a:schemeClr val="phClr">
+                <a:lumMod val="99000"/>
+                <a:satMod val="120000"/>
+                <a:shade val="78000"/>
+              </a:schemeClr>
+            </a:gs>
+          </a:gsLst>
+          <a:lin ang="5400000" scaled="0"/>
+        </a:gradFill>
+      </a:fillStyleLst>
+      <a:lnStyleLst>
+        <a:ln w="6350" cap="flat" cmpd="sng" algn="ctr">
+          <a:solidFill>
+            <a:schemeClr val="phClr"/>
+          </a:solidFill>
+          <a:prstDash val="solid"/>
+          <a:miter lim="800000"/>
+        </a:ln>
+        <a:ln w="12700" cap="flat" cmpd="sng" algn="ctr">
+          <a:solidFill>
+            <a:schemeClr val="phClr"/>
+          </a:solidFill>
+          <a:prstDash val="solid"/>
+          <a:miter lim="800000"/>
+        </a:ln>
+        <a:ln w="19050" cap="flat" cmpd="sng" algn="ctr">
+          <a:solidFill>
+            <a:schemeClr val="phClr"/>
+          </a:solidFill>
+          <a:prstDash val="solid"/>
+          <a:miter lim="800000"/>
+        </a:ln>
+      </a:lnStyleLst>
+      <a:effectStyleLst>
+        <a:effectStyle>
+          <a:effectLst/>
+        </a:effectStyle>
+        <a:effectStyle>
+          <a:effectLst/>
+        </a:effectStyle>
+        <a:effectStyle>
+          <a:effectLst>
+            <a:outerShdw blurRad="57150" dist="19050" dir="5400000" algn="ctr" rotWithShape="0">
+              <a:srgbClr val="000000">
+                <a:alpha val="63000"/>
+              </a:srgbClr>
+            </a:outerShdw>
+          </a:effectLst>
+        </a:effectStyle>
+      </a:effectStyleLst>
+      <a:bgFillStyleLst>
+        <a:solidFill>
+          <a:schemeClr val="phClr"/>
+        </a:solidFill>
+        <a:solidFill>
+          <a:schemeClr val="phClr">
+            <a:tint val="95000"/>
+            <a:satMod val="170000"/>
+          </a:schemeClr>
+        </a:solidFill>
+        <a:gradFill rotWithShape="1">
+          <a:gsLst>
+            <a:gs pos="0">
+              <a:schemeClr val="phClr">
+                <a:tint val="93000"/>
+                <a:satMod val="150000"/>
+                <a:shade val="98000"/>
+                <a:lumMod val="102000"/>
+              </a:schemeClr>
+            </a:gs>
+            <a:gs pos="50000">
+              <a:schemeClr val="phClr">
+                <a:tint val="98000"/>
+                <a:satMod val="130000"/>
+                <a:shade val="90000"/>
+                <a:lumMod val="103000"/>
+              </a:schemeClr>
+            </a:gs>
+            <a:gs pos="100000">
+              <a:schemeClr val="phClr">
+                <a:shade val="63000"/>
+                <a:satMod val="120000"/>
+              </a:schemeClr>
+            </a:gs>
+          </a:gsLst>
+          <a:lin ang="5400000" scaled="0"/>
+        </a:gradFill>
+      </a:bgFillStyleLst>
+    </a:fmtScheme>
+  </a:themeElements>
+  <a:objectDefaults/>
+  <a:extraClrSchemeLst/>
+  <a:extLst>
+    <a:ext uri="{05A4C25C-085E-4340-85A3-A5531E510DB2}">
+      <thm15:themeFamily xmlns:thm15="http://schemas.microsoft.com/office/thememl/2012/main" name="Office Theme" id="{62F939B6-93AF-4DB8-9C6B-D6C7DFDC589F}" vid="{4A3C46E8-61CC-4603-A589-7422A47A8E4A}"/>
+    </a:ext>
+  </a:extLst>
+</a:theme>
 </file>
</xml_diff>

<commit_message>
Update Medical Appointment No Shows.pptx
</commit_message>
<xml_diff>
--- a/Medical Appointment No Shows.pptx
+++ b/Medical Appointment No Shows.pptx
@@ -5,7 +5,7 @@
     <p:sldMasterId id="2147483660" r:id="rId1"/>
   </p:sldMasterIdLst>
   <p:notesMasterIdLst>
-    <p:notesMasterId r:id="rId23"/>
+    <p:notesMasterId r:id="rId18"/>
   </p:notesMasterIdLst>
   <p:sldIdLst>
     <p:sldId id="256" r:id="rId2"/>
@@ -24,11 +24,6 @@
     <p:sldId id="287" r:id="rId15"/>
     <p:sldId id="288" r:id="rId16"/>
     <p:sldId id="291" r:id="rId17"/>
-    <p:sldId id="290" r:id="rId18"/>
-    <p:sldId id="264" r:id="rId19"/>
-    <p:sldId id="266" r:id="rId20"/>
-    <p:sldId id="269" r:id="rId21"/>
-    <p:sldId id="268" r:id="rId22"/>
   </p:sldIdLst>
   <p:sldSz cx="12192000" cy="6858000"/>
   <p:notesSz cx="6858000" cy="9144000"/>
@@ -148,11 +143,6 @@
             <p14:sldId id="287"/>
             <p14:sldId id="288"/>
             <p14:sldId id="291"/>
-            <p14:sldId id="290"/>
-            <p14:sldId id="264"/>
-            <p14:sldId id="266"/>
-            <p14:sldId id="269"/>
-            <p14:sldId id="268"/>
           </p14:sldIdLst>
         </p14:section>
         <p14:section name="Abschnitt 1" id="{1C7D8DC9-57ED-4193-A3AF-82B2A91DF4A2}">
@@ -249,7 +239,7 @@
           <a:p>
             <a:fld id="{89E003B2-786C-4DE1-85BD-AA79EBA6DDC7}" type="datetimeFigureOut">
               <a:rPr lang="de-CH" smtClean="0"/>
-              <a:t>11.06.2019</a:t>
+              <a:t>12.06.2019</a:t>
             </a:fld>
             <a:endParaRPr lang="de-CH"/>
           </a:p>
@@ -1164,629 +1154,6 @@
 </p:notes>
 </file>
 
-<file path=ppt/notesSlides/notesSlide6.xml><?xml version="1.0" encoding="utf-8"?>
-<p:notes xmlns:a="http://schemas.openxmlformats.org/drawingml/2006/main" xmlns:r="http://schemas.openxmlformats.org/officeDocument/2006/relationships" xmlns:p="http://schemas.openxmlformats.org/presentationml/2006/main">
-  <p:cSld>
-    <p:spTree>
-      <p:nvGrpSpPr>
-        <p:cNvPr id="1" name=""/>
-        <p:cNvGrpSpPr/>
-        <p:nvPr/>
-      </p:nvGrpSpPr>
-      <p:grpSpPr>
-        <a:xfrm>
-          <a:off x="0" y="0"/>
-          <a:ext cx="0" cy="0"/>
-          <a:chOff x="0" y="0"/>
-          <a:chExt cx="0" cy="0"/>
-        </a:xfrm>
-      </p:grpSpPr>
-      <p:sp>
-        <p:nvSpPr>
-          <p:cNvPr id="2" name="Folienbildplatzhalter 1"/>
-          <p:cNvSpPr>
-            <a:spLocks noGrp="1" noRot="1" noChangeAspect="1"/>
-          </p:cNvSpPr>
-          <p:nvPr>
-            <p:ph type="sldImg"/>
-          </p:nvPr>
-        </p:nvSpPr>
-        <p:spPr/>
-      </p:sp>
-      <p:sp>
-        <p:nvSpPr>
-          <p:cNvPr id="3" name="Notizenplatzhalter 2"/>
-          <p:cNvSpPr>
-            <a:spLocks noGrp="1"/>
-          </p:cNvSpPr>
-          <p:nvPr>
-            <p:ph type="body" idx="1"/>
-          </p:nvPr>
-        </p:nvSpPr>
-        <p:spPr/>
-        <p:txBody>
-          <a:bodyPr/>
-          <a:lstStyle/>
-          <a:p>
-            <a:r>
-              <a:rPr lang="en-US" dirty="0" err="1"/>
-              <a:t>patNumeric</a:t>
-            </a:r>
-            <a:r>
-              <a:rPr lang="en-US" dirty="0"/>
-              <a:t> &lt;- </a:t>
-            </a:r>
-            <a:r>
-              <a:rPr lang="en-US" dirty="0" err="1"/>
-              <a:t>sapply</a:t>
-            </a:r>
-            <a:r>
-              <a:rPr lang="en-US" dirty="0"/>
-              <a:t>(</a:t>
-            </a:r>
-            <a:r>
-              <a:rPr lang="en-US" dirty="0" err="1"/>
-              <a:t>data$PatientId</a:t>
-            </a:r>
-            <a:r>
-              <a:rPr lang="en-US" dirty="0"/>
-              <a:t>, </a:t>
-            </a:r>
-            <a:r>
-              <a:rPr lang="en-US" dirty="0" err="1"/>
-              <a:t>is.numeric</a:t>
-            </a:r>
-            <a:r>
-              <a:rPr lang="en-US" dirty="0"/>
-              <a:t>)</a:t>
-            </a:r>
-          </a:p>
-          <a:p>
-            <a:r>
-              <a:rPr lang="en-US" dirty="0"/>
-              <a:t>all(</a:t>
-            </a:r>
-            <a:r>
-              <a:rPr lang="en-US" dirty="0" err="1"/>
-              <a:t>patNumeric</a:t>
-            </a:r>
-            <a:r>
-              <a:rPr lang="en-US" dirty="0"/>
-              <a:t>) </a:t>
-            </a:r>
-            <a:r>
-              <a:rPr lang="en-US" dirty="0">
-                <a:sym typeface="Wingdings" panose="05000000000000000000" pitchFamily="2" charset="2"/>
-              </a:rPr>
-              <a:t> </a:t>
-            </a:r>
-            <a:r>
-              <a:rPr lang="en-US" b="1" dirty="0">
-                <a:sym typeface="Wingdings" panose="05000000000000000000" pitchFamily="2" charset="2"/>
-              </a:rPr>
-              <a:t>TRUE</a:t>
-            </a:r>
-          </a:p>
-          <a:p>
-            <a:endParaRPr lang="en-US" dirty="0">
-              <a:sym typeface="Wingdings" panose="05000000000000000000" pitchFamily="2" charset="2"/>
-            </a:endParaRPr>
-          </a:p>
-          <a:p>
-            <a:r>
-              <a:rPr lang="en-US" dirty="0" err="1"/>
-              <a:t>appNumeric</a:t>
-            </a:r>
-            <a:r>
-              <a:rPr lang="en-US" dirty="0"/>
-              <a:t> &lt;- </a:t>
-            </a:r>
-            <a:r>
-              <a:rPr lang="en-US" dirty="0" err="1"/>
-              <a:t>sapply</a:t>
-            </a:r>
-            <a:r>
-              <a:rPr lang="en-US" dirty="0"/>
-              <a:t>(</a:t>
-            </a:r>
-            <a:r>
-              <a:rPr lang="en-US" dirty="0" err="1"/>
-              <a:t>data$AppointmentID</a:t>
-            </a:r>
-            <a:r>
-              <a:rPr lang="en-US" dirty="0"/>
-              <a:t>, </a:t>
-            </a:r>
-            <a:r>
-              <a:rPr lang="en-US" dirty="0" err="1"/>
-              <a:t>is.numeric</a:t>
-            </a:r>
-            <a:r>
-              <a:rPr lang="en-US" dirty="0"/>
-              <a:t>)</a:t>
-            </a:r>
-          </a:p>
-          <a:p>
-            <a:r>
-              <a:rPr lang="en-US" dirty="0"/>
-              <a:t>all(</a:t>
-            </a:r>
-            <a:r>
-              <a:rPr lang="en-US" dirty="0" err="1"/>
-              <a:t>appNumeric</a:t>
-            </a:r>
-            <a:r>
-              <a:rPr lang="en-US" dirty="0"/>
-              <a:t>) </a:t>
-            </a:r>
-            <a:r>
-              <a:rPr lang="en-US" dirty="0">
-                <a:sym typeface="Wingdings" panose="05000000000000000000" pitchFamily="2" charset="2"/>
-              </a:rPr>
-              <a:t> </a:t>
-            </a:r>
-            <a:r>
-              <a:rPr lang="en-US" b="1" dirty="0">
-                <a:sym typeface="Wingdings" panose="05000000000000000000" pitchFamily="2" charset="2"/>
-              </a:rPr>
-              <a:t>TRUE</a:t>
-            </a:r>
-          </a:p>
-          <a:p>
-            <a:endParaRPr lang="en-US" b="1" dirty="0">
-              <a:sym typeface="Wingdings" panose="05000000000000000000" pitchFamily="2" charset="2"/>
-            </a:endParaRPr>
-          </a:p>
-          <a:p>
-            <a:r>
-              <a:rPr lang="en-US" b="0" dirty="0"/>
-              <a:t>summary(</a:t>
-            </a:r>
-            <a:r>
-              <a:rPr lang="en-US" b="0" dirty="0" err="1"/>
-              <a:t>data$Gender</a:t>
-            </a:r>
-            <a:r>
-              <a:rPr lang="en-US" b="0" dirty="0"/>
-              <a:t>)</a:t>
-            </a:r>
-            <a:r>
-              <a:rPr lang="en-US" b="1" dirty="0"/>
-              <a:t> </a:t>
-            </a:r>
-            <a:r>
-              <a:rPr lang="en-US" b="1" dirty="0">
-                <a:sym typeface="Wingdings" panose="05000000000000000000" pitchFamily="2" charset="2"/>
-              </a:rPr>
-              <a:t> </a:t>
-            </a:r>
-            <a:r>
-              <a:rPr lang="de-CH" b="1" dirty="0">
-                <a:effectLst/>
-              </a:rPr>
-              <a:t>F 71839 / M 38687</a:t>
-            </a:r>
-          </a:p>
-          <a:p>
-            <a:endParaRPr lang="de-CH" b="1" dirty="0">
-              <a:effectLst/>
-            </a:endParaRPr>
-          </a:p>
-          <a:p>
-            <a:endParaRPr lang="en-US" b="1" dirty="0"/>
-          </a:p>
-          <a:p>
-            <a:endParaRPr lang="en-US" dirty="0"/>
-          </a:p>
-          <a:p>
-            <a:endParaRPr lang="en-US" dirty="0"/>
-          </a:p>
-          <a:p>
-            <a:endParaRPr lang="en-US" dirty="0"/>
-          </a:p>
-          <a:p>
-            <a:endParaRPr lang="en-US" dirty="0"/>
-          </a:p>
-          <a:p>
-            <a:endParaRPr lang="de-CH" dirty="0"/>
-          </a:p>
-        </p:txBody>
-      </p:sp>
-      <p:sp>
-        <p:nvSpPr>
-          <p:cNvPr id="4" name="Foliennummernplatzhalter 3"/>
-          <p:cNvSpPr>
-            <a:spLocks noGrp="1"/>
-          </p:cNvSpPr>
-          <p:nvPr>
-            <p:ph type="sldNum" sz="quarter" idx="5"/>
-          </p:nvPr>
-        </p:nvSpPr>
-        <p:spPr/>
-        <p:txBody>
-          <a:bodyPr/>
-          <a:lstStyle/>
-          <a:p>
-            <a:fld id="{A3E72A82-844A-4E08-9EB3-F7FF3B8B3A89}" type="slidenum">
-              <a:rPr lang="de-CH" smtClean="0"/>
-              <a:t>18</a:t>
-            </a:fld>
-            <a:endParaRPr lang="de-CH"/>
-          </a:p>
-        </p:txBody>
-      </p:sp>
-    </p:spTree>
-    <p:extLst>
-      <p:ext uri="{BB962C8B-B14F-4D97-AF65-F5344CB8AC3E}">
-        <p14:creationId xmlns:p14="http://schemas.microsoft.com/office/powerpoint/2010/main" val="3467603715"/>
-      </p:ext>
-    </p:extLst>
-  </p:cSld>
-  <p:clrMapOvr>
-    <a:masterClrMapping/>
-  </p:clrMapOvr>
-</p:notes>
-</file>
-
-<file path=ppt/notesSlides/notesSlide7.xml><?xml version="1.0" encoding="utf-8"?>
-<p:notes xmlns:a="http://schemas.openxmlformats.org/drawingml/2006/main" xmlns:r="http://schemas.openxmlformats.org/officeDocument/2006/relationships" xmlns:p="http://schemas.openxmlformats.org/presentationml/2006/main">
-  <p:cSld>
-    <p:spTree>
-      <p:nvGrpSpPr>
-        <p:cNvPr id="1" name=""/>
-        <p:cNvGrpSpPr/>
-        <p:nvPr/>
-      </p:nvGrpSpPr>
-      <p:grpSpPr>
-        <a:xfrm>
-          <a:off x="0" y="0"/>
-          <a:ext cx="0" cy="0"/>
-          <a:chOff x="0" y="0"/>
-          <a:chExt cx="0" cy="0"/>
-        </a:xfrm>
-      </p:grpSpPr>
-      <p:sp>
-        <p:nvSpPr>
-          <p:cNvPr id="2" name="Folienbildplatzhalter 1"/>
-          <p:cNvSpPr>
-            <a:spLocks noGrp="1" noRot="1" noChangeAspect="1"/>
-          </p:cNvSpPr>
-          <p:nvPr>
-            <p:ph type="sldImg"/>
-          </p:nvPr>
-        </p:nvSpPr>
-        <p:spPr/>
-      </p:sp>
-      <p:sp>
-        <p:nvSpPr>
-          <p:cNvPr id="3" name="Notizenplatzhalter 2"/>
-          <p:cNvSpPr>
-            <a:spLocks noGrp="1"/>
-          </p:cNvSpPr>
-          <p:nvPr>
-            <p:ph type="body" idx="1"/>
-          </p:nvPr>
-        </p:nvSpPr>
-        <p:spPr/>
-        <p:txBody>
-          <a:bodyPr/>
-          <a:lstStyle/>
-          <a:p>
-            <a:r>
-              <a:rPr lang="de-CH" dirty="0" err="1"/>
-              <a:t>Scholarship</a:t>
-            </a:r>
-            <a:r>
-              <a:rPr lang="de-CH" dirty="0"/>
-              <a:t>  - </a:t>
-            </a:r>
-            <a:r>
-              <a:rPr lang="de-CH" dirty="0" err="1"/>
-              <a:t>Alcoholism</a:t>
-            </a:r>
-            <a:r>
-              <a:rPr lang="de-CH" dirty="0"/>
-              <a:t>: </a:t>
-            </a:r>
-            <a:r>
-              <a:rPr lang="de-CH" dirty="0" err="1"/>
-              <a:t>factor</a:t>
-            </a:r>
-            <a:r>
-              <a:rPr lang="de-CH" dirty="0"/>
-              <a:t> mit 2 </a:t>
-            </a:r>
-            <a:r>
-              <a:rPr lang="de-CH" dirty="0" err="1"/>
-              <a:t>levels</a:t>
-            </a:r>
-            <a:endParaRPr lang="de-CH" sz="1200" kern="1200" dirty="0">
-              <a:solidFill>
-                <a:schemeClr val="tx1"/>
-              </a:solidFill>
-              <a:effectLst/>
-              <a:latin typeface="+mn-lt"/>
-              <a:ea typeface="+mn-ea"/>
-              <a:cs typeface="+mn-cs"/>
-            </a:endParaRPr>
-          </a:p>
-          <a:p>
-            <a:r>
-              <a:rPr lang="de-CH" sz="1200" b="1" kern="1200" dirty="0">
-                <a:solidFill>
-                  <a:schemeClr val="tx1"/>
-                </a:solidFill>
-                <a:effectLst/>
-                <a:latin typeface="+mn-lt"/>
-                <a:ea typeface="+mn-ea"/>
-                <a:cs typeface="+mn-cs"/>
-              </a:rPr>
-              <a:t>Variabel </a:t>
-            </a:r>
-            <a:r>
-              <a:rPr lang="de-CH" sz="1200" b="1" kern="1200" dirty="0" err="1">
-                <a:solidFill>
-                  <a:schemeClr val="tx1"/>
-                </a:solidFill>
-                <a:effectLst/>
-                <a:latin typeface="+mn-lt"/>
-                <a:ea typeface="+mn-ea"/>
-                <a:cs typeface="+mn-cs"/>
-              </a:rPr>
-              <a:t>Handcap</a:t>
-            </a:r>
-            <a:r>
-              <a:rPr lang="de-CH" sz="1200" kern="1200" dirty="0">
-                <a:solidFill>
-                  <a:schemeClr val="tx1"/>
-                </a:solidFill>
-                <a:effectLst/>
-                <a:latin typeface="+mn-lt"/>
-                <a:ea typeface="+mn-ea"/>
-                <a:cs typeface="+mn-cs"/>
-              </a:rPr>
-              <a:t> beinhaltet die Werte 0, 1, 2, 3 und 4. Es sollte eigentlich ein </a:t>
-            </a:r>
-            <a:r>
-              <a:rPr lang="de-CH" sz="1200" kern="1200" dirty="0" err="1">
-                <a:solidFill>
-                  <a:schemeClr val="tx1"/>
-                </a:solidFill>
-                <a:effectLst/>
-                <a:latin typeface="+mn-lt"/>
-                <a:ea typeface="+mn-ea"/>
-                <a:cs typeface="+mn-cs"/>
-              </a:rPr>
-              <a:t>boolean</a:t>
-            </a:r>
-            <a:r>
-              <a:rPr lang="de-CH" sz="1200" kern="1200" dirty="0">
-                <a:solidFill>
-                  <a:schemeClr val="tx1"/>
-                </a:solidFill>
-                <a:effectLst/>
-                <a:latin typeface="+mn-lt"/>
-                <a:ea typeface="+mn-ea"/>
-                <a:cs typeface="+mn-cs"/>
-              </a:rPr>
-              <a:t> sein. Doch laut Kommentar bedeutet 1 - 4verschiedene Arten von </a:t>
-            </a:r>
-            <a:r>
-              <a:rPr lang="de-CH" sz="1200" kern="1200" dirty="0" err="1">
-                <a:solidFill>
-                  <a:schemeClr val="tx1"/>
-                </a:solidFill>
-                <a:effectLst/>
-                <a:latin typeface="+mn-lt"/>
-                <a:ea typeface="+mn-ea"/>
-                <a:cs typeface="+mn-cs"/>
-              </a:rPr>
-              <a:t>Handycap</a:t>
-            </a:r>
-            <a:r>
-              <a:rPr lang="de-CH" sz="1200" kern="1200" dirty="0">
-                <a:solidFill>
-                  <a:schemeClr val="tx1"/>
-                </a:solidFill>
-                <a:effectLst/>
-                <a:latin typeface="+mn-lt"/>
-                <a:ea typeface="+mn-ea"/>
-                <a:cs typeface="+mn-cs"/>
-              </a:rPr>
-              <a:t>. Diese werden summiert und als 1 angeschaut. </a:t>
-            </a:r>
-          </a:p>
-          <a:p>
-            <a:endParaRPr lang="de-CH" dirty="0"/>
-          </a:p>
-          <a:p>
-            <a:endParaRPr lang="de-CH" dirty="0"/>
-          </a:p>
-          <a:p>
-            <a:endParaRPr lang="de-CH" dirty="0"/>
-          </a:p>
-        </p:txBody>
-      </p:sp>
-      <p:sp>
-        <p:nvSpPr>
-          <p:cNvPr id="4" name="Foliennummernplatzhalter 3"/>
-          <p:cNvSpPr>
-            <a:spLocks noGrp="1"/>
-          </p:cNvSpPr>
-          <p:nvPr>
-            <p:ph type="sldNum" sz="quarter" idx="5"/>
-          </p:nvPr>
-        </p:nvSpPr>
-        <p:spPr/>
-        <p:txBody>
-          <a:bodyPr/>
-          <a:lstStyle/>
-          <a:p>
-            <a:fld id="{A3E72A82-844A-4E08-9EB3-F7FF3B8B3A89}" type="slidenum">
-              <a:rPr lang="de-CH" smtClean="0"/>
-              <a:t>20</a:t>
-            </a:fld>
-            <a:endParaRPr lang="de-CH"/>
-          </a:p>
-        </p:txBody>
-      </p:sp>
-    </p:spTree>
-    <p:extLst>
-      <p:ext uri="{BB962C8B-B14F-4D97-AF65-F5344CB8AC3E}">
-        <p14:creationId xmlns:p14="http://schemas.microsoft.com/office/powerpoint/2010/main" val="3619195310"/>
-      </p:ext>
-    </p:extLst>
-  </p:cSld>
-  <p:clrMapOvr>
-    <a:masterClrMapping/>
-  </p:clrMapOvr>
-</p:notes>
-</file>
-
-<file path=ppt/notesSlides/notesSlide8.xml><?xml version="1.0" encoding="utf-8"?>
-<p:notes xmlns:a="http://schemas.openxmlformats.org/drawingml/2006/main" xmlns:r="http://schemas.openxmlformats.org/officeDocument/2006/relationships" xmlns:p="http://schemas.openxmlformats.org/presentationml/2006/main">
-  <p:cSld>
-    <p:spTree>
-      <p:nvGrpSpPr>
-        <p:cNvPr id="1" name=""/>
-        <p:cNvGrpSpPr/>
-        <p:nvPr/>
-      </p:nvGrpSpPr>
-      <p:grpSpPr>
-        <a:xfrm>
-          <a:off x="0" y="0"/>
-          <a:ext cx="0" cy="0"/>
-          <a:chOff x="0" y="0"/>
-          <a:chExt cx="0" cy="0"/>
-        </a:xfrm>
-      </p:grpSpPr>
-      <p:sp>
-        <p:nvSpPr>
-          <p:cNvPr id="2" name="Folienbildplatzhalter 1"/>
-          <p:cNvSpPr>
-            <a:spLocks noGrp="1" noRot="1" noChangeAspect="1"/>
-          </p:cNvSpPr>
-          <p:nvPr>
-            <p:ph type="sldImg"/>
-          </p:nvPr>
-        </p:nvSpPr>
-        <p:spPr/>
-      </p:sp>
-      <p:sp>
-        <p:nvSpPr>
-          <p:cNvPr id="3" name="Notizenplatzhalter 2"/>
-          <p:cNvSpPr>
-            <a:spLocks noGrp="1"/>
-          </p:cNvSpPr>
-          <p:nvPr>
-            <p:ph type="body" idx="1"/>
-          </p:nvPr>
-        </p:nvSpPr>
-        <p:spPr/>
-        <p:txBody>
-          <a:bodyPr/>
-          <a:lstStyle/>
-          <a:p>
-            <a:pPr lvl="1"/>
-            <a:r>
-              <a:rPr lang="de-CH" sz="1200" kern="1200" dirty="0">
-                <a:solidFill>
-                  <a:schemeClr val="tx1"/>
-                </a:solidFill>
-                <a:effectLst/>
-                <a:latin typeface="+mn-lt"/>
-                <a:ea typeface="+mn-ea"/>
-                <a:cs typeface="+mn-cs"/>
-              </a:rPr>
-              <a:t>Laut </a:t>
-            </a:r>
-            <a:r>
-              <a:rPr lang="de-CH" sz="1200" kern="1200" dirty="0" err="1">
-                <a:solidFill>
-                  <a:schemeClr val="tx1"/>
-                </a:solidFill>
-                <a:effectLst/>
-                <a:latin typeface="+mn-lt"/>
-                <a:ea typeface="+mn-ea"/>
-                <a:cs typeface="+mn-cs"/>
-              </a:rPr>
-              <a:t>Kaggel</a:t>
-            </a:r>
-            <a:r>
-              <a:rPr lang="de-CH" sz="1200" kern="1200" dirty="0">
-                <a:solidFill>
-                  <a:schemeClr val="tx1"/>
-                </a:solidFill>
-                <a:effectLst/>
-                <a:latin typeface="+mn-lt"/>
-                <a:ea typeface="+mn-ea"/>
-                <a:cs typeface="+mn-cs"/>
-              </a:rPr>
-              <a:t> ist es die Anzahl an empfangen SMS. Doch Datensatz beinhaltet nur 0 oder 1. Max Anzahl der empfangen SMS ist also 1. Deshalb sehen wir diese Variabel als </a:t>
-            </a:r>
-            <a:r>
-              <a:rPr lang="de-CH" sz="1200" kern="1200" dirty="0" err="1">
-                <a:solidFill>
-                  <a:schemeClr val="tx1"/>
-                </a:solidFill>
-                <a:effectLst/>
-                <a:latin typeface="+mn-lt"/>
-                <a:ea typeface="+mn-ea"/>
-                <a:cs typeface="+mn-cs"/>
-              </a:rPr>
-              <a:t>Factor</a:t>
-            </a:r>
-            <a:r>
-              <a:rPr lang="de-CH" sz="1200" kern="1200" dirty="0">
-                <a:solidFill>
-                  <a:schemeClr val="tx1"/>
-                </a:solidFill>
-                <a:effectLst/>
-                <a:latin typeface="+mn-lt"/>
-                <a:ea typeface="+mn-ea"/>
-                <a:cs typeface="+mn-cs"/>
-              </a:rPr>
-              <a:t> an</a:t>
-            </a:r>
-          </a:p>
-        </p:txBody>
-      </p:sp>
-      <p:sp>
-        <p:nvSpPr>
-          <p:cNvPr id="4" name="Foliennummernplatzhalter 3"/>
-          <p:cNvSpPr>
-            <a:spLocks noGrp="1"/>
-          </p:cNvSpPr>
-          <p:nvPr>
-            <p:ph type="sldNum" sz="quarter" idx="5"/>
-          </p:nvPr>
-        </p:nvSpPr>
-        <p:spPr/>
-        <p:txBody>
-          <a:bodyPr/>
-          <a:lstStyle/>
-          <a:p>
-            <a:fld id="{A3E72A82-844A-4E08-9EB3-F7FF3B8B3A89}" type="slidenum">
-              <a:rPr lang="de-CH" smtClean="0"/>
-              <a:t>21</a:t>
-            </a:fld>
-            <a:endParaRPr lang="de-CH"/>
-          </a:p>
-        </p:txBody>
-      </p:sp>
-    </p:spTree>
-    <p:extLst>
-      <p:ext uri="{BB962C8B-B14F-4D97-AF65-F5344CB8AC3E}">
-        <p14:creationId xmlns:p14="http://schemas.microsoft.com/office/powerpoint/2010/main" val="4192086950"/>
-      </p:ext>
-    </p:extLst>
-  </p:cSld>
-  <p:clrMapOvr>
-    <a:masterClrMapping/>
-  </p:clrMapOvr>
-</p:notes>
-</file>
-
 <file path=ppt/slideLayouts/slideLayout1.xml><?xml version="1.0" encoding="utf-8"?>
 <p:sldLayout xmlns:a="http://schemas.openxmlformats.org/drawingml/2006/main" xmlns:r="http://schemas.openxmlformats.org/officeDocument/2006/relationships" xmlns:p="http://schemas.openxmlformats.org/presentationml/2006/main" preserve="1" userDrawn="1">
   <p:cSld name="Titelfolie mit Bild">
@@ -3435,7 +2802,7 @@
           <a:p>
             <a:fld id="{5AB8422D-5953-48DA-A972-63CA3EF40A3E}" type="datetimeFigureOut">
               <a:rPr lang="de-CH" smtClean="0"/>
-              <a:t>11.06.2019</a:t>
+              <a:t>12.06.2019</a:t>
             </a:fld>
             <a:endParaRPr lang="de-CH"/>
           </a:p>
@@ -3509,206 +2876,6 @@
 </file>
 
 <file path=ppt/slideLayouts/slideLayout14.xml><?xml version="1.0" encoding="utf-8"?>
-<p:sldLayout xmlns:a="http://schemas.openxmlformats.org/drawingml/2006/main" xmlns:r="http://schemas.openxmlformats.org/officeDocument/2006/relationships" xmlns:p="http://schemas.openxmlformats.org/presentationml/2006/main" type="obj">
-  <p:cSld name="Titel und Inhalt">
-    <p:spTree>
-      <p:nvGrpSpPr>
-        <p:cNvPr id="1" name=""/>
-        <p:cNvGrpSpPr/>
-        <p:nvPr/>
-      </p:nvGrpSpPr>
-      <p:grpSpPr>
-        <a:xfrm>
-          <a:off x="0" y="0"/>
-          <a:ext cx="0" cy="0"/>
-          <a:chOff x="0" y="0"/>
-          <a:chExt cx="0" cy="0"/>
-        </a:xfrm>
-      </p:grpSpPr>
-      <p:sp>
-        <p:nvSpPr>
-          <p:cNvPr id="2" name="Titel 1">
-            <a:extLst>
-              <a:ext uri="{FF2B5EF4-FFF2-40B4-BE49-F238E27FC236}">
-                <a16:creationId xmlns:a16="http://schemas.microsoft.com/office/drawing/2014/main" id="{BB4F85FB-CF3C-481F-91DD-E0C1200D0BE3}"/>
-              </a:ext>
-            </a:extLst>
-          </p:cNvPr>
-          <p:cNvSpPr>
-            <a:spLocks noGrp="1"/>
-          </p:cNvSpPr>
-          <p:nvPr>
-            <p:ph type="title"/>
-          </p:nvPr>
-        </p:nvSpPr>
-        <p:spPr/>
-        <p:txBody>
-          <a:bodyPr/>
-          <a:lstStyle/>
-          <a:p>
-            <a:r>
-              <a:rPr lang="de-DE"/>
-              <a:t>Mastertitelformat bearbeiten</a:t>
-            </a:r>
-            <a:endParaRPr lang="de-CH"/>
-          </a:p>
-        </p:txBody>
-      </p:sp>
-      <p:sp>
-        <p:nvSpPr>
-          <p:cNvPr id="3" name="Inhaltsplatzhalter 2">
-            <a:extLst>
-              <a:ext uri="{FF2B5EF4-FFF2-40B4-BE49-F238E27FC236}">
-                <a16:creationId xmlns:a16="http://schemas.microsoft.com/office/drawing/2014/main" id="{978105BF-AE47-4BC0-ABB4-2217305592EE}"/>
-              </a:ext>
-            </a:extLst>
-          </p:cNvPr>
-          <p:cNvSpPr>
-            <a:spLocks noGrp="1"/>
-          </p:cNvSpPr>
-          <p:nvPr>
-            <p:ph idx="1"/>
-          </p:nvPr>
-        </p:nvSpPr>
-        <p:spPr/>
-        <p:txBody>
-          <a:bodyPr/>
-          <a:lstStyle/>
-          <a:p>
-            <a:pPr lvl="0"/>
-            <a:r>
-              <a:rPr lang="de-DE"/>
-              <a:t>Mastertextformat bearbeiten</a:t>
-            </a:r>
-          </a:p>
-          <a:p>
-            <a:pPr lvl="1"/>
-            <a:r>
-              <a:rPr lang="de-DE"/>
-              <a:t>Zweite Ebene</a:t>
-            </a:r>
-          </a:p>
-          <a:p>
-            <a:pPr lvl="2"/>
-            <a:r>
-              <a:rPr lang="de-DE"/>
-              <a:t>Dritte Ebene</a:t>
-            </a:r>
-          </a:p>
-          <a:p>
-            <a:pPr lvl="3"/>
-            <a:r>
-              <a:rPr lang="de-DE"/>
-              <a:t>Vierte Ebene</a:t>
-            </a:r>
-          </a:p>
-          <a:p>
-            <a:pPr lvl="4"/>
-            <a:r>
-              <a:rPr lang="de-DE"/>
-              <a:t>Fünfte Ebene</a:t>
-            </a:r>
-            <a:endParaRPr lang="de-CH"/>
-          </a:p>
-        </p:txBody>
-      </p:sp>
-      <p:sp>
-        <p:nvSpPr>
-          <p:cNvPr id="4" name="Datumsplatzhalter 3">
-            <a:extLst>
-              <a:ext uri="{FF2B5EF4-FFF2-40B4-BE49-F238E27FC236}">
-                <a16:creationId xmlns:a16="http://schemas.microsoft.com/office/drawing/2014/main" id="{07D40F7C-FAF7-4443-8CB1-30BECBF022CA}"/>
-              </a:ext>
-            </a:extLst>
-          </p:cNvPr>
-          <p:cNvSpPr>
-            <a:spLocks noGrp="1"/>
-          </p:cNvSpPr>
-          <p:nvPr>
-            <p:ph type="dt" sz="half" idx="10"/>
-          </p:nvPr>
-        </p:nvSpPr>
-        <p:spPr/>
-        <p:txBody>
-          <a:bodyPr/>
-          <a:lstStyle/>
-          <a:p>
-            <a:fld id="{5AB8422D-5953-48DA-A972-63CA3EF40A3E}" type="datetimeFigureOut">
-              <a:rPr lang="de-CH" smtClean="0"/>
-              <a:t>11.06.2019</a:t>
-            </a:fld>
-            <a:endParaRPr lang="de-CH"/>
-          </a:p>
-        </p:txBody>
-      </p:sp>
-      <p:sp>
-        <p:nvSpPr>
-          <p:cNvPr id="5" name="Fußzeilenplatzhalter 4">
-            <a:extLst>
-              <a:ext uri="{FF2B5EF4-FFF2-40B4-BE49-F238E27FC236}">
-                <a16:creationId xmlns:a16="http://schemas.microsoft.com/office/drawing/2014/main" id="{483B88F6-9E19-41B5-A248-A502A9FE0E07}"/>
-              </a:ext>
-            </a:extLst>
-          </p:cNvPr>
-          <p:cNvSpPr>
-            <a:spLocks noGrp="1"/>
-          </p:cNvSpPr>
-          <p:nvPr>
-            <p:ph type="ftr" sz="quarter" idx="11"/>
-          </p:nvPr>
-        </p:nvSpPr>
-        <p:spPr/>
-        <p:txBody>
-          <a:bodyPr/>
-          <a:lstStyle/>
-          <a:p>
-            <a:endParaRPr lang="de-CH"/>
-          </a:p>
-        </p:txBody>
-      </p:sp>
-      <p:sp>
-        <p:nvSpPr>
-          <p:cNvPr id="6" name="Foliennummernplatzhalter 5">
-            <a:extLst>
-              <a:ext uri="{FF2B5EF4-FFF2-40B4-BE49-F238E27FC236}">
-                <a16:creationId xmlns:a16="http://schemas.microsoft.com/office/drawing/2014/main" id="{AA6CF598-BDFB-48F4-9E84-602C0CAB2F26}"/>
-              </a:ext>
-            </a:extLst>
-          </p:cNvPr>
-          <p:cNvSpPr>
-            <a:spLocks noGrp="1"/>
-          </p:cNvSpPr>
-          <p:nvPr>
-            <p:ph type="sldNum" sz="quarter" idx="12"/>
-          </p:nvPr>
-        </p:nvSpPr>
-        <p:spPr/>
-        <p:txBody>
-          <a:bodyPr/>
-          <a:lstStyle/>
-          <a:p>
-            <a:fld id="{9DF65773-E8AA-4458-A374-89AE55F365B8}" type="slidenum">
-              <a:rPr lang="de-CH" smtClean="0"/>
-              <a:t>‹Nr.›</a:t>
-            </a:fld>
-            <a:endParaRPr lang="de-CH"/>
-          </a:p>
-        </p:txBody>
-      </p:sp>
-    </p:spTree>
-    <p:extLst>
-      <p:ext uri="{BB962C8B-B14F-4D97-AF65-F5344CB8AC3E}">
-        <p14:creationId xmlns:p14="http://schemas.microsoft.com/office/powerpoint/2010/main" val="2964565570"/>
-      </p:ext>
-    </p:extLst>
-  </p:cSld>
-  <p:clrMapOvr>
-    <a:masterClrMapping/>
-  </p:clrMapOvr>
-</p:sldLayout>
-</file>
-
-<file path=ppt/slideLayouts/slideLayout15.xml><?xml version="1.0" encoding="utf-8"?>
 <p:sldLayout xmlns:a="http://schemas.openxmlformats.org/drawingml/2006/main" xmlns:r="http://schemas.openxmlformats.org/officeDocument/2006/relationships" xmlns:p="http://schemas.openxmlformats.org/presentationml/2006/main" type="blank">
   <p:cSld name="Leer">
     <p:spTree>
@@ -3748,7 +2915,7 @@
           <a:p>
             <a:fld id="{5AB8422D-5953-48DA-A972-63CA3EF40A3E}" type="datetimeFigureOut">
               <a:rPr lang="de-CH" smtClean="0"/>
-              <a:t>11.06.2019</a:t>
+              <a:t>12.06.2019</a:t>
             </a:fld>
             <a:endParaRPr lang="de-CH"/>
           </a:p>
@@ -7760,8 +6927,7 @@
     <p:sldLayoutId id="2147483671" r:id="rId11"/>
     <p:sldLayoutId id="2147483672" r:id="rId12"/>
     <p:sldLayoutId id="2147483673" r:id="rId13"/>
-    <p:sldLayoutId id="2147483674" r:id="rId14"/>
-    <p:sldLayoutId id="2147483676" r:id="rId15"/>
+    <p:sldLayoutId id="2147483676" r:id="rId14"/>
   </p:sldLayoutIdLst>
   <p:hf sldNum="0" hdr="0" ftr="0" dt="0"/>
   <p:txStyles>
@@ -9180,1923 +8346,6 @@
 </p:sld>
 </file>
 
-<file path=ppt/slides/slide17.xml><?xml version="1.0" encoding="utf-8"?>
-<p:sld xmlns:a="http://schemas.openxmlformats.org/drawingml/2006/main" xmlns:r="http://schemas.openxmlformats.org/officeDocument/2006/relationships" xmlns:p="http://schemas.openxmlformats.org/presentationml/2006/main">
-  <p:cSld>
-    <p:spTree>
-      <p:nvGrpSpPr>
-        <p:cNvPr id="1" name=""/>
-        <p:cNvGrpSpPr/>
-        <p:nvPr/>
-      </p:nvGrpSpPr>
-      <p:grpSpPr>
-        <a:xfrm>
-          <a:off x="0" y="0"/>
-          <a:ext cx="0" cy="0"/>
-          <a:chOff x="0" y="0"/>
-          <a:chExt cx="0" cy="0"/>
-        </a:xfrm>
-      </p:grpSpPr>
-      <p:sp>
-        <p:nvSpPr>
-          <p:cNvPr id="3" name="Titel 2">
-            <a:extLst>
-              <a:ext uri="{FF2B5EF4-FFF2-40B4-BE49-F238E27FC236}">
-                <a16:creationId xmlns:a16="http://schemas.microsoft.com/office/drawing/2014/main" id="{2F548F8C-6455-442F-BB03-5C01B7F9EB86}"/>
-              </a:ext>
-            </a:extLst>
-          </p:cNvPr>
-          <p:cNvSpPr>
-            <a:spLocks noGrp="1"/>
-          </p:cNvSpPr>
-          <p:nvPr>
-            <p:ph type="ctrTitle"/>
-          </p:nvPr>
-        </p:nvSpPr>
-        <p:spPr>
-          <a:xfrm>
-            <a:off x="959666" y="2366379"/>
-            <a:ext cx="10725621" cy="533105"/>
-          </a:xfrm>
-        </p:spPr>
-        <p:txBody>
-          <a:bodyPr/>
-          <a:lstStyle/>
-          <a:p>
-            <a:r>
-              <a:rPr lang="de-CH" sz="11500" b="1" dirty="0"/>
-              <a:t>Thierry</a:t>
-            </a:r>
-          </a:p>
-        </p:txBody>
-      </p:sp>
-      <p:sp>
-        <p:nvSpPr>
-          <p:cNvPr id="4" name="Untertitel 3">
-            <a:extLst>
-              <a:ext uri="{FF2B5EF4-FFF2-40B4-BE49-F238E27FC236}">
-                <a16:creationId xmlns:a16="http://schemas.microsoft.com/office/drawing/2014/main" id="{76B47166-0547-421D-A4AA-D940DB4A4F9A}"/>
-              </a:ext>
-            </a:extLst>
-          </p:cNvPr>
-          <p:cNvSpPr>
-            <a:spLocks noGrp="1"/>
-          </p:cNvSpPr>
-          <p:nvPr>
-            <p:ph type="subTitle" idx="1"/>
-          </p:nvPr>
-        </p:nvSpPr>
-        <p:spPr/>
-        <p:txBody>
-          <a:bodyPr/>
-          <a:lstStyle/>
-          <a:p>
-            <a:endParaRPr lang="de-CH"/>
-          </a:p>
-        </p:txBody>
-      </p:sp>
-    </p:spTree>
-    <p:extLst>
-      <p:ext uri="{BB962C8B-B14F-4D97-AF65-F5344CB8AC3E}">
-        <p14:creationId xmlns:p14="http://schemas.microsoft.com/office/powerpoint/2010/main" val="261796939"/>
-      </p:ext>
-    </p:extLst>
-  </p:cSld>
-  <p:clrMapOvr>
-    <a:masterClrMapping/>
-  </p:clrMapOvr>
-</p:sld>
-</file>
-
-<file path=ppt/slides/slide18.xml><?xml version="1.0" encoding="utf-8"?>
-<p:sld xmlns:a="http://schemas.openxmlformats.org/drawingml/2006/main" xmlns:r="http://schemas.openxmlformats.org/officeDocument/2006/relationships" xmlns:p="http://schemas.openxmlformats.org/presentationml/2006/main">
-  <p:cSld>
-    <p:spTree>
-      <p:nvGrpSpPr>
-        <p:cNvPr id="1" name=""/>
-        <p:cNvGrpSpPr/>
-        <p:nvPr/>
-      </p:nvGrpSpPr>
-      <p:grpSpPr>
-        <a:xfrm>
-          <a:off x="0" y="0"/>
-          <a:ext cx="0" cy="0"/>
-          <a:chOff x="0" y="0"/>
-          <a:chExt cx="0" cy="0"/>
-        </a:xfrm>
-      </p:grpSpPr>
-      <p:sp>
-        <p:nvSpPr>
-          <p:cNvPr id="3" name="Inhaltsplatzhalter 2">
-            <a:extLst>
-              <a:ext uri="{FF2B5EF4-FFF2-40B4-BE49-F238E27FC236}">
-                <a16:creationId xmlns:a16="http://schemas.microsoft.com/office/drawing/2014/main" id="{D0352F83-1C43-4A33-917C-F9F2A2EF1121}"/>
-              </a:ext>
-            </a:extLst>
-          </p:cNvPr>
-          <p:cNvSpPr>
-            <a:spLocks noGrp="1"/>
-          </p:cNvSpPr>
-          <p:nvPr>
-            <p:ph idx="1"/>
-          </p:nvPr>
-        </p:nvSpPr>
-        <p:spPr>
-          <a:xfrm>
-            <a:off x="1068721" y="1057230"/>
-            <a:ext cx="10515600" cy="4351338"/>
-          </a:xfrm>
-        </p:spPr>
-        <p:txBody>
-          <a:bodyPr/>
-          <a:lstStyle/>
-          <a:p>
-            <a:r>
-              <a:rPr lang="de-DE" altLang="de-DE" b="1" dirty="0" err="1">
-                <a:solidFill>
-                  <a:srgbClr val="000000"/>
-                </a:solidFill>
-                <a:latin typeface="Lucida Console" panose="020B0609040504020204" pitchFamily="49" charset="0"/>
-              </a:rPr>
-              <a:t>PatientId</a:t>
-            </a:r>
-            <a:r>
-              <a:rPr lang="de-DE" altLang="de-DE" dirty="0">
-                <a:solidFill>
-                  <a:srgbClr val="000000"/>
-                </a:solidFill>
-                <a:latin typeface="Lucida Console" panose="020B0609040504020204" pitchFamily="49" charset="0"/>
-              </a:rPr>
-              <a:t> </a:t>
-            </a:r>
-            <a:r>
-              <a:rPr lang="de-DE" altLang="de-DE" i="1" dirty="0">
-                <a:solidFill>
-                  <a:srgbClr val="949494"/>
-                </a:solidFill>
-                <a:latin typeface="Lucida Console" panose="020B0609040504020204" pitchFamily="49" charset="0"/>
-              </a:rPr>
-              <a:t>&lt;</a:t>
-            </a:r>
-            <a:r>
-              <a:rPr lang="de-DE" altLang="de-DE" i="1" dirty="0" err="1">
-                <a:solidFill>
-                  <a:srgbClr val="949494"/>
-                </a:solidFill>
-                <a:latin typeface="Lucida Console" panose="020B0609040504020204" pitchFamily="49" charset="0"/>
-              </a:rPr>
-              <a:t>dbl</a:t>
-            </a:r>
-            <a:r>
-              <a:rPr lang="de-DE" altLang="de-DE" i="1" dirty="0">
-                <a:solidFill>
-                  <a:srgbClr val="949494"/>
-                </a:solidFill>
-                <a:latin typeface="Lucida Console" panose="020B0609040504020204" pitchFamily="49" charset="0"/>
-              </a:rPr>
-              <a:t>&gt;</a:t>
-            </a:r>
-            <a:r>
-              <a:rPr lang="de-DE" altLang="de-DE" dirty="0">
-                <a:solidFill>
-                  <a:srgbClr val="000000"/>
-                </a:solidFill>
-                <a:latin typeface="Lucida Console" panose="020B0609040504020204" pitchFamily="49" charset="0"/>
-              </a:rPr>
-              <a:t> 2.987250e+13, 5.589978e+14</a:t>
-            </a:r>
-          </a:p>
-          <a:p>
-            <a:endParaRPr lang="de-DE" dirty="0">
-              <a:solidFill>
-                <a:srgbClr val="000000"/>
-              </a:solidFill>
-              <a:latin typeface="Lucida Console" panose="020B0609040504020204" pitchFamily="49" charset="0"/>
-            </a:endParaRPr>
-          </a:p>
-          <a:p>
-            <a:r>
-              <a:rPr lang="de-DE" altLang="de-DE" b="1" dirty="0" err="1">
-                <a:solidFill>
-                  <a:srgbClr val="000000"/>
-                </a:solidFill>
-                <a:latin typeface="Lucida Console" panose="020B0609040504020204" pitchFamily="49" charset="0"/>
-              </a:rPr>
-              <a:t>AppointmentID</a:t>
-            </a:r>
-            <a:r>
-              <a:rPr lang="de-DE" altLang="de-DE" dirty="0">
-                <a:solidFill>
-                  <a:srgbClr val="000000"/>
-                </a:solidFill>
-                <a:latin typeface="Lucida Console" panose="020B0609040504020204" pitchFamily="49" charset="0"/>
-              </a:rPr>
-              <a:t> </a:t>
-            </a:r>
-            <a:r>
-              <a:rPr lang="de-DE" altLang="de-DE" i="1" dirty="0">
-                <a:solidFill>
-                  <a:srgbClr val="949494"/>
-                </a:solidFill>
-                <a:latin typeface="Lucida Console" panose="020B0609040504020204" pitchFamily="49" charset="0"/>
-              </a:rPr>
-              <a:t>&lt;</a:t>
-            </a:r>
-            <a:r>
-              <a:rPr lang="de-DE" altLang="de-DE" i="1" dirty="0" err="1">
-                <a:solidFill>
-                  <a:srgbClr val="949494"/>
-                </a:solidFill>
-                <a:latin typeface="Lucida Console" panose="020B0609040504020204" pitchFamily="49" charset="0"/>
-              </a:rPr>
-              <a:t>int</a:t>
-            </a:r>
-            <a:r>
-              <a:rPr lang="de-DE" altLang="de-DE" i="1" dirty="0">
-                <a:solidFill>
-                  <a:srgbClr val="949494"/>
-                </a:solidFill>
-                <a:latin typeface="Lucida Console" panose="020B0609040504020204" pitchFamily="49" charset="0"/>
-              </a:rPr>
-              <a:t>&gt;</a:t>
-            </a:r>
-            <a:r>
-              <a:rPr lang="de-DE" altLang="de-DE" dirty="0">
-                <a:solidFill>
-                  <a:srgbClr val="000000"/>
-                </a:solidFill>
-                <a:latin typeface="Lucida Console" panose="020B0609040504020204" pitchFamily="49" charset="0"/>
-              </a:rPr>
-              <a:t> 5642903, 5642503</a:t>
-            </a:r>
-          </a:p>
-          <a:p>
-            <a:endParaRPr lang="de-DE" altLang="de-DE" b="1" dirty="0">
-              <a:solidFill>
-                <a:srgbClr val="000000"/>
-              </a:solidFill>
-              <a:latin typeface="Lucida Console" panose="020B0609040504020204" pitchFamily="49" charset="0"/>
-            </a:endParaRPr>
-          </a:p>
-          <a:p>
-            <a:r>
-              <a:rPr lang="de-DE" altLang="de-DE" b="1" dirty="0">
-                <a:solidFill>
-                  <a:srgbClr val="000000"/>
-                </a:solidFill>
-                <a:latin typeface="Lucida Console" panose="020B0609040504020204" pitchFamily="49" charset="0"/>
-              </a:rPr>
-              <a:t>Gender</a:t>
-            </a:r>
-            <a:r>
-              <a:rPr lang="de-DE" altLang="de-DE" dirty="0">
-                <a:solidFill>
-                  <a:srgbClr val="000000"/>
-                </a:solidFill>
-                <a:latin typeface="Lucida Console" panose="020B0609040504020204" pitchFamily="49" charset="0"/>
-              </a:rPr>
-              <a:t> </a:t>
-            </a:r>
-            <a:r>
-              <a:rPr lang="de-DE" altLang="de-DE" i="1" dirty="0">
-                <a:solidFill>
-                  <a:srgbClr val="949494"/>
-                </a:solidFill>
-                <a:latin typeface="Lucida Console" panose="020B0609040504020204" pitchFamily="49" charset="0"/>
-              </a:rPr>
-              <a:t>&lt;</a:t>
-            </a:r>
-            <a:r>
-              <a:rPr lang="de-DE" altLang="de-DE" i="1" dirty="0" err="1">
-                <a:solidFill>
-                  <a:srgbClr val="949494"/>
-                </a:solidFill>
-                <a:latin typeface="Lucida Console" panose="020B0609040504020204" pitchFamily="49" charset="0"/>
-              </a:rPr>
-              <a:t>fct</a:t>
-            </a:r>
-            <a:r>
-              <a:rPr lang="de-DE" altLang="de-DE" i="1" dirty="0">
-                <a:solidFill>
-                  <a:srgbClr val="949494"/>
-                </a:solidFill>
-                <a:latin typeface="Lucida Console" panose="020B0609040504020204" pitchFamily="49" charset="0"/>
-              </a:rPr>
-              <a:t>&gt;</a:t>
-            </a:r>
-            <a:r>
-              <a:rPr lang="de-DE" altLang="de-DE" dirty="0">
-                <a:solidFill>
-                  <a:srgbClr val="000000"/>
-                </a:solidFill>
-                <a:latin typeface="Lucida Console" panose="020B0609040504020204" pitchFamily="49" charset="0"/>
-              </a:rPr>
-              <a:t> F, M, F, F, F, F, F</a:t>
-            </a:r>
-          </a:p>
-          <a:p>
-            <a:endParaRPr lang="de-DE" altLang="de-DE" dirty="0">
-              <a:solidFill>
-                <a:srgbClr val="000000"/>
-              </a:solidFill>
-              <a:latin typeface="Lucida Console" panose="020B0609040504020204" pitchFamily="49" charset="0"/>
-            </a:endParaRPr>
-          </a:p>
-          <a:p>
-            <a:r>
-              <a:rPr lang="de-DE" altLang="de-DE" b="1" dirty="0">
-                <a:solidFill>
-                  <a:srgbClr val="000000"/>
-                </a:solidFill>
-                <a:latin typeface="Lucida Console" panose="020B0609040504020204" pitchFamily="49" charset="0"/>
-              </a:rPr>
-              <a:t>Age</a:t>
-            </a:r>
-            <a:r>
-              <a:rPr lang="de-DE" altLang="de-DE" dirty="0">
-                <a:solidFill>
-                  <a:srgbClr val="000000"/>
-                </a:solidFill>
-                <a:latin typeface="Lucida Console" panose="020B0609040504020204" pitchFamily="49" charset="0"/>
-              </a:rPr>
-              <a:t> </a:t>
-            </a:r>
-            <a:r>
-              <a:rPr lang="de-DE" altLang="de-DE" i="1" dirty="0">
-                <a:solidFill>
-                  <a:srgbClr val="949494"/>
-                </a:solidFill>
-                <a:latin typeface="Lucida Console" panose="020B0609040504020204" pitchFamily="49" charset="0"/>
-              </a:rPr>
-              <a:t>&lt;</a:t>
-            </a:r>
-            <a:r>
-              <a:rPr lang="de-DE" altLang="de-DE" i="1" dirty="0" err="1">
-                <a:solidFill>
-                  <a:srgbClr val="949494"/>
-                </a:solidFill>
-                <a:latin typeface="Lucida Console" panose="020B0609040504020204" pitchFamily="49" charset="0"/>
-              </a:rPr>
-              <a:t>int</a:t>
-            </a:r>
-            <a:r>
-              <a:rPr lang="de-DE" altLang="de-DE" i="1" dirty="0">
-                <a:solidFill>
-                  <a:srgbClr val="949494"/>
-                </a:solidFill>
-                <a:latin typeface="Lucida Console" panose="020B0609040504020204" pitchFamily="49" charset="0"/>
-              </a:rPr>
-              <a:t>&gt;</a:t>
-            </a:r>
-            <a:r>
-              <a:rPr lang="de-DE" altLang="de-DE" dirty="0">
-                <a:solidFill>
-                  <a:srgbClr val="000000"/>
-                </a:solidFill>
-                <a:latin typeface="Lucida Console" panose="020B0609040504020204" pitchFamily="49" charset="0"/>
-              </a:rPr>
-              <a:t> 62, 56, 62, 8, 56, 76, 23</a:t>
-            </a:r>
-          </a:p>
-          <a:p>
-            <a:pPr lvl="1"/>
-            <a:r>
-              <a:rPr lang="de-DE" altLang="de-DE" dirty="0" err="1">
-                <a:solidFill>
-                  <a:srgbClr val="000000"/>
-                </a:solidFill>
-                <a:latin typeface="Lucida Console" panose="020B0609040504020204" pitchFamily="49" charset="0"/>
-              </a:rPr>
-              <a:t>range</a:t>
-            </a:r>
-            <a:r>
-              <a:rPr lang="de-DE" altLang="de-DE" dirty="0">
-                <a:solidFill>
-                  <a:srgbClr val="000000"/>
-                </a:solidFill>
-                <a:latin typeface="Lucida Console" panose="020B0609040504020204" pitchFamily="49" charset="0"/>
-              </a:rPr>
-              <a:t>(</a:t>
-            </a:r>
-            <a:r>
-              <a:rPr lang="de-DE" altLang="de-DE" dirty="0" err="1">
-                <a:solidFill>
-                  <a:srgbClr val="000000"/>
-                </a:solidFill>
-                <a:latin typeface="Lucida Console" panose="020B0609040504020204" pitchFamily="49" charset="0"/>
-              </a:rPr>
-              <a:t>data$Age</a:t>
-            </a:r>
-            <a:r>
-              <a:rPr lang="de-DE" altLang="de-DE" dirty="0">
-                <a:solidFill>
-                  <a:srgbClr val="000000"/>
-                </a:solidFill>
-                <a:latin typeface="Lucida Console" panose="020B0609040504020204" pitchFamily="49" charset="0"/>
-              </a:rPr>
-              <a:t>)</a:t>
-            </a:r>
-            <a:br>
-              <a:rPr lang="de-DE" altLang="de-DE" dirty="0">
-                <a:solidFill>
-                  <a:srgbClr val="000000"/>
-                </a:solidFill>
-                <a:latin typeface="Lucida Console" panose="020B0609040504020204" pitchFamily="49" charset="0"/>
-              </a:rPr>
-            </a:br>
-            <a:r>
-              <a:rPr lang="de-DE" altLang="de-DE" dirty="0">
-                <a:solidFill>
-                  <a:srgbClr val="000000"/>
-                </a:solidFill>
-                <a:latin typeface="Lucida Console" panose="020B0609040504020204" pitchFamily="49" charset="0"/>
-              </a:rPr>
-              <a:t>-1 115</a:t>
-            </a:r>
-            <a:endParaRPr lang="de-DE" altLang="de-DE" dirty="0">
-              <a:latin typeface="Arial" panose="020B0604020202020204" pitchFamily="34" charset="0"/>
-            </a:endParaRPr>
-          </a:p>
-          <a:p>
-            <a:endParaRPr lang="de-DE" altLang="de-DE" dirty="0">
-              <a:solidFill>
-                <a:srgbClr val="000000"/>
-              </a:solidFill>
-              <a:latin typeface="Lucida Console" panose="020B0609040504020204" pitchFamily="49" charset="0"/>
-            </a:endParaRPr>
-          </a:p>
-          <a:p>
-            <a:endParaRPr lang="de-DE" altLang="de-DE" dirty="0">
-              <a:latin typeface="Arial" panose="020B0604020202020204" pitchFamily="34" charset="0"/>
-            </a:endParaRPr>
-          </a:p>
-          <a:p>
-            <a:endParaRPr lang="de-DE" altLang="de-DE" sz="5400" dirty="0">
-              <a:latin typeface="Arial" panose="020B0604020202020204" pitchFamily="34" charset="0"/>
-            </a:endParaRPr>
-          </a:p>
-          <a:p>
-            <a:pPr marL="0" indent="0">
-              <a:buNone/>
-            </a:pPr>
-            <a:endParaRPr lang="de-CH" dirty="0"/>
-          </a:p>
-        </p:txBody>
-      </p:sp>
-      <p:sp>
-        <p:nvSpPr>
-          <p:cNvPr id="4" name="Rectangle 1">
-            <a:extLst>
-              <a:ext uri="{FF2B5EF4-FFF2-40B4-BE49-F238E27FC236}">
-                <a16:creationId xmlns:a16="http://schemas.microsoft.com/office/drawing/2014/main" id="{AECBCE39-4A5D-4D39-B1D8-E4D2C1A76168}"/>
-              </a:ext>
-            </a:extLst>
-          </p:cNvPr>
-          <p:cNvSpPr>
-            <a:spLocks noChangeArrowheads="1"/>
-          </p:cNvSpPr>
-          <p:nvPr/>
-        </p:nvSpPr>
-        <p:spPr bwMode="auto">
-          <a:xfrm>
-            <a:off x="230521" y="1227337"/>
-            <a:ext cx="65" cy="276999"/>
-          </a:xfrm>
-          <a:prstGeom prst="rect">
-            <a:avLst/>
-          </a:prstGeom>
-          <a:solidFill>
-            <a:srgbClr val="FFFFFF"/>
-          </a:solidFill>
-          <a:ln>
-            <a:noFill/>
-          </a:ln>
-          <a:effectLst/>
-          <a:extLst>
-            <a:ext uri="{91240B29-F687-4F45-9708-019B960494DF}">
-              <a14:hiddenLine xmlns:a14="http://schemas.microsoft.com/office/drawing/2010/main" w="9525">
-                <a:solidFill>
-                  <a:schemeClr val="tx1"/>
-                </a:solidFill>
-                <a:miter lim="800000"/>
-                <a:headEnd/>
-                <a:tailEnd/>
-              </a14:hiddenLine>
-            </a:ext>
-            <a:ext uri="{AF507438-7753-43E0-B8FC-AC1667EBCBE1}">
-              <a14:hiddenEffects xmlns:a14="http://schemas.microsoft.com/office/drawing/2010/main">
-                <a:effectLst>
-                  <a:outerShdw dist="35921" dir="2700000" algn="ctr" rotWithShape="0">
-                    <a:schemeClr val="bg2"/>
-                  </a:outerShdw>
-                </a:effectLst>
-              </a14:hiddenEffects>
-            </a:ext>
-          </a:extLst>
-        </p:spPr>
-        <p:txBody>
-          <a:bodyPr vert="horz" wrap="none" lIns="0" tIns="0" rIns="0" bIns="0" numCol="1" anchor="ctr" anchorCtr="0" compatLnSpc="1">
-            <a:prstTxWarp prst="textNoShape">
-              <a:avLst/>
-            </a:prstTxWarp>
-            <a:spAutoFit/>
-          </a:bodyPr>
-          <a:lstStyle/>
-          <a:p>
-            <a:pPr marL="0" marR="0" lvl="0" indent="0" algn="l" defTabSz="914400" rtl="0" eaLnBrk="0" fontAlgn="base" latinLnBrk="0" hangingPunct="0">
-              <a:lnSpc>
-                <a:spcPct val="100000"/>
-              </a:lnSpc>
-              <a:spcBef>
-                <a:spcPct val="0"/>
-              </a:spcBef>
-              <a:spcAft>
-                <a:spcPct val="0"/>
-              </a:spcAft>
-              <a:buClrTx/>
-              <a:buSzTx/>
-              <a:buFontTx/>
-              <a:buNone/>
-              <a:tabLst/>
-            </a:pPr>
-            <a:endParaRPr kumimoji="0" lang="de-DE" altLang="de-DE" sz="1800" b="0" i="0" u="none" strike="noStrike" cap="none" normalizeH="0" baseline="0" dirty="0">
-              <a:ln>
-                <a:noFill/>
-              </a:ln>
-              <a:solidFill>
-                <a:schemeClr val="tx1"/>
-              </a:solidFill>
-              <a:effectLst/>
-              <a:latin typeface="Arial" panose="020B0604020202020204" pitchFamily="34" charset="0"/>
-            </a:endParaRPr>
-          </a:p>
-        </p:txBody>
-      </p:sp>
-      <p:sp>
-        <p:nvSpPr>
-          <p:cNvPr id="5" name="Rectangle 2">
-            <a:extLst>
-              <a:ext uri="{FF2B5EF4-FFF2-40B4-BE49-F238E27FC236}">
-                <a16:creationId xmlns:a16="http://schemas.microsoft.com/office/drawing/2014/main" id="{34C956E7-7C2C-4DFF-8501-6175ED8D37B9}"/>
-              </a:ext>
-            </a:extLst>
-          </p:cNvPr>
-          <p:cNvSpPr>
-            <a:spLocks noChangeArrowheads="1"/>
-          </p:cNvSpPr>
-          <p:nvPr/>
-        </p:nvSpPr>
-        <p:spPr bwMode="auto">
-          <a:xfrm>
-            <a:off x="0" y="90100"/>
-            <a:ext cx="65" cy="276999"/>
-          </a:xfrm>
-          <a:prstGeom prst="rect">
-            <a:avLst/>
-          </a:prstGeom>
-          <a:solidFill>
-            <a:srgbClr val="FFFFFF"/>
-          </a:solidFill>
-          <a:ln>
-            <a:noFill/>
-          </a:ln>
-          <a:effectLst/>
-          <a:extLst>
-            <a:ext uri="{91240B29-F687-4F45-9708-019B960494DF}">
-              <a14:hiddenLine xmlns:a14="http://schemas.microsoft.com/office/drawing/2010/main" w="9525">
-                <a:solidFill>
-                  <a:schemeClr val="tx1"/>
-                </a:solidFill>
-                <a:miter lim="800000"/>
-                <a:headEnd/>
-                <a:tailEnd/>
-              </a14:hiddenLine>
-            </a:ext>
-            <a:ext uri="{AF507438-7753-43E0-B8FC-AC1667EBCBE1}">
-              <a14:hiddenEffects xmlns:a14="http://schemas.microsoft.com/office/drawing/2010/main">
-                <a:effectLst>
-                  <a:outerShdw dist="35921" dir="2700000" algn="ctr" rotWithShape="0">
-                    <a:schemeClr val="bg2"/>
-                  </a:outerShdw>
-                </a:effectLst>
-              </a14:hiddenEffects>
-            </a:ext>
-          </a:extLst>
-        </p:spPr>
-        <p:txBody>
-          <a:bodyPr vert="horz" wrap="none" lIns="0" tIns="0" rIns="0" bIns="0" numCol="1" anchor="ctr" anchorCtr="0" compatLnSpc="1">
-            <a:prstTxWarp prst="textNoShape">
-              <a:avLst/>
-            </a:prstTxWarp>
-            <a:spAutoFit/>
-          </a:bodyPr>
-          <a:lstStyle/>
-          <a:p>
-            <a:pPr marL="0" marR="0" lvl="0" indent="0" algn="l" defTabSz="914400" rtl="0" eaLnBrk="0" fontAlgn="base" latinLnBrk="0" hangingPunct="0">
-              <a:lnSpc>
-                <a:spcPct val="100000"/>
-              </a:lnSpc>
-              <a:spcBef>
-                <a:spcPct val="0"/>
-              </a:spcBef>
-              <a:spcAft>
-                <a:spcPct val="0"/>
-              </a:spcAft>
-              <a:buClrTx/>
-              <a:buSzTx/>
-              <a:buFontTx/>
-              <a:buNone/>
-              <a:tabLst/>
-            </a:pPr>
-            <a:endParaRPr kumimoji="0" lang="de-DE" altLang="de-DE" sz="1800" b="0" i="0" u="none" strike="noStrike" cap="none" normalizeH="0" baseline="0" dirty="0">
-              <a:ln>
-                <a:noFill/>
-              </a:ln>
-              <a:solidFill>
-                <a:schemeClr val="tx1"/>
-              </a:solidFill>
-              <a:effectLst/>
-              <a:latin typeface="Arial" panose="020B0604020202020204" pitchFamily="34" charset="0"/>
-            </a:endParaRPr>
-          </a:p>
-        </p:txBody>
-      </p:sp>
-      <p:sp>
-        <p:nvSpPr>
-          <p:cNvPr id="6" name="Rectangle 3">
-            <a:extLst>
-              <a:ext uri="{FF2B5EF4-FFF2-40B4-BE49-F238E27FC236}">
-                <a16:creationId xmlns:a16="http://schemas.microsoft.com/office/drawing/2014/main" id="{DDB4CFAD-1CB2-484B-B52A-A11DECF47AFE}"/>
-              </a:ext>
-            </a:extLst>
-          </p:cNvPr>
-          <p:cNvSpPr>
-            <a:spLocks noChangeArrowheads="1"/>
-          </p:cNvSpPr>
-          <p:nvPr/>
-        </p:nvSpPr>
-        <p:spPr bwMode="auto">
-          <a:xfrm>
-            <a:off x="0" y="90100"/>
-            <a:ext cx="65" cy="276999"/>
-          </a:xfrm>
-          <a:prstGeom prst="rect">
-            <a:avLst/>
-          </a:prstGeom>
-          <a:solidFill>
-            <a:srgbClr val="FFFFFF"/>
-          </a:solidFill>
-          <a:ln>
-            <a:noFill/>
-          </a:ln>
-          <a:effectLst/>
-          <a:extLst>
-            <a:ext uri="{91240B29-F687-4F45-9708-019B960494DF}">
-              <a14:hiddenLine xmlns:a14="http://schemas.microsoft.com/office/drawing/2010/main" w="9525">
-                <a:solidFill>
-                  <a:schemeClr val="tx1"/>
-                </a:solidFill>
-                <a:miter lim="800000"/>
-                <a:headEnd/>
-                <a:tailEnd/>
-              </a14:hiddenLine>
-            </a:ext>
-            <a:ext uri="{AF507438-7753-43E0-B8FC-AC1667EBCBE1}">
-              <a14:hiddenEffects xmlns:a14="http://schemas.microsoft.com/office/drawing/2010/main">
-                <a:effectLst>
-                  <a:outerShdw dist="35921" dir="2700000" algn="ctr" rotWithShape="0">
-                    <a:schemeClr val="bg2"/>
-                  </a:outerShdw>
-                </a:effectLst>
-              </a14:hiddenEffects>
-            </a:ext>
-          </a:extLst>
-        </p:spPr>
-        <p:txBody>
-          <a:bodyPr vert="horz" wrap="none" lIns="0" tIns="0" rIns="0" bIns="0" numCol="1" anchor="ctr" anchorCtr="0" compatLnSpc="1">
-            <a:prstTxWarp prst="textNoShape">
-              <a:avLst/>
-            </a:prstTxWarp>
-            <a:spAutoFit/>
-          </a:bodyPr>
-          <a:lstStyle/>
-          <a:p>
-            <a:pPr marL="0" marR="0" lvl="0" indent="0" algn="l" defTabSz="914400" rtl="0" eaLnBrk="0" fontAlgn="base" latinLnBrk="0" hangingPunct="0">
-              <a:lnSpc>
-                <a:spcPct val="100000"/>
-              </a:lnSpc>
-              <a:spcBef>
-                <a:spcPct val="0"/>
-              </a:spcBef>
-              <a:spcAft>
-                <a:spcPct val="0"/>
-              </a:spcAft>
-              <a:buClrTx/>
-              <a:buSzTx/>
-              <a:buFontTx/>
-              <a:buNone/>
-              <a:tabLst/>
-            </a:pPr>
-            <a:endParaRPr kumimoji="0" lang="de-DE" altLang="de-DE" sz="1800" b="0" i="0" u="none" strike="noStrike" cap="none" normalizeH="0" baseline="0" dirty="0">
-              <a:ln>
-                <a:noFill/>
-              </a:ln>
-              <a:solidFill>
-                <a:schemeClr val="tx1"/>
-              </a:solidFill>
-              <a:effectLst/>
-              <a:latin typeface="Arial" panose="020B0604020202020204" pitchFamily="34" charset="0"/>
-            </a:endParaRPr>
-          </a:p>
-        </p:txBody>
-      </p:sp>
-      <p:sp>
-        <p:nvSpPr>
-          <p:cNvPr id="7" name="Rectangle 4">
-            <a:extLst>
-              <a:ext uri="{FF2B5EF4-FFF2-40B4-BE49-F238E27FC236}">
-                <a16:creationId xmlns:a16="http://schemas.microsoft.com/office/drawing/2014/main" id="{63D3B991-BD06-41B7-A616-A01CE2EE2173}"/>
-              </a:ext>
-            </a:extLst>
-          </p:cNvPr>
-          <p:cNvSpPr>
-            <a:spLocks noChangeArrowheads="1"/>
-          </p:cNvSpPr>
-          <p:nvPr/>
-        </p:nvSpPr>
-        <p:spPr bwMode="auto">
-          <a:xfrm>
-            <a:off x="0" y="90100"/>
-            <a:ext cx="65" cy="276999"/>
-          </a:xfrm>
-          <a:prstGeom prst="rect">
-            <a:avLst/>
-          </a:prstGeom>
-          <a:solidFill>
-            <a:srgbClr val="FFFFFF"/>
-          </a:solidFill>
-          <a:ln>
-            <a:noFill/>
-          </a:ln>
-          <a:effectLst/>
-          <a:extLst>
-            <a:ext uri="{91240B29-F687-4F45-9708-019B960494DF}">
-              <a14:hiddenLine xmlns:a14="http://schemas.microsoft.com/office/drawing/2010/main" w="9525">
-                <a:solidFill>
-                  <a:schemeClr val="tx1"/>
-                </a:solidFill>
-                <a:miter lim="800000"/>
-                <a:headEnd/>
-                <a:tailEnd/>
-              </a14:hiddenLine>
-            </a:ext>
-            <a:ext uri="{AF507438-7753-43E0-B8FC-AC1667EBCBE1}">
-              <a14:hiddenEffects xmlns:a14="http://schemas.microsoft.com/office/drawing/2010/main">
-                <a:effectLst>
-                  <a:outerShdw dist="35921" dir="2700000" algn="ctr" rotWithShape="0">
-                    <a:schemeClr val="bg2"/>
-                  </a:outerShdw>
-                </a:effectLst>
-              </a14:hiddenEffects>
-            </a:ext>
-          </a:extLst>
-        </p:spPr>
-        <p:txBody>
-          <a:bodyPr vert="horz" wrap="none" lIns="0" tIns="0" rIns="0" bIns="0" numCol="1" anchor="ctr" anchorCtr="0" compatLnSpc="1">
-            <a:prstTxWarp prst="textNoShape">
-              <a:avLst/>
-            </a:prstTxWarp>
-            <a:spAutoFit/>
-          </a:bodyPr>
-          <a:lstStyle/>
-          <a:p>
-            <a:pPr marL="0" marR="0" lvl="0" indent="0" algn="l" defTabSz="914400" rtl="0" eaLnBrk="0" fontAlgn="base" latinLnBrk="0" hangingPunct="0">
-              <a:lnSpc>
-                <a:spcPct val="100000"/>
-              </a:lnSpc>
-              <a:spcBef>
-                <a:spcPct val="0"/>
-              </a:spcBef>
-              <a:spcAft>
-                <a:spcPct val="0"/>
-              </a:spcAft>
-              <a:buClrTx/>
-              <a:buSzTx/>
-              <a:buFontTx/>
-              <a:buNone/>
-              <a:tabLst/>
-            </a:pPr>
-            <a:endParaRPr kumimoji="0" lang="de-DE" altLang="de-DE" sz="1800" b="0" i="0" u="none" strike="noStrike" cap="none" normalizeH="0" baseline="0" dirty="0">
-              <a:ln>
-                <a:noFill/>
-              </a:ln>
-              <a:solidFill>
-                <a:schemeClr val="tx1"/>
-              </a:solidFill>
-              <a:effectLst/>
-              <a:latin typeface="Arial" panose="020B0604020202020204" pitchFamily="34" charset="0"/>
-            </a:endParaRPr>
-          </a:p>
-        </p:txBody>
-      </p:sp>
-      <p:pic>
-        <p:nvPicPr>
-          <p:cNvPr id="8" name="Grafik 7">
-            <a:extLst>
-              <a:ext uri="{FF2B5EF4-FFF2-40B4-BE49-F238E27FC236}">
-                <a16:creationId xmlns:a16="http://schemas.microsoft.com/office/drawing/2014/main" id="{CC51BDEF-4128-410E-A50D-BA12440B1DBF}"/>
-              </a:ext>
-            </a:extLst>
-          </p:cNvPr>
-          <p:cNvPicPr>
-            <a:picLocks noChangeAspect="1"/>
-          </p:cNvPicPr>
-          <p:nvPr/>
-        </p:nvPicPr>
-        <p:blipFill>
-          <a:blip r:embed="rId3"/>
-          <a:stretch>
-            <a:fillRect/>
-          </a:stretch>
-        </p:blipFill>
-        <p:spPr>
-          <a:xfrm>
-            <a:off x="7186762" y="692413"/>
-            <a:ext cx="6204318" cy="5361757"/>
-          </a:xfrm>
-          <a:prstGeom prst="rect">
-            <a:avLst/>
-          </a:prstGeom>
-          <a:ln>
-            <a:noFill/>
-          </a:ln>
-          <a:effectLst>
-            <a:outerShdw blurRad="292100" dist="139700" dir="2700000" algn="tl" rotWithShape="0">
-              <a:srgbClr val="333333">
-                <a:alpha val="65000"/>
-              </a:srgbClr>
-            </a:outerShdw>
-          </a:effectLst>
-        </p:spPr>
-      </p:pic>
-      <p:sp>
-        <p:nvSpPr>
-          <p:cNvPr id="9" name="Rechteck: abgerundete Ecken 8">
-            <a:extLst>
-              <a:ext uri="{FF2B5EF4-FFF2-40B4-BE49-F238E27FC236}">
-                <a16:creationId xmlns:a16="http://schemas.microsoft.com/office/drawing/2014/main" id="{3EC25BE6-A306-4A8C-9F51-4CB083F33DAE}"/>
-              </a:ext>
-            </a:extLst>
-          </p:cNvPr>
-          <p:cNvSpPr/>
-          <p:nvPr/>
-        </p:nvSpPr>
-        <p:spPr>
-          <a:xfrm>
-            <a:off x="6096001" y="3181191"/>
-            <a:ext cx="4192920" cy="384202"/>
-          </a:xfrm>
-          <a:prstGeom prst="roundRect">
-            <a:avLst/>
-          </a:prstGeom>
-          <a:solidFill>
-            <a:schemeClr val="accent4">
-              <a:alpha val="50000"/>
-            </a:schemeClr>
-          </a:solidFill>
-          <a:ln>
-            <a:noFill/>
-          </a:ln>
-        </p:spPr>
-        <p:style>
-          <a:lnRef idx="0">
-            <a:scrgbClr r="0" g="0" b="0"/>
-          </a:lnRef>
-          <a:fillRef idx="0">
-            <a:scrgbClr r="0" g="0" b="0"/>
-          </a:fillRef>
-          <a:effectRef idx="0">
-            <a:scrgbClr r="0" g="0" b="0"/>
-          </a:effectRef>
-          <a:fontRef idx="minor">
-            <a:schemeClr val="lt1"/>
-          </a:fontRef>
-        </p:style>
-        <p:txBody>
-          <a:bodyPr rtlCol="0" anchor="ctr"/>
-          <a:lstStyle/>
-          <a:p>
-            <a:pPr algn="ctr"/>
-            <a:endParaRPr lang="de-CH" dirty="0"/>
-          </a:p>
-        </p:txBody>
-      </p:sp>
-    </p:spTree>
-    <p:extLst>
-      <p:ext uri="{BB962C8B-B14F-4D97-AF65-F5344CB8AC3E}">
-        <p14:creationId xmlns:p14="http://schemas.microsoft.com/office/powerpoint/2010/main" val="2671915956"/>
-      </p:ext>
-    </p:extLst>
-  </p:cSld>
-  <p:clrMapOvr>
-    <a:masterClrMapping/>
-  </p:clrMapOvr>
-  <p:timing>
-    <p:tnLst>
-      <p:par>
-        <p:cTn id="1" dur="indefinite" restart="never" nodeType="tmRoot">
-          <p:childTnLst>
-            <p:seq concurrent="1" nextAc="seek">
-              <p:cTn id="2" dur="indefinite" nodeType="mainSeq">
-                <p:childTnLst>
-                  <p:par>
-                    <p:cTn id="3" fill="hold">
-                      <p:stCondLst>
-                        <p:cond delay="indefinite"/>
-                      </p:stCondLst>
-                      <p:childTnLst>
-                        <p:par>
-                          <p:cTn id="4" fill="hold">
-                            <p:stCondLst>
-                              <p:cond delay="0"/>
-                            </p:stCondLst>
-                            <p:childTnLst>
-                              <p:par>
-                                <p:cTn id="5" presetID="1" presetClass="entr" presetSubtype="0" fill="hold" nodeType="clickEffect">
-                                  <p:stCondLst>
-                                    <p:cond delay="0"/>
-                                  </p:stCondLst>
-                                  <p:childTnLst>
-                                    <p:set>
-                                      <p:cBhvr>
-                                        <p:cTn id="6" dur="1" fill="hold">
-                                          <p:stCondLst>
-                                            <p:cond delay="0"/>
-                                          </p:stCondLst>
-                                        </p:cTn>
-                                        <p:tgtEl>
-                                          <p:spTgt spid="8"/>
-                                        </p:tgtEl>
-                                        <p:attrNameLst>
-                                          <p:attrName>style.visibility</p:attrName>
-                                        </p:attrNameLst>
-                                      </p:cBhvr>
-                                      <p:to>
-                                        <p:strVal val="visible"/>
-                                      </p:to>
-                                    </p:set>
-                                  </p:childTnLst>
-                                </p:cTn>
-                              </p:par>
-                            </p:childTnLst>
-                          </p:cTn>
-                        </p:par>
-                      </p:childTnLst>
-                    </p:cTn>
-                  </p:par>
-                </p:childTnLst>
-              </p:cTn>
-              <p:prevCondLst>
-                <p:cond evt="onPrev" delay="0">
-                  <p:tgtEl>
-                    <p:sldTgt/>
-                  </p:tgtEl>
-                </p:cond>
-              </p:prevCondLst>
-              <p:nextCondLst>
-                <p:cond evt="onNext" delay="0">
-                  <p:tgtEl>
-                    <p:sldTgt/>
-                  </p:tgtEl>
-                </p:cond>
-              </p:nextCondLst>
-            </p:seq>
-          </p:childTnLst>
-        </p:cTn>
-      </p:par>
-    </p:tnLst>
-  </p:timing>
-</p:sld>
-</file>
-
-<file path=ppt/slides/slide19.xml><?xml version="1.0" encoding="utf-8"?>
-<p:sld xmlns:a="http://schemas.openxmlformats.org/drawingml/2006/main" xmlns:r="http://schemas.openxmlformats.org/officeDocument/2006/relationships" xmlns:p="http://schemas.openxmlformats.org/presentationml/2006/main">
-  <p:cSld>
-    <p:spTree>
-      <p:nvGrpSpPr>
-        <p:cNvPr id="1" name=""/>
-        <p:cNvGrpSpPr/>
-        <p:nvPr/>
-      </p:nvGrpSpPr>
-      <p:grpSpPr>
-        <a:xfrm>
-          <a:off x="0" y="0"/>
-          <a:ext cx="0" cy="0"/>
-          <a:chOff x="0" y="0"/>
-          <a:chExt cx="0" cy="0"/>
-        </a:xfrm>
-      </p:grpSpPr>
-      <p:sp>
-        <p:nvSpPr>
-          <p:cNvPr id="3" name="Inhaltsplatzhalter 2">
-            <a:extLst>
-              <a:ext uri="{FF2B5EF4-FFF2-40B4-BE49-F238E27FC236}">
-                <a16:creationId xmlns:a16="http://schemas.microsoft.com/office/drawing/2014/main" id="{D0352F83-1C43-4A33-917C-F9F2A2EF1121}"/>
-              </a:ext>
-            </a:extLst>
-          </p:cNvPr>
-          <p:cNvSpPr>
-            <a:spLocks noGrp="1"/>
-          </p:cNvSpPr>
-          <p:nvPr>
-            <p:ph idx="1"/>
-          </p:nvPr>
-        </p:nvSpPr>
-        <p:spPr>
-          <a:xfrm>
-            <a:off x="1068721" y="995758"/>
-            <a:ext cx="10515600" cy="4351338"/>
-          </a:xfrm>
-        </p:spPr>
-        <p:txBody>
-          <a:bodyPr/>
-          <a:lstStyle/>
-          <a:p>
-            <a:pPr eaLnBrk="0" fontAlgn="base" hangingPunct="0">
-              <a:lnSpc>
-                <a:spcPct val="100000"/>
-              </a:lnSpc>
-              <a:spcBef>
-                <a:spcPct val="0"/>
-              </a:spcBef>
-              <a:spcAft>
-                <a:spcPct val="0"/>
-              </a:spcAft>
-            </a:pPr>
-            <a:r>
-              <a:rPr lang="de-DE" altLang="de-DE" b="1" dirty="0" err="1">
-                <a:solidFill>
-                  <a:srgbClr val="000000"/>
-                </a:solidFill>
-                <a:latin typeface="Lucida Console" panose="020B0609040504020204" pitchFamily="49" charset="0"/>
-              </a:rPr>
-              <a:t>ScheduledDay</a:t>
-            </a:r>
-            <a:r>
-              <a:rPr lang="de-DE" altLang="de-DE" dirty="0">
-                <a:solidFill>
-                  <a:srgbClr val="000000"/>
-                </a:solidFill>
-                <a:latin typeface="Lucida Console" panose="020B0609040504020204" pitchFamily="49" charset="0"/>
-              </a:rPr>
-              <a:t> </a:t>
-            </a:r>
-            <a:r>
-              <a:rPr lang="de-DE" altLang="de-DE" i="1" dirty="0">
-                <a:solidFill>
-                  <a:srgbClr val="949494"/>
-                </a:solidFill>
-                <a:latin typeface="Lucida Console" panose="020B0609040504020204" pitchFamily="49" charset="0"/>
-              </a:rPr>
-              <a:t>&lt;</a:t>
-            </a:r>
-            <a:r>
-              <a:rPr lang="de-DE" altLang="de-DE" i="1" dirty="0" err="1">
-                <a:solidFill>
-                  <a:srgbClr val="949494"/>
-                </a:solidFill>
-                <a:latin typeface="Lucida Console" panose="020B0609040504020204" pitchFamily="49" charset="0"/>
-              </a:rPr>
-              <a:t>fct</a:t>
-            </a:r>
-            <a:r>
-              <a:rPr lang="de-DE" altLang="de-DE" i="1" dirty="0">
-                <a:solidFill>
-                  <a:srgbClr val="949494"/>
-                </a:solidFill>
-                <a:latin typeface="Lucida Console" panose="020B0609040504020204" pitchFamily="49" charset="0"/>
-              </a:rPr>
-              <a:t>&gt;</a:t>
-            </a:r>
-            <a:r>
-              <a:rPr lang="de-DE" altLang="de-DE" dirty="0">
-                <a:solidFill>
-                  <a:srgbClr val="000000"/>
-                </a:solidFill>
-                <a:latin typeface="Lucida Console" panose="020B0609040504020204" pitchFamily="49" charset="0"/>
-              </a:rPr>
-              <a:t> 2016-04-27T08:36:51Z</a:t>
-            </a:r>
-          </a:p>
-          <a:p>
-            <a:pPr lvl="1" eaLnBrk="0" fontAlgn="base" hangingPunct="0">
-              <a:lnSpc>
-                <a:spcPct val="100000"/>
-              </a:lnSpc>
-              <a:spcBef>
-                <a:spcPct val="0"/>
-              </a:spcBef>
-              <a:spcAft>
-                <a:spcPct val="0"/>
-              </a:spcAft>
-            </a:pPr>
-            <a:r>
-              <a:rPr lang="de-DE" altLang="de-DE" i="1" dirty="0">
-                <a:solidFill>
-                  <a:srgbClr val="949494"/>
-                </a:solidFill>
-                <a:latin typeface="Lucida Console" panose="020B0609040504020204" pitchFamily="49" charset="0"/>
-              </a:rPr>
-              <a:t>&lt;date&gt;</a:t>
-            </a:r>
-            <a:r>
-              <a:rPr lang="de-DE" altLang="de-DE" dirty="0">
-                <a:solidFill>
-                  <a:srgbClr val="000000"/>
-                </a:solidFill>
-                <a:latin typeface="Lucida Console" panose="020B0609040504020204" pitchFamily="49" charset="0"/>
-              </a:rPr>
-              <a:t> 2016-04-27</a:t>
-            </a:r>
-            <a:endParaRPr lang="de-DE" altLang="de-DE" dirty="0">
-              <a:latin typeface="Arial" panose="020B0604020202020204" pitchFamily="34" charset="0"/>
-            </a:endParaRPr>
-          </a:p>
-          <a:p>
-            <a:pPr marL="0" lvl="0" indent="0" eaLnBrk="0" fontAlgn="base" hangingPunct="0">
-              <a:lnSpc>
-                <a:spcPct val="100000"/>
-              </a:lnSpc>
-              <a:spcBef>
-                <a:spcPct val="0"/>
-              </a:spcBef>
-              <a:spcAft>
-                <a:spcPct val="0"/>
-              </a:spcAft>
-              <a:buNone/>
-            </a:pPr>
-            <a:endParaRPr lang="de-DE" altLang="de-DE" dirty="0">
-              <a:solidFill>
-                <a:srgbClr val="000000"/>
-              </a:solidFill>
-              <a:latin typeface="Lucida Console" panose="020B0609040504020204" pitchFamily="49" charset="0"/>
-            </a:endParaRPr>
-          </a:p>
-          <a:p>
-            <a:pPr eaLnBrk="0" fontAlgn="base" hangingPunct="0">
-              <a:lnSpc>
-                <a:spcPct val="100000"/>
-              </a:lnSpc>
-              <a:spcBef>
-                <a:spcPct val="0"/>
-              </a:spcBef>
-              <a:spcAft>
-                <a:spcPct val="0"/>
-              </a:spcAft>
-            </a:pPr>
-            <a:r>
-              <a:rPr lang="de-DE" altLang="de-DE" b="1" dirty="0" err="1">
-                <a:solidFill>
-                  <a:srgbClr val="000000"/>
-                </a:solidFill>
-                <a:latin typeface="Lucida Console" panose="020B0609040504020204" pitchFamily="49" charset="0"/>
-              </a:rPr>
-              <a:t>AppointmentDay</a:t>
-            </a:r>
-            <a:r>
-              <a:rPr lang="de-DE" altLang="de-DE" dirty="0">
-                <a:solidFill>
-                  <a:srgbClr val="000000"/>
-                </a:solidFill>
-                <a:latin typeface="Lucida Console" panose="020B0609040504020204" pitchFamily="49" charset="0"/>
-              </a:rPr>
-              <a:t> </a:t>
-            </a:r>
-            <a:r>
-              <a:rPr lang="de-DE" altLang="de-DE" i="1" dirty="0">
-                <a:solidFill>
-                  <a:srgbClr val="949494"/>
-                </a:solidFill>
-                <a:latin typeface="Lucida Console" panose="020B0609040504020204" pitchFamily="49" charset="0"/>
-              </a:rPr>
-              <a:t>&lt;</a:t>
-            </a:r>
-            <a:r>
-              <a:rPr lang="de-DE" altLang="de-DE" i="1" dirty="0" err="1">
-                <a:solidFill>
-                  <a:srgbClr val="949494"/>
-                </a:solidFill>
-                <a:latin typeface="Lucida Console" panose="020B0609040504020204" pitchFamily="49" charset="0"/>
-              </a:rPr>
-              <a:t>fct</a:t>
-            </a:r>
-            <a:r>
-              <a:rPr lang="de-DE" altLang="de-DE" i="1" dirty="0">
-                <a:solidFill>
-                  <a:srgbClr val="949494"/>
-                </a:solidFill>
-                <a:latin typeface="Lucida Console" panose="020B0609040504020204" pitchFamily="49" charset="0"/>
-              </a:rPr>
-              <a:t>&gt;</a:t>
-            </a:r>
-            <a:r>
-              <a:rPr lang="de-DE" altLang="de-DE" dirty="0">
-                <a:solidFill>
-                  <a:srgbClr val="000000"/>
-                </a:solidFill>
-                <a:latin typeface="Lucida Console" panose="020B0609040504020204" pitchFamily="49" charset="0"/>
-              </a:rPr>
-              <a:t> 2016-04-29T00:00:00Z</a:t>
-            </a:r>
-          </a:p>
-          <a:p>
-            <a:pPr lvl="1" eaLnBrk="0" fontAlgn="base" hangingPunct="0">
-              <a:lnSpc>
-                <a:spcPct val="100000"/>
-              </a:lnSpc>
-              <a:spcBef>
-                <a:spcPct val="0"/>
-              </a:spcBef>
-              <a:spcAft>
-                <a:spcPct val="0"/>
-              </a:spcAft>
-            </a:pPr>
-            <a:r>
-              <a:rPr lang="de-DE" altLang="de-DE" i="1" dirty="0">
-                <a:solidFill>
-                  <a:srgbClr val="949494"/>
-                </a:solidFill>
-                <a:latin typeface="Lucida Console" panose="020B0609040504020204" pitchFamily="49" charset="0"/>
-              </a:rPr>
-              <a:t>&lt;date&gt;</a:t>
-            </a:r>
-            <a:r>
-              <a:rPr lang="de-DE" altLang="de-DE" dirty="0">
-                <a:solidFill>
-                  <a:srgbClr val="000000"/>
-                </a:solidFill>
-                <a:latin typeface="Lucida Console" panose="020B0609040504020204" pitchFamily="49" charset="0"/>
-              </a:rPr>
-              <a:t> 2016-04-29</a:t>
-            </a:r>
-          </a:p>
-          <a:p>
-            <a:pPr lvl="1" eaLnBrk="0" fontAlgn="base" hangingPunct="0">
-              <a:lnSpc>
-                <a:spcPct val="100000"/>
-              </a:lnSpc>
-              <a:spcBef>
-                <a:spcPct val="0"/>
-              </a:spcBef>
-              <a:spcAft>
-                <a:spcPct val="0"/>
-              </a:spcAft>
-            </a:pPr>
-            <a:r>
-              <a:rPr lang="de-DE" altLang="de-DE" dirty="0">
-                <a:solidFill>
-                  <a:srgbClr val="000000"/>
-                </a:solidFill>
-                <a:latin typeface="Lucida Console" panose="020B0609040504020204" pitchFamily="49" charset="0"/>
-              </a:rPr>
-              <a:t>Immer: T00:00:00Z</a:t>
-            </a:r>
-            <a:endParaRPr lang="de-DE" altLang="de-DE" dirty="0">
-              <a:latin typeface="Arial" panose="020B0604020202020204" pitchFamily="34" charset="0"/>
-            </a:endParaRPr>
-          </a:p>
-          <a:p>
-            <a:pPr marL="457200" lvl="1" indent="0" eaLnBrk="0" fontAlgn="base" hangingPunct="0">
-              <a:lnSpc>
-                <a:spcPct val="100000"/>
-              </a:lnSpc>
-              <a:spcBef>
-                <a:spcPct val="0"/>
-              </a:spcBef>
-              <a:spcAft>
-                <a:spcPct val="0"/>
-              </a:spcAft>
-              <a:buNone/>
-            </a:pPr>
-            <a:endParaRPr lang="de-DE" altLang="de-DE" dirty="0">
-              <a:solidFill>
-                <a:srgbClr val="000000"/>
-              </a:solidFill>
-              <a:latin typeface="Lucida Console" panose="020B0609040504020204" pitchFamily="49" charset="0"/>
-            </a:endParaRPr>
-          </a:p>
-          <a:p>
-            <a:pPr eaLnBrk="0" fontAlgn="base" hangingPunct="0">
-              <a:lnSpc>
-                <a:spcPct val="100000"/>
-              </a:lnSpc>
-              <a:spcBef>
-                <a:spcPct val="0"/>
-              </a:spcBef>
-              <a:spcAft>
-                <a:spcPct val="0"/>
-              </a:spcAft>
-            </a:pPr>
-            <a:endParaRPr lang="de-DE" altLang="de-DE" sz="5400" dirty="0">
-              <a:latin typeface="Arial" panose="020B0604020202020204" pitchFamily="34" charset="0"/>
-            </a:endParaRPr>
-          </a:p>
-          <a:p>
-            <a:pPr marL="0" lvl="0" indent="0" eaLnBrk="0" fontAlgn="base" hangingPunct="0">
-              <a:lnSpc>
-                <a:spcPct val="100000"/>
-              </a:lnSpc>
-              <a:spcBef>
-                <a:spcPct val="0"/>
-              </a:spcBef>
-              <a:spcAft>
-                <a:spcPct val="0"/>
-              </a:spcAft>
-              <a:buNone/>
-            </a:pPr>
-            <a:endParaRPr lang="de-DE" altLang="de-DE" dirty="0">
-              <a:solidFill>
-                <a:srgbClr val="000000"/>
-              </a:solidFill>
-              <a:latin typeface="Lucida Console" panose="020B0609040504020204" pitchFamily="49" charset="0"/>
-            </a:endParaRPr>
-          </a:p>
-          <a:p>
-            <a:endParaRPr lang="de-DE" dirty="0">
-              <a:solidFill>
-                <a:srgbClr val="000000"/>
-              </a:solidFill>
-              <a:latin typeface="Lucida Console" panose="020B0609040504020204" pitchFamily="49" charset="0"/>
-            </a:endParaRPr>
-          </a:p>
-          <a:p>
-            <a:endParaRPr lang="de-DE" altLang="de-DE" dirty="0">
-              <a:solidFill>
-                <a:srgbClr val="000000"/>
-              </a:solidFill>
-              <a:latin typeface="Lucida Console" panose="020B0609040504020204" pitchFamily="49" charset="0"/>
-            </a:endParaRPr>
-          </a:p>
-          <a:p>
-            <a:endParaRPr lang="de-DE" altLang="de-DE" sz="5400" dirty="0">
-              <a:latin typeface="Arial" panose="020B0604020202020204" pitchFamily="34" charset="0"/>
-            </a:endParaRPr>
-          </a:p>
-          <a:p>
-            <a:pPr marL="0" indent="0">
-              <a:buNone/>
-            </a:pPr>
-            <a:endParaRPr lang="de-CH" dirty="0"/>
-          </a:p>
-        </p:txBody>
-      </p:sp>
-      <p:sp>
-        <p:nvSpPr>
-          <p:cNvPr id="4" name="Rectangle 1">
-            <a:extLst>
-              <a:ext uri="{FF2B5EF4-FFF2-40B4-BE49-F238E27FC236}">
-                <a16:creationId xmlns:a16="http://schemas.microsoft.com/office/drawing/2014/main" id="{AECBCE39-4A5D-4D39-B1D8-E4D2C1A76168}"/>
-              </a:ext>
-            </a:extLst>
-          </p:cNvPr>
-          <p:cNvSpPr>
-            <a:spLocks noChangeArrowheads="1"/>
-          </p:cNvSpPr>
-          <p:nvPr/>
-        </p:nvSpPr>
-        <p:spPr bwMode="auto">
-          <a:xfrm>
-            <a:off x="230521" y="1227337"/>
-            <a:ext cx="65" cy="276999"/>
-          </a:xfrm>
-          <a:prstGeom prst="rect">
-            <a:avLst/>
-          </a:prstGeom>
-          <a:solidFill>
-            <a:srgbClr val="FFFFFF"/>
-          </a:solidFill>
-          <a:ln>
-            <a:noFill/>
-          </a:ln>
-          <a:effectLst/>
-          <a:extLst>
-            <a:ext uri="{91240B29-F687-4F45-9708-019B960494DF}">
-              <a14:hiddenLine xmlns:a14="http://schemas.microsoft.com/office/drawing/2010/main" w="9525">
-                <a:solidFill>
-                  <a:schemeClr val="tx1"/>
-                </a:solidFill>
-                <a:miter lim="800000"/>
-                <a:headEnd/>
-                <a:tailEnd/>
-              </a14:hiddenLine>
-            </a:ext>
-            <a:ext uri="{AF507438-7753-43E0-B8FC-AC1667EBCBE1}">
-              <a14:hiddenEffects xmlns:a14="http://schemas.microsoft.com/office/drawing/2010/main">
-                <a:effectLst>
-                  <a:outerShdw dist="35921" dir="2700000" algn="ctr" rotWithShape="0">
-                    <a:schemeClr val="bg2"/>
-                  </a:outerShdw>
-                </a:effectLst>
-              </a14:hiddenEffects>
-            </a:ext>
-          </a:extLst>
-        </p:spPr>
-        <p:txBody>
-          <a:bodyPr vert="horz" wrap="none" lIns="0" tIns="0" rIns="0" bIns="0" numCol="1" anchor="ctr" anchorCtr="0" compatLnSpc="1">
-            <a:prstTxWarp prst="textNoShape">
-              <a:avLst/>
-            </a:prstTxWarp>
-            <a:spAutoFit/>
-          </a:bodyPr>
-          <a:lstStyle/>
-          <a:p>
-            <a:pPr marL="0" marR="0" lvl="0" indent="0" algn="l" defTabSz="914400" rtl="0" eaLnBrk="0" fontAlgn="base" latinLnBrk="0" hangingPunct="0">
-              <a:lnSpc>
-                <a:spcPct val="100000"/>
-              </a:lnSpc>
-              <a:spcBef>
-                <a:spcPct val="0"/>
-              </a:spcBef>
-              <a:spcAft>
-                <a:spcPct val="0"/>
-              </a:spcAft>
-              <a:buClrTx/>
-              <a:buSzTx/>
-              <a:buFontTx/>
-              <a:buNone/>
-              <a:tabLst/>
-            </a:pPr>
-            <a:endParaRPr kumimoji="0" lang="de-DE" altLang="de-DE" sz="1800" b="0" i="0" u="none" strike="noStrike" cap="none" normalizeH="0" baseline="0" dirty="0">
-              <a:ln>
-                <a:noFill/>
-              </a:ln>
-              <a:solidFill>
-                <a:schemeClr val="tx1"/>
-              </a:solidFill>
-              <a:effectLst/>
-              <a:latin typeface="Arial" panose="020B0604020202020204" pitchFamily="34" charset="0"/>
-            </a:endParaRPr>
-          </a:p>
-        </p:txBody>
-      </p:sp>
-      <p:sp>
-        <p:nvSpPr>
-          <p:cNvPr id="5" name="Rectangle 2">
-            <a:extLst>
-              <a:ext uri="{FF2B5EF4-FFF2-40B4-BE49-F238E27FC236}">
-                <a16:creationId xmlns:a16="http://schemas.microsoft.com/office/drawing/2014/main" id="{34C956E7-7C2C-4DFF-8501-6175ED8D37B9}"/>
-              </a:ext>
-            </a:extLst>
-          </p:cNvPr>
-          <p:cNvSpPr>
-            <a:spLocks noChangeArrowheads="1"/>
-          </p:cNvSpPr>
-          <p:nvPr/>
-        </p:nvSpPr>
-        <p:spPr bwMode="auto">
-          <a:xfrm>
-            <a:off x="0" y="90100"/>
-            <a:ext cx="65" cy="276999"/>
-          </a:xfrm>
-          <a:prstGeom prst="rect">
-            <a:avLst/>
-          </a:prstGeom>
-          <a:solidFill>
-            <a:srgbClr val="FFFFFF"/>
-          </a:solidFill>
-          <a:ln>
-            <a:noFill/>
-          </a:ln>
-          <a:effectLst/>
-          <a:extLst>
-            <a:ext uri="{91240B29-F687-4F45-9708-019B960494DF}">
-              <a14:hiddenLine xmlns:a14="http://schemas.microsoft.com/office/drawing/2010/main" w="9525">
-                <a:solidFill>
-                  <a:schemeClr val="tx1"/>
-                </a:solidFill>
-                <a:miter lim="800000"/>
-                <a:headEnd/>
-                <a:tailEnd/>
-              </a14:hiddenLine>
-            </a:ext>
-            <a:ext uri="{AF507438-7753-43E0-B8FC-AC1667EBCBE1}">
-              <a14:hiddenEffects xmlns:a14="http://schemas.microsoft.com/office/drawing/2010/main">
-                <a:effectLst>
-                  <a:outerShdw dist="35921" dir="2700000" algn="ctr" rotWithShape="0">
-                    <a:schemeClr val="bg2"/>
-                  </a:outerShdw>
-                </a:effectLst>
-              </a14:hiddenEffects>
-            </a:ext>
-          </a:extLst>
-        </p:spPr>
-        <p:txBody>
-          <a:bodyPr vert="horz" wrap="none" lIns="0" tIns="0" rIns="0" bIns="0" numCol="1" anchor="ctr" anchorCtr="0" compatLnSpc="1">
-            <a:prstTxWarp prst="textNoShape">
-              <a:avLst/>
-            </a:prstTxWarp>
-            <a:spAutoFit/>
-          </a:bodyPr>
-          <a:lstStyle/>
-          <a:p>
-            <a:pPr marL="0" marR="0" lvl="0" indent="0" algn="l" defTabSz="914400" rtl="0" eaLnBrk="0" fontAlgn="base" latinLnBrk="0" hangingPunct="0">
-              <a:lnSpc>
-                <a:spcPct val="100000"/>
-              </a:lnSpc>
-              <a:spcBef>
-                <a:spcPct val="0"/>
-              </a:spcBef>
-              <a:spcAft>
-                <a:spcPct val="0"/>
-              </a:spcAft>
-              <a:buClrTx/>
-              <a:buSzTx/>
-              <a:buFontTx/>
-              <a:buNone/>
-              <a:tabLst/>
-            </a:pPr>
-            <a:endParaRPr kumimoji="0" lang="de-DE" altLang="de-DE" sz="1800" b="0" i="0" u="none" strike="noStrike" cap="none" normalizeH="0" baseline="0" dirty="0">
-              <a:ln>
-                <a:noFill/>
-              </a:ln>
-              <a:solidFill>
-                <a:schemeClr val="tx1"/>
-              </a:solidFill>
-              <a:effectLst/>
-              <a:latin typeface="Arial" panose="020B0604020202020204" pitchFamily="34" charset="0"/>
-            </a:endParaRPr>
-          </a:p>
-        </p:txBody>
-      </p:sp>
-      <p:sp>
-        <p:nvSpPr>
-          <p:cNvPr id="6" name="Rectangle 1">
-            <a:extLst>
-              <a:ext uri="{FF2B5EF4-FFF2-40B4-BE49-F238E27FC236}">
-                <a16:creationId xmlns:a16="http://schemas.microsoft.com/office/drawing/2014/main" id="{F9FA6A91-2014-4655-95E9-05A3F342A5DC}"/>
-              </a:ext>
-            </a:extLst>
-          </p:cNvPr>
-          <p:cNvSpPr>
-            <a:spLocks noChangeArrowheads="1"/>
-          </p:cNvSpPr>
-          <p:nvPr/>
-        </p:nvSpPr>
-        <p:spPr bwMode="auto">
-          <a:xfrm>
-            <a:off x="0" y="90100"/>
-            <a:ext cx="65" cy="276999"/>
-          </a:xfrm>
-          <a:prstGeom prst="rect">
-            <a:avLst/>
-          </a:prstGeom>
-          <a:solidFill>
-            <a:srgbClr val="FFFFFF"/>
-          </a:solidFill>
-          <a:ln>
-            <a:noFill/>
-          </a:ln>
-          <a:effectLst/>
-          <a:extLst>
-            <a:ext uri="{91240B29-F687-4F45-9708-019B960494DF}">
-              <a14:hiddenLine xmlns:a14="http://schemas.microsoft.com/office/drawing/2010/main" w="9525">
-                <a:solidFill>
-                  <a:schemeClr val="tx1"/>
-                </a:solidFill>
-                <a:miter lim="800000"/>
-                <a:headEnd/>
-                <a:tailEnd/>
-              </a14:hiddenLine>
-            </a:ext>
-            <a:ext uri="{AF507438-7753-43E0-B8FC-AC1667EBCBE1}">
-              <a14:hiddenEffects xmlns:a14="http://schemas.microsoft.com/office/drawing/2010/main">
-                <a:effectLst>
-                  <a:outerShdw dist="35921" dir="2700000" algn="ctr" rotWithShape="0">
-                    <a:schemeClr val="bg2"/>
-                  </a:outerShdw>
-                </a:effectLst>
-              </a14:hiddenEffects>
-            </a:ext>
-          </a:extLst>
-        </p:spPr>
-        <p:txBody>
-          <a:bodyPr vert="horz" wrap="none" lIns="0" tIns="0" rIns="0" bIns="0" numCol="1" anchor="ctr" anchorCtr="0" compatLnSpc="1">
-            <a:prstTxWarp prst="textNoShape">
-              <a:avLst/>
-            </a:prstTxWarp>
-            <a:spAutoFit/>
-          </a:bodyPr>
-          <a:lstStyle/>
-          <a:p>
-            <a:pPr marL="0" marR="0" lvl="0" indent="0" algn="l" defTabSz="914400" rtl="0" eaLnBrk="0" fontAlgn="base" latinLnBrk="0" hangingPunct="0">
-              <a:lnSpc>
-                <a:spcPct val="100000"/>
-              </a:lnSpc>
-              <a:spcBef>
-                <a:spcPct val="0"/>
-              </a:spcBef>
-              <a:spcAft>
-                <a:spcPct val="0"/>
-              </a:spcAft>
-              <a:buClrTx/>
-              <a:buSzTx/>
-              <a:buFontTx/>
-              <a:buNone/>
-              <a:tabLst/>
-            </a:pPr>
-            <a:endParaRPr kumimoji="0" lang="de-DE" altLang="de-DE" sz="1800" b="0" i="0" u="none" strike="noStrike" cap="none" normalizeH="0" baseline="0" dirty="0">
-              <a:ln>
-                <a:noFill/>
-              </a:ln>
-              <a:solidFill>
-                <a:schemeClr val="tx1"/>
-              </a:solidFill>
-              <a:effectLst/>
-              <a:latin typeface="Arial" panose="020B0604020202020204" pitchFamily="34" charset="0"/>
-            </a:endParaRPr>
-          </a:p>
-        </p:txBody>
-      </p:sp>
-      <p:sp>
-        <p:nvSpPr>
-          <p:cNvPr id="7" name="Rectangle 2">
-            <a:extLst>
-              <a:ext uri="{FF2B5EF4-FFF2-40B4-BE49-F238E27FC236}">
-                <a16:creationId xmlns:a16="http://schemas.microsoft.com/office/drawing/2014/main" id="{1639DC98-A0B3-4583-BF8A-33197334FDF3}"/>
-              </a:ext>
-            </a:extLst>
-          </p:cNvPr>
-          <p:cNvSpPr>
-            <a:spLocks noChangeArrowheads="1"/>
-          </p:cNvSpPr>
-          <p:nvPr/>
-        </p:nvSpPr>
-        <p:spPr bwMode="auto">
-          <a:xfrm>
-            <a:off x="0" y="90100"/>
-            <a:ext cx="65" cy="276999"/>
-          </a:xfrm>
-          <a:prstGeom prst="rect">
-            <a:avLst/>
-          </a:prstGeom>
-          <a:solidFill>
-            <a:srgbClr val="FFFFFF"/>
-          </a:solidFill>
-          <a:ln>
-            <a:noFill/>
-          </a:ln>
-          <a:effectLst/>
-          <a:extLst>
-            <a:ext uri="{91240B29-F687-4F45-9708-019B960494DF}">
-              <a14:hiddenLine xmlns:a14="http://schemas.microsoft.com/office/drawing/2010/main" w="9525">
-                <a:solidFill>
-                  <a:schemeClr val="tx1"/>
-                </a:solidFill>
-                <a:miter lim="800000"/>
-                <a:headEnd/>
-                <a:tailEnd/>
-              </a14:hiddenLine>
-            </a:ext>
-            <a:ext uri="{AF507438-7753-43E0-B8FC-AC1667EBCBE1}">
-              <a14:hiddenEffects xmlns:a14="http://schemas.microsoft.com/office/drawing/2010/main">
-                <a:effectLst>
-                  <a:outerShdw dist="35921" dir="2700000" algn="ctr" rotWithShape="0">
-                    <a:schemeClr val="bg2"/>
-                  </a:outerShdw>
-                </a:effectLst>
-              </a14:hiddenEffects>
-            </a:ext>
-          </a:extLst>
-        </p:spPr>
-        <p:txBody>
-          <a:bodyPr vert="horz" wrap="none" lIns="0" tIns="0" rIns="0" bIns="0" numCol="1" anchor="ctr" anchorCtr="0" compatLnSpc="1">
-            <a:prstTxWarp prst="textNoShape">
-              <a:avLst/>
-            </a:prstTxWarp>
-            <a:spAutoFit/>
-          </a:bodyPr>
-          <a:lstStyle/>
-          <a:p>
-            <a:pPr marL="0" marR="0" lvl="0" indent="0" algn="l" defTabSz="914400" rtl="0" eaLnBrk="0" fontAlgn="base" latinLnBrk="0" hangingPunct="0">
-              <a:lnSpc>
-                <a:spcPct val="100000"/>
-              </a:lnSpc>
-              <a:spcBef>
-                <a:spcPct val="0"/>
-              </a:spcBef>
-              <a:spcAft>
-                <a:spcPct val="0"/>
-              </a:spcAft>
-              <a:buClrTx/>
-              <a:buSzTx/>
-              <a:buFontTx/>
-              <a:buNone/>
-              <a:tabLst/>
-            </a:pPr>
-            <a:endParaRPr kumimoji="0" lang="de-DE" altLang="de-DE" sz="1800" b="0" i="0" u="none" strike="noStrike" cap="none" normalizeH="0" baseline="0" dirty="0">
-              <a:ln>
-                <a:noFill/>
-              </a:ln>
-              <a:solidFill>
-                <a:schemeClr val="tx1"/>
-              </a:solidFill>
-              <a:effectLst/>
-              <a:latin typeface="Arial" panose="020B0604020202020204" pitchFamily="34" charset="0"/>
-            </a:endParaRPr>
-          </a:p>
-        </p:txBody>
-      </p:sp>
-      <p:sp>
-        <p:nvSpPr>
-          <p:cNvPr id="8" name="Rectangle 3">
-            <a:extLst>
-              <a:ext uri="{FF2B5EF4-FFF2-40B4-BE49-F238E27FC236}">
-                <a16:creationId xmlns:a16="http://schemas.microsoft.com/office/drawing/2014/main" id="{64BA156C-4E3D-478B-9CFC-411A0DB4854D}"/>
-              </a:ext>
-            </a:extLst>
-          </p:cNvPr>
-          <p:cNvSpPr>
-            <a:spLocks noChangeArrowheads="1"/>
-          </p:cNvSpPr>
-          <p:nvPr/>
-        </p:nvSpPr>
-        <p:spPr bwMode="auto">
-          <a:xfrm>
-            <a:off x="0" y="90100"/>
-            <a:ext cx="65" cy="276999"/>
-          </a:xfrm>
-          <a:prstGeom prst="rect">
-            <a:avLst/>
-          </a:prstGeom>
-          <a:solidFill>
-            <a:srgbClr val="FFFFFF"/>
-          </a:solidFill>
-          <a:ln>
-            <a:noFill/>
-          </a:ln>
-          <a:effectLst/>
-          <a:extLst>
-            <a:ext uri="{91240B29-F687-4F45-9708-019B960494DF}">
-              <a14:hiddenLine xmlns:a14="http://schemas.microsoft.com/office/drawing/2010/main" w="9525">
-                <a:solidFill>
-                  <a:schemeClr val="tx1"/>
-                </a:solidFill>
-                <a:miter lim="800000"/>
-                <a:headEnd/>
-                <a:tailEnd/>
-              </a14:hiddenLine>
-            </a:ext>
-            <a:ext uri="{AF507438-7753-43E0-B8FC-AC1667EBCBE1}">
-              <a14:hiddenEffects xmlns:a14="http://schemas.microsoft.com/office/drawing/2010/main">
-                <a:effectLst>
-                  <a:outerShdw dist="35921" dir="2700000" algn="ctr" rotWithShape="0">
-                    <a:schemeClr val="bg2"/>
-                  </a:outerShdw>
-                </a:effectLst>
-              </a14:hiddenEffects>
-            </a:ext>
-          </a:extLst>
-        </p:spPr>
-        <p:txBody>
-          <a:bodyPr vert="horz" wrap="none" lIns="0" tIns="0" rIns="0" bIns="0" numCol="1" anchor="ctr" anchorCtr="0" compatLnSpc="1">
-            <a:prstTxWarp prst="textNoShape">
-              <a:avLst/>
-            </a:prstTxWarp>
-            <a:spAutoFit/>
-          </a:bodyPr>
-          <a:lstStyle/>
-          <a:p>
-            <a:pPr marL="0" marR="0" lvl="0" indent="0" algn="l" defTabSz="914400" rtl="0" eaLnBrk="0" fontAlgn="base" latinLnBrk="0" hangingPunct="0">
-              <a:lnSpc>
-                <a:spcPct val="100000"/>
-              </a:lnSpc>
-              <a:spcBef>
-                <a:spcPct val="0"/>
-              </a:spcBef>
-              <a:spcAft>
-                <a:spcPct val="0"/>
-              </a:spcAft>
-              <a:buClrTx/>
-              <a:buSzTx/>
-              <a:buFontTx/>
-              <a:buNone/>
-              <a:tabLst/>
-            </a:pPr>
-            <a:endParaRPr kumimoji="0" lang="de-DE" altLang="de-DE" sz="1800" b="0" i="0" u="none" strike="noStrike" cap="none" normalizeH="0" baseline="0" dirty="0">
-              <a:ln>
-                <a:noFill/>
-              </a:ln>
-              <a:solidFill>
-                <a:schemeClr val="tx1"/>
-              </a:solidFill>
-              <a:effectLst/>
-              <a:latin typeface="Arial" panose="020B0604020202020204" pitchFamily="34" charset="0"/>
-            </a:endParaRPr>
-          </a:p>
-        </p:txBody>
-      </p:sp>
-      <p:sp>
-        <p:nvSpPr>
-          <p:cNvPr id="9" name="Rectangle 4">
-            <a:extLst>
-              <a:ext uri="{FF2B5EF4-FFF2-40B4-BE49-F238E27FC236}">
-                <a16:creationId xmlns:a16="http://schemas.microsoft.com/office/drawing/2014/main" id="{3E420309-436A-42DC-820C-D5461E0762F9}"/>
-              </a:ext>
-            </a:extLst>
-          </p:cNvPr>
-          <p:cNvSpPr>
-            <a:spLocks noChangeArrowheads="1"/>
-          </p:cNvSpPr>
-          <p:nvPr/>
-        </p:nvSpPr>
-        <p:spPr bwMode="auto">
-          <a:xfrm>
-            <a:off x="0" y="90100"/>
-            <a:ext cx="65" cy="276999"/>
-          </a:xfrm>
-          <a:prstGeom prst="rect">
-            <a:avLst/>
-          </a:prstGeom>
-          <a:solidFill>
-            <a:srgbClr val="FFFFFF"/>
-          </a:solidFill>
-          <a:ln>
-            <a:noFill/>
-          </a:ln>
-          <a:effectLst/>
-          <a:extLst>
-            <a:ext uri="{91240B29-F687-4F45-9708-019B960494DF}">
-              <a14:hiddenLine xmlns:a14="http://schemas.microsoft.com/office/drawing/2010/main" w="9525">
-                <a:solidFill>
-                  <a:schemeClr val="tx1"/>
-                </a:solidFill>
-                <a:miter lim="800000"/>
-                <a:headEnd/>
-                <a:tailEnd/>
-              </a14:hiddenLine>
-            </a:ext>
-            <a:ext uri="{AF507438-7753-43E0-B8FC-AC1667EBCBE1}">
-              <a14:hiddenEffects xmlns:a14="http://schemas.microsoft.com/office/drawing/2010/main">
-                <a:effectLst>
-                  <a:outerShdw dist="35921" dir="2700000" algn="ctr" rotWithShape="0">
-                    <a:schemeClr val="bg2"/>
-                  </a:outerShdw>
-                </a:effectLst>
-              </a14:hiddenEffects>
-            </a:ext>
-          </a:extLst>
-        </p:spPr>
-        <p:txBody>
-          <a:bodyPr vert="horz" wrap="none" lIns="0" tIns="0" rIns="0" bIns="0" numCol="1" anchor="ctr" anchorCtr="0" compatLnSpc="1">
-            <a:prstTxWarp prst="textNoShape">
-              <a:avLst/>
-            </a:prstTxWarp>
-            <a:spAutoFit/>
-          </a:bodyPr>
-          <a:lstStyle/>
-          <a:p>
-            <a:pPr marL="0" marR="0" lvl="0" indent="0" algn="l" defTabSz="914400" rtl="0" eaLnBrk="0" fontAlgn="base" latinLnBrk="0" hangingPunct="0">
-              <a:lnSpc>
-                <a:spcPct val="100000"/>
-              </a:lnSpc>
-              <a:spcBef>
-                <a:spcPct val="0"/>
-              </a:spcBef>
-              <a:spcAft>
-                <a:spcPct val="0"/>
-              </a:spcAft>
-              <a:buClrTx/>
-              <a:buSzTx/>
-              <a:buFontTx/>
-              <a:buNone/>
-              <a:tabLst/>
-            </a:pPr>
-            <a:endParaRPr kumimoji="0" lang="de-DE" altLang="de-DE" sz="1800" b="0" i="0" u="none" strike="noStrike" cap="none" normalizeH="0" baseline="0" dirty="0">
-              <a:ln>
-                <a:noFill/>
-              </a:ln>
-              <a:solidFill>
-                <a:schemeClr val="tx1"/>
-              </a:solidFill>
-              <a:effectLst/>
-              <a:latin typeface="Arial" panose="020B0604020202020204" pitchFamily="34" charset="0"/>
-            </a:endParaRPr>
-          </a:p>
-        </p:txBody>
-      </p:sp>
-    </p:spTree>
-    <p:extLst>
-      <p:ext uri="{BB962C8B-B14F-4D97-AF65-F5344CB8AC3E}">
-        <p14:creationId xmlns:p14="http://schemas.microsoft.com/office/powerpoint/2010/main" val="662025034"/>
-      </p:ext>
-    </p:extLst>
-  </p:cSld>
-  <p:clrMapOvr>
-    <a:masterClrMapping/>
-  </p:clrMapOvr>
-</p:sld>
-</file>
-
 <file path=ppt/slides/slide2.xml><?xml version="1.0" encoding="utf-8"?>
 <p:sld xmlns:a="http://schemas.openxmlformats.org/drawingml/2006/main" xmlns:r="http://schemas.openxmlformats.org/officeDocument/2006/relationships" xmlns:p="http://schemas.openxmlformats.org/presentationml/2006/main">
   <p:cSld>
@@ -11171,1497 +8420,6 @@
     <p:extLst>
       <p:ext uri="{BB962C8B-B14F-4D97-AF65-F5344CB8AC3E}">
         <p14:creationId xmlns:p14="http://schemas.microsoft.com/office/powerpoint/2010/main" val="1068353605"/>
-      </p:ext>
-    </p:extLst>
-  </p:cSld>
-  <p:clrMapOvr>
-    <a:masterClrMapping/>
-  </p:clrMapOvr>
-</p:sld>
-</file>
-
-<file path=ppt/slides/slide20.xml><?xml version="1.0" encoding="utf-8"?>
-<p:sld xmlns:a="http://schemas.openxmlformats.org/drawingml/2006/main" xmlns:r="http://schemas.openxmlformats.org/officeDocument/2006/relationships" xmlns:p="http://schemas.openxmlformats.org/presentationml/2006/main">
-  <p:cSld>
-    <p:spTree>
-      <p:nvGrpSpPr>
-        <p:cNvPr id="1" name=""/>
-        <p:cNvGrpSpPr/>
-        <p:nvPr/>
-      </p:nvGrpSpPr>
-      <p:grpSpPr>
-        <a:xfrm>
-          <a:off x="0" y="0"/>
-          <a:ext cx="0" cy="0"/>
-          <a:chOff x="0" y="0"/>
-          <a:chExt cx="0" cy="0"/>
-        </a:xfrm>
-      </p:grpSpPr>
-      <p:sp>
-        <p:nvSpPr>
-          <p:cNvPr id="4" name="Rectangle 1">
-            <a:extLst>
-              <a:ext uri="{FF2B5EF4-FFF2-40B4-BE49-F238E27FC236}">
-                <a16:creationId xmlns:a16="http://schemas.microsoft.com/office/drawing/2014/main" id="{ECAEE7CF-F5E0-4FFE-BCF7-1394D430A1A8}"/>
-              </a:ext>
-            </a:extLst>
-          </p:cNvPr>
-          <p:cNvSpPr>
-            <a:spLocks noGrp="1" noChangeArrowheads="1"/>
-          </p:cNvSpPr>
-          <p:nvPr>
-            <p:ph idx="1"/>
-          </p:nvPr>
-        </p:nvSpPr>
-        <p:spPr bwMode="auto">
-          <a:xfrm>
-            <a:off x="1191326" y="991904"/>
-            <a:ext cx="7155805" cy="3877985"/>
-          </a:xfrm>
-          <a:prstGeom prst="rect">
-            <a:avLst/>
-          </a:prstGeom>
-          <a:solidFill>
-            <a:srgbClr val="FFFFFF"/>
-          </a:solidFill>
-          <a:ln>
-            <a:noFill/>
-          </a:ln>
-          <a:effectLst/>
-          <a:extLst>
-            <a:ext uri="{91240B29-F687-4F45-9708-019B960494DF}">
-              <a14:hiddenLine xmlns:a14="http://schemas.microsoft.com/office/drawing/2010/main" w="9525">
-                <a:solidFill>
-                  <a:schemeClr val="tx1"/>
-                </a:solidFill>
-                <a:miter lim="800000"/>
-                <a:headEnd/>
-                <a:tailEnd/>
-              </a14:hiddenLine>
-            </a:ext>
-            <a:ext uri="{AF507438-7753-43E0-B8FC-AC1667EBCBE1}">
-              <a14:hiddenEffects xmlns:a14="http://schemas.microsoft.com/office/drawing/2010/main">
-                <a:effectLst>
-                  <a:outerShdw dist="35921" dir="2700000" algn="ctr" rotWithShape="0">
-                    <a:schemeClr val="bg2"/>
-                  </a:outerShdw>
-                </a:effectLst>
-              </a14:hiddenEffects>
-            </a:ext>
-          </a:extLst>
-        </p:spPr>
-        <p:txBody>
-          <a:bodyPr vert="horz" wrap="none" lIns="0" tIns="0" rIns="0" bIns="0" numCol="1" anchor="ctr" anchorCtr="0" compatLnSpc="1">
-            <a:prstTxWarp prst="textNoShape">
-              <a:avLst/>
-            </a:prstTxWarp>
-            <a:spAutoFit/>
-          </a:bodyPr>
-          <a:lstStyle/>
-          <a:p>
-            <a:pPr eaLnBrk="0" fontAlgn="base" hangingPunct="0">
-              <a:lnSpc>
-                <a:spcPct val="100000"/>
-              </a:lnSpc>
-              <a:spcBef>
-                <a:spcPct val="0"/>
-              </a:spcBef>
-              <a:spcAft>
-                <a:spcPct val="0"/>
-              </a:spcAft>
-            </a:pPr>
-            <a:r>
-              <a:rPr kumimoji="0" lang="de-DE" altLang="de-DE" b="1" i="0" u="none" strike="noStrike" cap="none" normalizeH="0" baseline="0" dirty="0" err="1">
-                <a:ln>
-                  <a:noFill/>
-                </a:ln>
-                <a:solidFill>
-                  <a:srgbClr val="000000"/>
-                </a:solidFill>
-                <a:effectLst/>
-                <a:latin typeface="Lucida Console" panose="020B0609040504020204" pitchFamily="49" charset="0"/>
-              </a:rPr>
-              <a:t>Scholarship</a:t>
-            </a:r>
-            <a:r>
-              <a:rPr kumimoji="0" lang="de-DE" altLang="de-DE" b="0" i="0" u="none" strike="noStrike" cap="none" normalizeH="0" baseline="0" dirty="0">
-                <a:ln>
-                  <a:noFill/>
-                </a:ln>
-                <a:solidFill>
-                  <a:srgbClr val="000000"/>
-                </a:solidFill>
-                <a:effectLst/>
-                <a:latin typeface="Lucida Console" panose="020B0609040504020204" pitchFamily="49" charset="0"/>
-              </a:rPr>
-              <a:t> </a:t>
-            </a:r>
-            <a:r>
-              <a:rPr kumimoji="0" lang="de-DE" altLang="de-DE" b="0" i="1" u="none" strike="noStrike" cap="none" normalizeH="0" baseline="0" dirty="0">
-                <a:ln>
-                  <a:noFill/>
-                </a:ln>
-                <a:solidFill>
-                  <a:srgbClr val="949494"/>
-                </a:solidFill>
-                <a:effectLst/>
-                <a:latin typeface="Lucida Console" panose="020B0609040504020204" pitchFamily="49" charset="0"/>
-              </a:rPr>
-              <a:t>&lt;</a:t>
-            </a:r>
-            <a:r>
-              <a:rPr kumimoji="0" lang="de-DE" altLang="de-DE" b="0" i="1" u="none" strike="noStrike" cap="none" normalizeH="0" baseline="0" dirty="0" err="1">
-                <a:ln>
-                  <a:noFill/>
-                </a:ln>
-                <a:solidFill>
-                  <a:srgbClr val="949494"/>
-                </a:solidFill>
-                <a:effectLst/>
-                <a:latin typeface="Lucida Console" panose="020B0609040504020204" pitchFamily="49" charset="0"/>
-              </a:rPr>
-              <a:t>fct</a:t>
-            </a:r>
-            <a:r>
-              <a:rPr kumimoji="0" lang="de-DE" altLang="de-DE" b="0" i="1" u="none" strike="noStrike" cap="none" normalizeH="0" baseline="0" dirty="0">
-                <a:ln>
-                  <a:noFill/>
-                </a:ln>
-                <a:solidFill>
-                  <a:srgbClr val="949494"/>
-                </a:solidFill>
-                <a:effectLst/>
-                <a:latin typeface="Lucida Console" panose="020B0609040504020204" pitchFamily="49" charset="0"/>
-              </a:rPr>
-              <a:t>&gt;</a:t>
-            </a:r>
-            <a:r>
-              <a:rPr kumimoji="0" lang="de-DE" altLang="de-DE" b="0" i="0" u="none" strike="noStrike" cap="none" normalizeH="0" baseline="0" dirty="0">
-                <a:ln>
-                  <a:noFill/>
-                </a:ln>
-                <a:solidFill>
-                  <a:srgbClr val="000000"/>
-                </a:solidFill>
-                <a:effectLst/>
-                <a:latin typeface="Lucida Console" panose="020B0609040504020204" pitchFamily="49" charset="0"/>
-              </a:rPr>
-              <a:t> 0, 0, 0, 0, 0</a:t>
-            </a:r>
-          </a:p>
-          <a:p>
-            <a:pPr eaLnBrk="0" fontAlgn="base" hangingPunct="0">
-              <a:lnSpc>
-                <a:spcPct val="100000"/>
-              </a:lnSpc>
-              <a:spcBef>
-                <a:spcPct val="0"/>
-              </a:spcBef>
-              <a:spcAft>
-                <a:spcPct val="0"/>
-              </a:spcAft>
-            </a:pPr>
-            <a:endParaRPr kumimoji="0" lang="de-DE" altLang="de-DE" b="0" i="0" u="none" strike="noStrike" cap="none" normalizeH="0" baseline="0" dirty="0">
-              <a:ln>
-                <a:noFill/>
-              </a:ln>
-              <a:solidFill>
-                <a:srgbClr val="000000"/>
-              </a:solidFill>
-              <a:effectLst/>
-              <a:latin typeface="Lucida Console" panose="020B0609040504020204" pitchFamily="49" charset="0"/>
-            </a:endParaRPr>
-          </a:p>
-          <a:p>
-            <a:pPr eaLnBrk="0" fontAlgn="base" hangingPunct="0">
-              <a:lnSpc>
-                <a:spcPct val="100000"/>
-              </a:lnSpc>
-              <a:spcBef>
-                <a:spcPct val="0"/>
-              </a:spcBef>
-              <a:spcAft>
-                <a:spcPct val="0"/>
-              </a:spcAft>
-            </a:pPr>
-            <a:r>
-              <a:rPr kumimoji="0" lang="de-DE" altLang="de-DE" b="1" i="0" u="none" strike="noStrike" cap="none" normalizeH="0" baseline="0" dirty="0" err="1">
-                <a:ln>
-                  <a:noFill/>
-                </a:ln>
-                <a:solidFill>
-                  <a:srgbClr val="000000"/>
-                </a:solidFill>
-                <a:effectLst/>
-                <a:latin typeface="Lucida Console" panose="020B0609040504020204" pitchFamily="49" charset="0"/>
-              </a:rPr>
-              <a:t>Hipertension</a:t>
-            </a:r>
-            <a:r>
-              <a:rPr kumimoji="0" lang="de-DE" altLang="de-DE" b="0" i="0" u="none" strike="noStrike" cap="none" normalizeH="0" baseline="0" dirty="0">
-                <a:ln>
-                  <a:noFill/>
-                </a:ln>
-                <a:solidFill>
-                  <a:srgbClr val="000000"/>
-                </a:solidFill>
-                <a:effectLst/>
-                <a:latin typeface="Lucida Console" panose="020B0609040504020204" pitchFamily="49" charset="0"/>
-              </a:rPr>
-              <a:t> </a:t>
-            </a:r>
-            <a:r>
-              <a:rPr kumimoji="0" lang="de-DE" altLang="de-DE" b="0" i="1" u="none" strike="noStrike" cap="none" normalizeH="0" baseline="0" dirty="0">
-                <a:ln>
-                  <a:noFill/>
-                </a:ln>
-                <a:solidFill>
-                  <a:srgbClr val="949494"/>
-                </a:solidFill>
-                <a:effectLst/>
-                <a:latin typeface="Lucida Console" panose="020B0609040504020204" pitchFamily="49" charset="0"/>
-              </a:rPr>
-              <a:t>&lt;</a:t>
-            </a:r>
-            <a:r>
-              <a:rPr kumimoji="0" lang="de-DE" altLang="de-DE" b="0" i="1" u="none" strike="noStrike" cap="none" normalizeH="0" baseline="0" dirty="0" err="1">
-                <a:ln>
-                  <a:noFill/>
-                </a:ln>
-                <a:solidFill>
-                  <a:srgbClr val="949494"/>
-                </a:solidFill>
-                <a:effectLst/>
-                <a:latin typeface="Lucida Console" panose="020B0609040504020204" pitchFamily="49" charset="0"/>
-              </a:rPr>
-              <a:t>fct</a:t>
-            </a:r>
-            <a:r>
-              <a:rPr kumimoji="0" lang="de-DE" altLang="de-DE" b="0" i="1" u="none" strike="noStrike" cap="none" normalizeH="0" baseline="0" dirty="0">
-                <a:ln>
-                  <a:noFill/>
-                </a:ln>
-                <a:solidFill>
-                  <a:srgbClr val="949494"/>
-                </a:solidFill>
-                <a:effectLst/>
-                <a:latin typeface="Lucida Console" panose="020B0609040504020204" pitchFamily="49" charset="0"/>
-              </a:rPr>
-              <a:t>&gt;</a:t>
-            </a:r>
-            <a:r>
-              <a:rPr kumimoji="0" lang="de-DE" altLang="de-DE" b="0" i="0" u="none" strike="noStrike" cap="none" normalizeH="0" baseline="0" dirty="0">
-                <a:ln>
-                  <a:noFill/>
-                </a:ln>
-                <a:solidFill>
-                  <a:srgbClr val="000000"/>
-                </a:solidFill>
-                <a:effectLst/>
-                <a:latin typeface="Lucida Console" panose="020B0609040504020204" pitchFamily="49" charset="0"/>
-              </a:rPr>
-              <a:t> 1, 0, 0, 0, 1</a:t>
-            </a:r>
-          </a:p>
-          <a:p>
-            <a:pPr eaLnBrk="0" fontAlgn="base" hangingPunct="0">
-              <a:lnSpc>
-                <a:spcPct val="100000"/>
-              </a:lnSpc>
-              <a:spcBef>
-                <a:spcPct val="0"/>
-              </a:spcBef>
-              <a:spcAft>
-                <a:spcPct val="0"/>
-              </a:spcAft>
-            </a:pPr>
-            <a:endParaRPr kumimoji="0" lang="de-DE" altLang="de-DE" b="0" i="0" u="none" strike="noStrike" cap="none" normalizeH="0" baseline="0" dirty="0">
-              <a:ln>
-                <a:noFill/>
-              </a:ln>
-              <a:solidFill>
-                <a:srgbClr val="000000"/>
-              </a:solidFill>
-              <a:effectLst/>
-              <a:latin typeface="Lucida Console" panose="020B0609040504020204" pitchFamily="49" charset="0"/>
-            </a:endParaRPr>
-          </a:p>
-          <a:p>
-            <a:pPr eaLnBrk="0" fontAlgn="base" hangingPunct="0">
-              <a:lnSpc>
-                <a:spcPct val="100000"/>
-              </a:lnSpc>
-              <a:spcBef>
-                <a:spcPct val="0"/>
-              </a:spcBef>
-              <a:spcAft>
-                <a:spcPct val="0"/>
-              </a:spcAft>
-            </a:pPr>
-            <a:r>
-              <a:rPr kumimoji="0" lang="de-DE" altLang="de-DE" b="1" i="0" u="none" strike="noStrike" cap="none" normalizeH="0" baseline="0" dirty="0">
-                <a:ln>
-                  <a:noFill/>
-                </a:ln>
-                <a:solidFill>
-                  <a:srgbClr val="000000"/>
-                </a:solidFill>
-                <a:effectLst/>
-                <a:latin typeface="Lucida Console" panose="020B0609040504020204" pitchFamily="49" charset="0"/>
-              </a:rPr>
-              <a:t>Diabetes</a:t>
-            </a:r>
-            <a:r>
-              <a:rPr kumimoji="0" lang="de-DE" altLang="de-DE" b="0" i="0" u="none" strike="noStrike" cap="none" normalizeH="0" baseline="0" dirty="0">
-                <a:ln>
-                  <a:noFill/>
-                </a:ln>
-                <a:solidFill>
-                  <a:srgbClr val="000000"/>
-                </a:solidFill>
-                <a:effectLst/>
-                <a:latin typeface="Lucida Console" panose="020B0609040504020204" pitchFamily="49" charset="0"/>
-              </a:rPr>
-              <a:t> </a:t>
-            </a:r>
-            <a:r>
-              <a:rPr kumimoji="0" lang="de-DE" altLang="de-DE" b="0" i="1" u="none" strike="noStrike" cap="none" normalizeH="0" baseline="0" dirty="0">
-                <a:ln>
-                  <a:noFill/>
-                </a:ln>
-                <a:solidFill>
-                  <a:srgbClr val="949494"/>
-                </a:solidFill>
-                <a:effectLst/>
-                <a:latin typeface="Lucida Console" panose="020B0609040504020204" pitchFamily="49" charset="0"/>
-              </a:rPr>
-              <a:t>&lt;</a:t>
-            </a:r>
-            <a:r>
-              <a:rPr kumimoji="0" lang="de-DE" altLang="de-DE" b="0" i="1" u="none" strike="noStrike" cap="none" normalizeH="0" baseline="0" dirty="0" err="1">
-                <a:ln>
-                  <a:noFill/>
-                </a:ln>
-                <a:solidFill>
-                  <a:srgbClr val="949494"/>
-                </a:solidFill>
-                <a:effectLst/>
-                <a:latin typeface="Lucida Console" panose="020B0609040504020204" pitchFamily="49" charset="0"/>
-              </a:rPr>
-              <a:t>fct</a:t>
-            </a:r>
-            <a:r>
-              <a:rPr kumimoji="0" lang="de-DE" altLang="de-DE" b="0" i="1" u="none" strike="noStrike" cap="none" normalizeH="0" baseline="0" dirty="0">
-                <a:ln>
-                  <a:noFill/>
-                </a:ln>
-                <a:solidFill>
-                  <a:srgbClr val="949494"/>
-                </a:solidFill>
-                <a:effectLst/>
-                <a:latin typeface="Lucida Console" panose="020B0609040504020204" pitchFamily="49" charset="0"/>
-              </a:rPr>
-              <a:t>&gt;</a:t>
-            </a:r>
-            <a:r>
-              <a:rPr kumimoji="0" lang="de-DE" altLang="de-DE" b="0" i="0" u="none" strike="noStrike" cap="none" normalizeH="0" baseline="0" dirty="0">
-                <a:ln>
-                  <a:noFill/>
-                </a:ln>
-                <a:solidFill>
-                  <a:srgbClr val="000000"/>
-                </a:solidFill>
-                <a:effectLst/>
-                <a:latin typeface="Lucida Console" panose="020B0609040504020204" pitchFamily="49" charset="0"/>
-              </a:rPr>
-              <a:t> 0, 0, 0, 0, 1</a:t>
-            </a:r>
-          </a:p>
-          <a:p>
-            <a:pPr marL="0" indent="0" eaLnBrk="0" fontAlgn="base" hangingPunct="0">
-              <a:lnSpc>
-                <a:spcPct val="100000"/>
-              </a:lnSpc>
-              <a:spcBef>
-                <a:spcPct val="0"/>
-              </a:spcBef>
-              <a:spcAft>
-                <a:spcPct val="0"/>
-              </a:spcAft>
-              <a:buNone/>
-            </a:pPr>
-            <a:endParaRPr kumimoji="0" lang="de-DE" altLang="de-DE" b="0" i="0" u="none" strike="noStrike" cap="none" normalizeH="0" baseline="0" dirty="0">
-              <a:ln>
-                <a:noFill/>
-              </a:ln>
-              <a:solidFill>
-                <a:srgbClr val="000000"/>
-              </a:solidFill>
-              <a:effectLst/>
-              <a:latin typeface="Lucida Console" panose="020B0609040504020204" pitchFamily="49" charset="0"/>
-            </a:endParaRPr>
-          </a:p>
-          <a:p>
-            <a:pPr eaLnBrk="0" fontAlgn="base" hangingPunct="0">
-              <a:lnSpc>
-                <a:spcPct val="100000"/>
-              </a:lnSpc>
-              <a:spcBef>
-                <a:spcPct val="0"/>
-              </a:spcBef>
-              <a:spcAft>
-                <a:spcPct val="0"/>
-              </a:spcAft>
-            </a:pPr>
-            <a:r>
-              <a:rPr kumimoji="0" lang="de-DE" altLang="de-DE" b="1" i="0" u="none" strike="noStrike" cap="none" normalizeH="0" baseline="0" dirty="0" err="1">
-                <a:ln>
-                  <a:noFill/>
-                </a:ln>
-                <a:solidFill>
-                  <a:srgbClr val="000000"/>
-                </a:solidFill>
-                <a:effectLst/>
-                <a:latin typeface="Lucida Console" panose="020B0609040504020204" pitchFamily="49" charset="0"/>
-              </a:rPr>
-              <a:t>Alcoholism</a:t>
-            </a:r>
-            <a:r>
-              <a:rPr kumimoji="0" lang="de-DE" altLang="de-DE" b="0" i="0" u="none" strike="noStrike" cap="none" normalizeH="0" baseline="0" dirty="0">
-                <a:ln>
-                  <a:noFill/>
-                </a:ln>
-                <a:solidFill>
-                  <a:srgbClr val="000000"/>
-                </a:solidFill>
-                <a:effectLst/>
-                <a:latin typeface="Lucida Console" panose="020B0609040504020204" pitchFamily="49" charset="0"/>
-              </a:rPr>
-              <a:t> </a:t>
-            </a:r>
-            <a:r>
-              <a:rPr kumimoji="0" lang="de-DE" altLang="de-DE" b="0" i="1" u="none" strike="noStrike" cap="none" normalizeH="0" baseline="0" dirty="0">
-                <a:ln>
-                  <a:noFill/>
-                </a:ln>
-                <a:solidFill>
-                  <a:srgbClr val="949494"/>
-                </a:solidFill>
-                <a:effectLst/>
-                <a:latin typeface="Lucida Console" panose="020B0609040504020204" pitchFamily="49" charset="0"/>
-              </a:rPr>
-              <a:t>&lt;</a:t>
-            </a:r>
-            <a:r>
-              <a:rPr kumimoji="0" lang="de-DE" altLang="de-DE" b="0" i="1" u="none" strike="noStrike" cap="none" normalizeH="0" baseline="0" dirty="0" err="1">
-                <a:ln>
-                  <a:noFill/>
-                </a:ln>
-                <a:solidFill>
-                  <a:srgbClr val="949494"/>
-                </a:solidFill>
-                <a:effectLst/>
-                <a:latin typeface="Lucida Console" panose="020B0609040504020204" pitchFamily="49" charset="0"/>
-              </a:rPr>
-              <a:t>fct</a:t>
-            </a:r>
-            <a:r>
-              <a:rPr kumimoji="0" lang="de-DE" altLang="de-DE" b="0" i="1" u="none" strike="noStrike" cap="none" normalizeH="0" baseline="0" dirty="0">
-                <a:ln>
-                  <a:noFill/>
-                </a:ln>
-                <a:solidFill>
-                  <a:srgbClr val="949494"/>
-                </a:solidFill>
-                <a:effectLst/>
-                <a:latin typeface="Lucida Console" panose="020B0609040504020204" pitchFamily="49" charset="0"/>
-              </a:rPr>
-              <a:t>&gt;</a:t>
-            </a:r>
-            <a:r>
-              <a:rPr kumimoji="0" lang="de-DE" altLang="de-DE" b="0" i="0" u="none" strike="noStrike" cap="none" normalizeH="0" baseline="0" dirty="0">
-                <a:ln>
-                  <a:noFill/>
-                </a:ln>
-                <a:solidFill>
-                  <a:srgbClr val="000000"/>
-                </a:solidFill>
-                <a:effectLst/>
-                <a:latin typeface="Lucida Console" panose="020B0609040504020204" pitchFamily="49" charset="0"/>
-              </a:rPr>
-              <a:t> 0, 0, 0, 0, 0</a:t>
-            </a:r>
-          </a:p>
-          <a:p>
-            <a:pPr eaLnBrk="0" fontAlgn="base" hangingPunct="0">
-              <a:lnSpc>
-                <a:spcPct val="100000"/>
-              </a:lnSpc>
-              <a:spcBef>
-                <a:spcPct val="0"/>
-              </a:spcBef>
-              <a:spcAft>
-                <a:spcPct val="0"/>
-              </a:spcAft>
-            </a:pPr>
-            <a:endParaRPr kumimoji="0" lang="de-DE" altLang="de-DE" b="0" i="0" u="none" strike="noStrike" cap="none" normalizeH="0" baseline="0" dirty="0">
-              <a:ln>
-                <a:noFill/>
-              </a:ln>
-              <a:solidFill>
-                <a:srgbClr val="000000"/>
-              </a:solidFill>
-              <a:effectLst/>
-              <a:latin typeface="Lucida Console" panose="020B0609040504020204" pitchFamily="49" charset="0"/>
-            </a:endParaRPr>
-          </a:p>
-          <a:p>
-            <a:pPr eaLnBrk="0" fontAlgn="base" hangingPunct="0">
-              <a:lnSpc>
-                <a:spcPct val="100000"/>
-              </a:lnSpc>
-              <a:spcBef>
-                <a:spcPct val="0"/>
-              </a:spcBef>
-              <a:spcAft>
-                <a:spcPct val="0"/>
-              </a:spcAft>
-            </a:pPr>
-            <a:r>
-              <a:rPr kumimoji="0" lang="de-DE" altLang="de-DE" b="1" i="0" u="none" strike="noStrike" cap="none" normalizeH="0" baseline="0" dirty="0" err="1">
-                <a:ln>
-                  <a:noFill/>
-                </a:ln>
-                <a:solidFill>
-                  <a:srgbClr val="000000"/>
-                </a:solidFill>
-                <a:effectLst/>
-                <a:latin typeface="Lucida Console" panose="020B0609040504020204" pitchFamily="49" charset="0"/>
-              </a:rPr>
-              <a:t>Handcap</a:t>
-            </a:r>
-            <a:r>
-              <a:rPr kumimoji="0" lang="de-DE" altLang="de-DE" b="0" i="0" u="none" strike="noStrike" cap="none" normalizeH="0" baseline="0" dirty="0">
-                <a:ln>
-                  <a:noFill/>
-                </a:ln>
-                <a:solidFill>
-                  <a:srgbClr val="000000"/>
-                </a:solidFill>
-                <a:effectLst/>
-                <a:latin typeface="Lucida Console" panose="020B0609040504020204" pitchFamily="49" charset="0"/>
-              </a:rPr>
-              <a:t> </a:t>
-            </a:r>
-            <a:r>
-              <a:rPr kumimoji="0" lang="de-DE" altLang="de-DE" b="0" i="1" u="none" strike="noStrike" cap="none" normalizeH="0" baseline="0" dirty="0">
-                <a:ln>
-                  <a:noFill/>
-                </a:ln>
-                <a:solidFill>
-                  <a:srgbClr val="949494"/>
-                </a:solidFill>
-                <a:effectLst/>
-                <a:latin typeface="Lucida Console" panose="020B0609040504020204" pitchFamily="49" charset="0"/>
-              </a:rPr>
-              <a:t>&lt;</a:t>
-            </a:r>
-            <a:r>
-              <a:rPr kumimoji="0" lang="de-DE" altLang="de-DE" b="0" i="1" u="none" strike="noStrike" cap="none" normalizeH="0" baseline="0" dirty="0" err="1">
-                <a:ln>
-                  <a:noFill/>
-                </a:ln>
-                <a:solidFill>
-                  <a:srgbClr val="949494"/>
-                </a:solidFill>
-                <a:effectLst/>
-                <a:latin typeface="Lucida Console" panose="020B0609040504020204" pitchFamily="49" charset="0"/>
-              </a:rPr>
-              <a:t>fct</a:t>
-            </a:r>
-            <a:r>
-              <a:rPr kumimoji="0" lang="de-DE" altLang="de-DE" b="0" i="1" u="none" strike="noStrike" cap="none" normalizeH="0" baseline="0" dirty="0">
-                <a:ln>
-                  <a:noFill/>
-                </a:ln>
-                <a:solidFill>
-                  <a:srgbClr val="949494"/>
-                </a:solidFill>
-                <a:effectLst/>
-                <a:latin typeface="Lucida Console" panose="020B0609040504020204" pitchFamily="49" charset="0"/>
-              </a:rPr>
-              <a:t>&gt;</a:t>
-            </a:r>
-            <a:r>
-              <a:rPr kumimoji="0" lang="de-DE" altLang="de-DE" b="0" i="0" u="none" strike="noStrike" cap="none" normalizeH="0" baseline="0" dirty="0">
-                <a:ln>
-                  <a:noFill/>
-                </a:ln>
-                <a:solidFill>
-                  <a:srgbClr val="000000"/>
-                </a:solidFill>
-                <a:effectLst/>
-                <a:latin typeface="Lucida Console" panose="020B0609040504020204" pitchFamily="49" charset="0"/>
-              </a:rPr>
-              <a:t> 0, 0, 0, 0, 0</a:t>
-            </a:r>
-          </a:p>
-        </p:txBody>
-      </p:sp>
-      <p:pic>
-        <p:nvPicPr>
-          <p:cNvPr id="7" name="Grafik 6">
-            <a:extLst>
-              <a:ext uri="{FF2B5EF4-FFF2-40B4-BE49-F238E27FC236}">
-                <a16:creationId xmlns:a16="http://schemas.microsoft.com/office/drawing/2014/main" id="{9F19E096-4520-4342-A5FF-38EFDED93E48}"/>
-              </a:ext>
-            </a:extLst>
-          </p:cNvPr>
-          <p:cNvPicPr>
-            <a:picLocks noChangeAspect="1"/>
-          </p:cNvPicPr>
-          <p:nvPr/>
-        </p:nvPicPr>
-        <p:blipFill>
-          <a:blip r:embed="rId3"/>
-          <a:stretch>
-            <a:fillRect/>
-          </a:stretch>
-        </p:blipFill>
-        <p:spPr>
-          <a:xfrm>
-            <a:off x="476241" y="941533"/>
-            <a:ext cx="10877559" cy="1827787"/>
-          </a:xfrm>
-          <a:prstGeom prst="rect">
-            <a:avLst/>
-          </a:prstGeom>
-        </p:spPr>
-      </p:pic>
-      <p:pic>
-        <p:nvPicPr>
-          <p:cNvPr id="8" name="Grafik 7">
-            <a:extLst>
-              <a:ext uri="{FF2B5EF4-FFF2-40B4-BE49-F238E27FC236}">
-                <a16:creationId xmlns:a16="http://schemas.microsoft.com/office/drawing/2014/main" id="{A062EDD5-1280-469F-8D74-FCB2F1391772}"/>
-              </a:ext>
-            </a:extLst>
-          </p:cNvPr>
-          <p:cNvPicPr>
-            <a:picLocks noChangeAspect="1"/>
-          </p:cNvPicPr>
-          <p:nvPr/>
-        </p:nvPicPr>
-        <p:blipFill>
-          <a:blip r:embed="rId4"/>
-          <a:stretch>
-            <a:fillRect/>
-          </a:stretch>
-        </p:blipFill>
-        <p:spPr>
-          <a:xfrm>
-            <a:off x="476241" y="3680562"/>
-            <a:ext cx="11576547" cy="2728760"/>
-          </a:xfrm>
-          <a:prstGeom prst="rect">
-            <a:avLst/>
-          </a:prstGeom>
-        </p:spPr>
-      </p:pic>
-    </p:spTree>
-    <p:extLst>
-      <p:ext uri="{BB962C8B-B14F-4D97-AF65-F5344CB8AC3E}">
-        <p14:creationId xmlns:p14="http://schemas.microsoft.com/office/powerpoint/2010/main" val="941550182"/>
-      </p:ext>
-    </p:extLst>
-  </p:cSld>
-  <p:clrMapOvr>
-    <a:masterClrMapping/>
-  </p:clrMapOvr>
-  <p:timing>
-    <p:tnLst>
-      <p:par>
-        <p:cTn id="1" dur="indefinite" restart="never" nodeType="tmRoot">
-          <p:childTnLst>
-            <p:seq concurrent="1" nextAc="seek">
-              <p:cTn id="2" dur="indefinite" nodeType="mainSeq">
-                <p:childTnLst>
-                  <p:par>
-                    <p:cTn id="3" fill="hold">
-                      <p:stCondLst>
-                        <p:cond delay="indefinite"/>
-                      </p:stCondLst>
-                      <p:childTnLst>
-                        <p:par>
-                          <p:cTn id="4" fill="hold">
-                            <p:stCondLst>
-                              <p:cond delay="0"/>
-                            </p:stCondLst>
-                            <p:childTnLst>
-                              <p:par>
-                                <p:cTn id="5" presetID="10" presetClass="exit" presetSubtype="0" fill="hold" nodeType="clickEffect">
-                                  <p:stCondLst>
-                                    <p:cond delay="0"/>
-                                  </p:stCondLst>
-                                  <p:childTnLst>
-                                    <p:animEffect transition="out" filter="fade">
-                                      <p:cBhvr>
-                                        <p:cTn id="6" dur="500"/>
-                                        <p:tgtEl>
-                                          <p:spTgt spid="4">
-                                            <p:txEl>
-                                              <p:pRg st="0" end="0"/>
-                                            </p:txEl>
-                                          </p:spTgt>
-                                        </p:tgtEl>
-                                      </p:cBhvr>
-                                    </p:animEffect>
-                                    <p:set>
-                                      <p:cBhvr>
-                                        <p:cTn id="7" dur="1" fill="hold">
-                                          <p:stCondLst>
-                                            <p:cond delay="499"/>
-                                          </p:stCondLst>
-                                        </p:cTn>
-                                        <p:tgtEl>
-                                          <p:spTgt spid="4">
-                                            <p:txEl>
-                                              <p:pRg st="0" end="0"/>
-                                            </p:txEl>
-                                          </p:spTgt>
-                                        </p:tgtEl>
-                                        <p:attrNameLst>
-                                          <p:attrName>style.visibility</p:attrName>
-                                        </p:attrNameLst>
-                                      </p:cBhvr>
-                                      <p:to>
-                                        <p:strVal val="hidden"/>
-                                      </p:to>
-                                    </p:set>
-                                  </p:childTnLst>
-                                </p:cTn>
-                              </p:par>
-                              <p:par>
-                                <p:cTn id="8" presetID="10" presetClass="exit" presetSubtype="0" fill="hold" nodeType="withEffect">
-                                  <p:stCondLst>
-                                    <p:cond delay="0"/>
-                                  </p:stCondLst>
-                                  <p:childTnLst>
-                                    <p:animEffect transition="out" filter="fade">
-                                      <p:cBhvr>
-                                        <p:cTn id="9" dur="500"/>
-                                        <p:tgtEl>
-                                          <p:spTgt spid="4">
-                                            <p:txEl>
-                                              <p:pRg st="2" end="2"/>
-                                            </p:txEl>
-                                          </p:spTgt>
-                                        </p:tgtEl>
-                                      </p:cBhvr>
-                                    </p:animEffect>
-                                    <p:set>
-                                      <p:cBhvr>
-                                        <p:cTn id="10" dur="1" fill="hold">
-                                          <p:stCondLst>
-                                            <p:cond delay="499"/>
-                                          </p:stCondLst>
-                                        </p:cTn>
-                                        <p:tgtEl>
-                                          <p:spTgt spid="4">
-                                            <p:txEl>
-                                              <p:pRg st="2" end="2"/>
-                                            </p:txEl>
-                                          </p:spTgt>
-                                        </p:tgtEl>
-                                        <p:attrNameLst>
-                                          <p:attrName>style.visibility</p:attrName>
-                                        </p:attrNameLst>
-                                      </p:cBhvr>
-                                      <p:to>
-                                        <p:strVal val="hidden"/>
-                                      </p:to>
-                                    </p:set>
-                                  </p:childTnLst>
-                                </p:cTn>
-                              </p:par>
-                              <p:par>
-                                <p:cTn id="11" presetID="10" presetClass="exit" presetSubtype="0" fill="hold" nodeType="withEffect">
-                                  <p:stCondLst>
-                                    <p:cond delay="0"/>
-                                  </p:stCondLst>
-                                  <p:childTnLst>
-                                    <p:animEffect transition="out" filter="fade">
-                                      <p:cBhvr>
-                                        <p:cTn id="12" dur="500"/>
-                                        <p:tgtEl>
-                                          <p:spTgt spid="4">
-                                            <p:txEl>
-                                              <p:pRg st="4" end="4"/>
-                                            </p:txEl>
-                                          </p:spTgt>
-                                        </p:tgtEl>
-                                      </p:cBhvr>
-                                    </p:animEffect>
-                                    <p:set>
-                                      <p:cBhvr>
-                                        <p:cTn id="13" dur="1" fill="hold">
-                                          <p:stCondLst>
-                                            <p:cond delay="499"/>
-                                          </p:stCondLst>
-                                        </p:cTn>
-                                        <p:tgtEl>
-                                          <p:spTgt spid="4">
-                                            <p:txEl>
-                                              <p:pRg st="4" end="4"/>
-                                            </p:txEl>
-                                          </p:spTgt>
-                                        </p:tgtEl>
-                                        <p:attrNameLst>
-                                          <p:attrName>style.visibility</p:attrName>
-                                        </p:attrNameLst>
-                                      </p:cBhvr>
-                                      <p:to>
-                                        <p:strVal val="hidden"/>
-                                      </p:to>
-                                    </p:set>
-                                  </p:childTnLst>
-                                </p:cTn>
-                              </p:par>
-                              <p:par>
-                                <p:cTn id="14" presetID="10" presetClass="exit" presetSubtype="0" fill="hold" nodeType="withEffect">
-                                  <p:stCondLst>
-                                    <p:cond delay="0"/>
-                                  </p:stCondLst>
-                                  <p:childTnLst>
-                                    <p:animEffect transition="out" filter="fade">
-                                      <p:cBhvr>
-                                        <p:cTn id="15" dur="500"/>
-                                        <p:tgtEl>
-                                          <p:spTgt spid="4">
-                                            <p:txEl>
-                                              <p:pRg st="6" end="6"/>
-                                            </p:txEl>
-                                          </p:spTgt>
-                                        </p:tgtEl>
-                                      </p:cBhvr>
-                                    </p:animEffect>
-                                    <p:set>
-                                      <p:cBhvr>
-                                        <p:cTn id="16" dur="1" fill="hold">
-                                          <p:stCondLst>
-                                            <p:cond delay="499"/>
-                                          </p:stCondLst>
-                                        </p:cTn>
-                                        <p:tgtEl>
-                                          <p:spTgt spid="4">
-                                            <p:txEl>
-                                              <p:pRg st="6" end="6"/>
-                                            </p:txEl>
-                                          </p:spTgt>
-                                        </p:tgtEl>
-                                        <p:attrNameLst>
-                                          <p:attrName>style.visibility</p:attrName>
-                                        </p:attrNameLst>
-                                      </p:cBhvr>
-                                      <p:to>
-                                        <p:strVal val="hidden"/>
-                                      </p:to>
-                                    </p:set>
-                                  </p:childTnLst>
-                                </p:cTn>
-                              </p:par>
-                              <p:par>
-                                <p:cTn id="17" presetID="10" presetClass="exit" presetSubtype="0" fill="hold" nodeType="withEffect">
-                                  <p:stCondLst>
-                                    <p:cond delay="0"/>
-                                  </p:stCondLst>
-                                  <p:childTnLst>
-                                    <p:animEffect transition="out" filter="fade">
-                                      <p:cBhvr>
-                                        <p:cTn id="18" dur="500"/>
-                                        <p:tgtEl>
-                                          <p:spTgt spid="4">
-                                            <p:txEl>
-                                              <p:pRg st="8" end="8"/>
-                                            </p:txEl>
-                                          </p:spTgt>
-                                        </p:tgtEl>
-                                      </p:cBhvr>
-                                    </p:animEffect>
-                                    <p:set>
-                                      <p:cBhvr>
-                                        <p:cTn id="19" dur="1" fill="hold">
-                                          <p:stCondLst>
-                                            <p:cond delay="499"/>
-                                          </p:stCondLst>
-                                        </p:cTn>
-                                        <p:tgtEl>
-                                          <p:spTgt spid="4">
-                                            <p:txEl>
-                                              <p:pRg st="8" end="8"/>
-                                            </p:txEl>
-                                          </p:spTgt>
-                                        </p:tgtEl>
-                                        <p:attrNameLst>
-                                          <p:attrName>style.visibility</p:attrName>
-                                        </p:attrNameLst>
-                                      </p:cBhvr>
-                                      <p:to>
-                                        <p:strVal val="hidden"/>
-                                      </p:to>
-                                    </p:set>
-                                  </p:childTnLst>
-                                </p:cTn>
-                              </p:par>
-                              <p:par>
-                                <p:cTn id="20" presetID="10" presetClass="entr" presetSubtype="0" fill="hold" nodeType="withEffect">
-                                  <p:stCondLst>
-                                    <p:cond delay="0"/>
-                                  </p:stCondLst>
-                                  <p:childTnLst>
-                                    <p:set>
-                                      <p:cBhvr>
-                                        <p:cTn id="21" dur="1" fill="hold">
-                                          <p:stCondLst>
-                                            <p:cond delay="0"/>
-                                          </p:stCondLst>
-                                        </p:cTn>
-                                        <p:tgtEl>
-                                          <p:spTgt spid="7"/>
-                                        </p:tgtEl>
-                                        <p:attrNameLst>
-                                          <p:attrName>style.visibility</p:attrName>
-                                        </p:attrNameLst>
-                                      </p:cBhvr>
-                                      <p:to>
-                                        <p:strVal val="visible"/>
-                                      </p:to>
-                                    </p:set>
-                                    <p:animEffect transition="in" filter="fade">
-                                      <p:cBhvr>
-                                        <p:cTn id="22" dur="500"/>
-                                        <p:tgtEl>
-                                          <p:spTgt spid="7"/>
-                                        </p:tgtEl>
-                                      </p:cBhvr>
-                                    </p:animEffect>
-                                  </p:childTnLst>
-                                </p:cTn>
-                              </p:par>
-                            </p:childTnLst>
-                          </p:cTn>
-                        </p:par>
-                      </p:childTnLst>
-                    </p:cTn>
-                  </p:par>
-                  <p:par>
-                    <p:cTn id="23" fill="hold">
-                      <p:stCondLst>
-                        <p:cond delay="indefinite"/>
-                      </p:stCondLst>
-                      <p:childTnLst>
-                        <p:par>
-                          <p:cTn id="24" fill="hold">
-                            <p:stCondLst>
-                              <p:cond delay="0"/>
-                            </p:stCondLst>
-                            <p:childTnLst>
-                              <p:par>
-                                <p:cTn id="25" presetID="10" presetClass="entr" presetSubtype="0" fill="hold" nodeType="clickEffect">
-                                  <p:stCondLst>
-                                    <p:cond delay="0"/>
-                                  </p:stCondLst>
-                                  <p:childTnLst>
-                                    <p:set>
-                                      <p:cBhvr>
-                                        <p:cTn id="26" dur="1" fill="hold">
-                                          <p:stCondLst>
-                                            <p:cond delay="0"/>
-                                          </p:stCondLst>
-                                        </p:cTn>
-                                        <p:tgtEl>
-                                          <p:spTgt spid="8"/>
-                                        </p:tgtEl>
-                                        <p:attrNameLst>
-                                          <p:attrName>style.visibility</p:attrName>
-                                        </p:attrNameLst>
-                                      </p:cBhvr>
-                                      <p:to>
-                                        <p:strVal val="visible"/>
-                                      </p:to>
-                                    </p:set>
-                                    <p:animEffect transition="in" filter="fade">
-                                      <p:cBhvr>
-                                        <p:cTn id="27" dur="500"/>
-                                        <p:tgtEl>
-                                          <p:spTgt spid="8"/>
-                                        </p:tgtEl>
-                                      </p:cBhvr>
-                                    </p:animEffect>
-                                  </p:childTnLst>
-                                </p:cTn>
-                              </p:par>
-                            </p:childTnLst>
-                          </p:cTn>
-                        </p:par>
-                      </p:childTnLst>
-                    </p:cTn>
-                  </p:par>
-                </p:childTnLst>
-              </p:cTn>
-              <p:prevCondLst>
-                <p:cond evt="onPrev" delay="0">
-                  <p:tgtEl>
-                    <p:sldTgt/>
-                  </p:tgtEl>
-                </p:cond>
-              </p:prevCondLst>
-              <p:nextCondLst>
-                <p:cond evt="onNext" delay="0">
-                  <p:tgtEl>
-                    <p:sldTgt/>
-                  </p:tgtEl>
-                </p:cond>
-              </p:nextCondLst>
-            </p:seq>
-          </p:childTnLst>
-        </p:cTn>
-      </p:par>
-    </p:tnLst>
-  </p:timing>
-</p:sld>
-</file>
-
-<file path=ppt/slides/slide21.xml><?xml version="1.0" encoding="utf-8"?>
-<p:sld xmlns:a="http://schemas.openxmlformats.org/drawingml/2006/main" xmlns:r="http://schemas.openxmlformats.org/officeDocument/2006/relationships" xmlns:p="http://schemas.openxmlformats.org/presentationml/2006/main">
-  <p:cSld>
-    <p:spTree>
-      <p:nvGrpSpPr>
-        <p:cNvPr id="1" name=""/>
-        <p:cNvGrpSpPr/>
-        <p:nvPr/>
-      </p:nvGrpSpPr>
-      <p:grpSpPr>
-        <a:xfrm>
-          <a:off x="0" y="0"/>
-          <a:ext cx="0" cy="0"/>
-          <a:chOff x="0" y="0"/>
-          <a:chExt cx="0" cy="0"/>
-        </a:xfrm>
-      </p:grpSpPr>
-      <p:sp>
-        <p:nvSpPr>
-          <p:cNvPr id="3" name="Inhaltsplatzhalter 2">
-            <a:extLst>
-              <a:ext uri="{FF2B5EF4-FFF2-40B4-BE49-F238E27FC236}">
-                <a16:creationId xmlns:a16="http://schemas.microsoft.com/office/drawing/2014/main" id="{7870684D-0968-4546-99AA-8EA2E78DD90E}"/>
-              </a:ext>
-            </a:extLst>
-          </p:cNvPr>
-          <p:cNvSpPr>
-            <a:spLocks noGrp="1"/>
-          </p:cNvSpPr>
-          <p:nvPr>
-            <p:ph idx="1"/>
-          </p:nvPr>
-        </p:nvSpPr>
-        <p:spPr>
-          <a:xfrm>
-            <a:off x="838200" y="1260143"/>
-            <a:ext cx="10515600" cy="4351338"/>
-          </a:xfrm>
-        </p:spPr>
-        <p:txBody>
-          <a:bodyPr/>
-          <a:lstStyle/>
-          <a:p>
-            <a:r>
-              <a:rPr lang="de-DE" altLang="de-DE" dirty="0" err="1">
-                <a:solidFill>
-                  <a:srgbClr val="000000"/>
-                </a:solidFill>
-                <a:latin typeface="Lucida Console" panose="020B0609040504020204" pitchFamily="49" charset="0"/>
-              </a:rPr>
-              <a:t>SMS_received</a:t>
-            </a:r>
-            <a:r>
-              <a:rPr lang="de-DE" altLang="de-DE" dirty="0">
-                <a:solidFill>
-                  <a:srgbClr val="000000"/>
-                </a:solidFill>
-                <a:latin typeface="Lucida Console" panose="020B0609040504020204" pitchFamily="49" charset="0"/>
-              </a:rPr>
-              <a:t> </a:t>
-            </a:r>
-            <a:r>
-              <a:rPr lang="de-DE" altLang="de-DE" i="1" dirty="0">
-                <a:solidFill>
-                  <a:srgbClr val="949494"/>
-                </a:solidFill>
-                <a:latin typeface="Lucida Console" panose="020B0609040504020204" pitchFamily="49" charset="0"/>
-              </a:rPr>
-              <a:t>&lt;</a:t>
-            </a:r>
-            <a:r>
-              <a:rPr lang="de-DE" altLang="de-DE" i="1" dirty="0" err="1">
-                <a:solidFill>
-                  <a:srgbClr val="949494"/>
-                </a:solidFill>
-                <a:latin typeface="Lucida Console" panose="020B0609040504020204" pitchFamily="49" charset="0"/>
-              </a:rPr>
-              <a:t>int</a:t>
-            </a:r>
-            <a:r>
-              <a:rPr lang="de-DE" altLang="de-DE" i="1" dirty="0">
-                <a:solidFill>
-                  <a:srgbClr val="949494"/>
-                </a:solidFill>
-                <a:latin typeface="Lucida Console" panose="020B0609040504020204" pitchFamily="49" charset="0"/>
-              </a:rPr>
-              <a:t>&gt;</a:t>
-            </a:r>
-            <a:r>
-              <a:rPr lang="de-DE" altLang="de-DE" dirty="0">
-                <a:solidFill>
-                  <a:srgbClr val="000000"/>
-                </a:solidFill>
-                <a:latin typeface="Lucida Console" panose="020B0609040504020204" pitchFamily="49" charset="0"/>
-              </a:rPr>
-              <a:t> 0, 0, 0, 0, 0</a:t>
-            </a:r>
-          </a:p>
-          <a:p>
-            <a:pPr lvl="1"/>
-            <a:r>
-              <a:rPr lang="de-DE" altLang="de-DE" dirty="0" err="1">
-                <a:solidFill>
-                  <a:srgbClr val="000000"/>
-                </a:solidFill>
-                <a:latin typeface="Lucida Console" panose="020B0609040504020204" pitchFamily="49" charset="0"/>
-              </a:rPr>
-              <a:t>range</a:t>
-            </a:r>
-            <a:r>
-              <a:rPr lang="de-DE" altLang="de-DE" dirty="0">
-                <a:solidFill>
-                  <a:srgbClr val="000000"/>
-                </a:solidFill>
-                <a:latin typeface="Lucida Console" panose="020B0609040504020204" pitchFamily="49" charset="0"/>
-              </a:rPr>
-              <a:t>(</a:t>
-            </a:r>
-            <a:r>
-              <a:rPr lang="de-DE" altLang="de-DE" dirty="0" err="1">
-                <a:solidFill>
-                  <a:srgbClr val="000000"/>
-                </a:solidFill>
-                <a:latin typeface="Lucida Console" panose="020B0609040504020204" pitchFamily="49" charset="0"/>
-              </a:rPr>
-              <a:t>data$SMS_received</a:t>
-            </a:r>
-            <a:r>
-              <a:rPr lang="de-DE" altLang="de-DE" dirty="0">
-                <a:solidFill>
-                  <a:srgbClr val="000000"/>
-                </a:solidFill>
-                <a:latin typeface="Lucida Console" panose="020B0609040504020204" pitchFamily="49" charset="0"/>
-              </a:rPr>
-              <a:t>)</a:t>
-            </a:r>
-            <a:br>
-              <a:rPr lang="de-DE" altLang="de-DE" dirty="0">
-                <a:solidFill>
-                  <a:srgbClr val="000000"/>
-                </a:solidFill>
-                <a:latin typeface="Lucida Console" panose="020B0609040504020204" pitchFamily="49" charset="0"/>
-              </a:rPr>
-            </a:br>
-            <a:r>
-              <a:rPr lang="de-DE" altLang="de-DE" dirty="0">
-                <a:solidFill>
-                  <a:srgbClr val="000000"/>
-                </a:solidFill>
-                <a:latin typeface="Lucida Console" panose="020B0609040504020204" pitchFamily="49" charset="0"/>
-              </a:rPr>
-              <a:t>[1] 0 1</a:t>
-            </a:r>
-            <a:endParaRPr lang="de-DE" altLang="de-DE" dirty="0">
-              <a:latin typeface="Arial" panose="020B0604020202020204" pitchFamily="34" charset="0"/>
-            </a:endParaRPr>
-          </a:p>
-          <a:p>
-            <a:endParaRPr lang="de-DE" altLang="de-DE" dirty="0">
-              <a:solidFill>
-                <a:srgbClr val="000000"/>
-              </a:solidFill>
-              <a:latin typeface="Lucida Console" panose="020B0609040504020204" pitchFamily="49" charset="0"/>
-            </a:endParaRPr>
-          </a:p>
-          <a:p>
-            <a:r>
-              <a:rPr lang="de-DE" altLang="de-DE" dirty="0" err="1">
-                <a:solidFill>
-                  <a:srgbClr val="000000"/>
-                </a:solidFill>
-                <a:latin typeface="Lucida Console" panose="020B0609040504020204" pitchFamily="49" charset="0"/>
-              </a:rPr>
-              <a:t>No.show</a:t>
-            </a:r>
-            <a:r>
-              <a:rPr lang="de-DE" altLang="de-DE" dirty="0">
-                <a:solidFill>
-                  <a:srgbClr val="000000"/>
-                </a:solidFill>
-                <a:latin typeface="Lucida Console" panose="020B0609040504020204" pitchFamily="49" charset="0"/>
-              </a:rPr>
-              <a:t> </a:t>
-            </a:r>
-            <a:r>
-              <a:rPr lang="de-DE" altLang="de-DE" i="1" dirty="0">
-                <a:solidFill>
-                  <a:srgbClr val="949494"/>
-                </a:solidFill>
-                <a:latin typeface="Lucida Console" panose="020B0609040504020204" pitchFamily="49" charset="0"/>
-              </a:rPr>
-              <a:t>&lt;</a:t>
-            </a:r>
-            <a:r>
-              <a:rPr lang="de-DE" altLang="de-DE" i="1" dirty="0" err="1">
-                <a:solidFill>
-                  <a:srgbClr val="949494"/>
-                </a:solidFill>
-                <a:latin typeface="Lucida Console" panose="020B0609040504020204" pitchFamily="49" charset="0"/>
-              </a:rPr>
-              <a:t>fct</a:t>
-            </a:r>
-            <a:r>
-              <a:rPr lang="de-DE" altLang="de-DE" i="1" dirty="0">
-                <a:solidFill>
-                  <a:srgbClr val="949494"/>
-                </a:solidFill>
-                <a:latin typeface="Lucida Console" panose="020B0609040504020204" pitchFamily="49" charset="0"/>
-              </a:rPr>
-              <a:t>&gt;</a:t>
-            </a:r>
-            <a:r>
-              <a:rPr lang="de-DE" altLang="de-DE" dirty="0">
-                <a:solidFill>
-                  <a:srgbClr val="000000"/>
-                </a:solidFill>
-                <a:latin typeface="Lucida Console" panose="020B0609040504020204" pitchFamily="49" charset="0"/>
-              </a:rPr>
-              <a:t> </a:t>
-            </a:r>
-            <a:r>
-              <a:rPr lang="de-DE" altLang="de-DE" dirty="0" err="1">
-                <a:solidFill>
-                  <a:srgbClr val="000000"/>
-                </a:solidFill>
-                <a:latin typeface="Lucida Console" panose="020B0609040504020204" pitchFamily="49" charset="0"/>
-              </a:rPr>
-              <a:t>No</a:t>
-            </a:r>
-            <a:r>
-              <a:rPr lang="de-DE" altLang="de-DE" dirty="0">
-                <a:solidFill>
-                  <a:srgbClr val="000000"/>
-                </a:solidFill>
-                <a:latin typeface="Lucida Console" panose="020B0609040504020204" pitchFamily="49" charset="0"/>
-              </a:rPr>
-              <a:t>, </a:t>
-            </a:r>
-            <a:r>
-              <a:rPr lang="de-DE" altLang="de-DE" dirty="0" err="1">
-                <a:solidFill>
-                  <a:srgbClr val="000000"/>
-                </a:solidFill>
-                <a:latin typeface="Lucida Console" panose="020B0609040504020204" pitchFamily="49" charset="0"/>
-              </a:rPr>
-              <a:t>No</a:t>
-            </a:r>
-            <a:r>
-              <a:rPr lang="de-DE" altLang="de-DE" dirty="0">
-                <a:solidFill>
-                  <a:srgbClr val="000000"/>
-                </a:solidFill>
-                <a:latin typeface="Lucida Console" panose="020B0609040504020204" pitchFamily="49" charset="0"/>
-              </a:rPr>
-              <a:t>, </a:t>
-            </a:r>
-            <a:r>
-              <a:rPr lang="de-DE" altLang="de-DE" dirty="0" err="1">
-                <a:solidFill>
-                  <a:srgbClr val="000000"/>
-                </a:solidFill>
-                <a:latin typeface="Lucida Console" panose="020B0609040504020204" pitchFamily="49" charset="0"/>
-              </a:rPr>
-              <a:t>No</a:t>
-            </a:r>
-            <a:r>
-              <a:rPr lang="de-DE" altLang="de-DE" dirty="0">
-                <a:solidFill>
-                  <a:srgbClr val="000000"/>
-                </a:solidFill>
-                <a:latin typeface="Lucida Console" panose="020B0609040504020204" pitchFamily="49" charset="0"/>
-              </a:rPr>
-              <a:t>, </a:t>
-            </a:r>
-            <a:r>
-              <a:rPr lang="de-DE" altLang="de-DE" dirty="0" err="1">
-                <a:solidFill>
-                  <a:srgbClr val="000000"/>
-                </a:solidFill>
-                <a:latin typeface="Lucida Console" panose="020B0609040504020204" pitchFamily="49" charset="0"/>
-              </a:rPr>
-              <a:t>No</a:t>
-            </a:r>
-            <a:r>
-              <a:rPr lang="de-DE" altLang="de-DE" dirty="0">
-                <a:solidFill>
-                  <a:srgbClr val="000000"/>
-                </a:solidFill>
-                <a:latin typeface="Lucida Console" panose="020B0609040504020204" pitchFamily="49" charset="0"/>
-              </a:rPr>
-              <a:t>, </a:t>
-            </a:r>
-            <a:r>
-              <a:rPr lang="de-DE" altLang="de-DE" dirty="0" err="1">
-                <a:solidFill>
-                  <a:srgbClr val="000000"/>
-                </a:solidFill>
-                <a:latin typeface="Lucida Console" panose="020B0609040504020204" pitchFamily="49" charset="0"/>
-              </a:rPr>
-              <a:t>No</a:t>
-            </a:r>
-            <a:r>
-              <a:rPr lang="de-DE" altLang="de-DE" dirty="0">
-                <a:solidFill>
-                  <a:srgbClr val="000000"/>
-                </a:solidFill>
-                <a:latin typeface="Lucida Console" panose="020B0609040504020204" pitchFamily="49" charset="0"/>
-              </a:rPr>
-              <a:t>, </a:t>
-            </a:r>
-            <a:r>
-              <a:rPr lang="de-DE" altLang="de-DE" dirty="0" err="1">
-                <a:solidFill>
-                  <a:srgbClr val="000000"/>
-                </a:solidFill>
-                <a:latin typeface="Lucida Console" panose="020B0609040504020204" pitchFamily="49" charset="0"/>
-              </a:rPr>
-              <a:t>No</a:t>
-            </a:r>
-            <a:r>
-              <a:rPr lang="de-DE" altLang="de-DE" dirty="0">
-                <a:solidFill>
-                  <a:srgbClr val="000000"/>
-                </a:solidFill>
-                <a:latin typeface="Lucida Console" panose="020B0609040504020204" pitchFamily="49" charset="0"/>
-              </a:rPr>
-              <a:t>,</a:t>
-            </a:r>
-            <a:endParaRPr lang="de-DE" altLang="de-DE" sz="5400" dirty="0">
-              <a:latin typeface="Arial" panose="020B0604020202020204" pitchFamily="34" charset="0"/>
-            </a:endParaRPr>
-          </a:p>
-          <a:p>
-            <a:endParaRPr lang="de-CH" dirty="0"/>
-          </a:p>
-        </p:txBody>
-      </p:sp>
-      <p:sp>
-        <p:nvSpPr>
-          <p:cNvPr id="4" name="Rectangle 1">
-            <a:extLst>
-              <a:ext uri="{FF2B5EF4-FFF2-40B4-BE49-F238E27FC236}">
-                <a16:creationId xmlns:a16="http://schemas.microsoft.com/office/drawing/2014/main" id="{7D244ABB-F3E7-474A-864A-E6DA08298F5A}"/>
-              </a:ext>
-            </a:extLst>
-          </p:cNvPr>
-          <p:cNvSpPr>
-            <a:spLocks noChangeArrowheads="1"/>
-          </p:cNvSpPr>
-          <p:nvPr/>
-        </p:nvSpPr>
-        <p:spPr bwMode="auto">
-          <a:xfrm>
-            <a:off x="0" y="90100"/>
-            <a:ext cx="65" cy="276999"/>
-          </a:xfrm>
-          <a:prstGeom prst="rect">
-            <a:avLst/>
-          </a:prstGeom>
-          <a:solidFill>
-            <a:srgbClr val="FFFFFF"/>
-          </a:solidFill>
-          <a:ln>
-            <a:noFill/>
-          </a:ln>
-          <a:effectLst/>
-          <a:extLst>
-            <a:ext uri="{91240B29-F687-4F45-9708-019B960494DF}">
-              <a14:hiddenLine xmlns:a14="http://schemas.microsoft.com/office/drawing/2010/main" w="9525">
-                <a:solidFill>
-                  <a:schemeClr val="tx1"/>
-                </a:solidFill>
-                <a:miter lim="800000"/>
-                <a:headEnd/>
-                <a:tailEnd/>
-              </a14:hiddenLine>
-            </a:ext>
-            <a:ext uri="{AF507438-7753-43E0-B8FC-AC1667EBCBE1}">
-              <a14:hiddenEffects xmlns:a14="http://schemas.microsoft.com/office/drawing/2010/main">
-                <a:effectLst>
-                  <a:outerShdw dist="35921" dir="2700000" algn="ctr" rotWithShape="0">
-                    <a:schemeClr val="bg2"/>
-                  </a:outerShdw>
-                </a:effectLst>
-              </a14:hiddenEffects>
-            </a:ext>
-          </a:extLst>
-        </p:spPr>
-        <p:txBody>
-          <a:bodyPr vert="horz" wrap="none" lIns="0" tIns="0" rIns="0" bIns="0" numCol="1" anchor="ctr" anchorCtr="0" compatLnSpc="1">
-            <a:prstTxWarp prst="textNoShape">
-              <a:avLst/>
-            </a:prstTxWarp>
-            <a:spAutoFit/>
-          </a:bodyPr>
-          <a:lstStyle/>
-          <a:p>
-            <a:pPr marL="0" marR="0" lvl="0" indent="0" algn="l" defTabSz="914400" rtl="0" eaLnBrk="0" fontAlgn="base" latinLnBrk="0" hangingPunct="0">
-              <a:lnSpc>
-                <a:spcPct val="100000"/>
-              </a:lnSpc>
-              <a:spcBef>
-                <a:spcPct val="0"/>
-              </a:spcBef>
-              <a:spcAft>
-                <a:spcPct val="0"/>
-              </a:spcAft>
-              <a:buClrTx/>
-              <a:buSzTx/>
-              <a:buFontTx/>
-              <a:buNone/>
-              <a:tabLst/>
-            </a:pPr>
-            <a:endParaRPr kumimoji="0" lang="de-DE" altLang="de-DE" sz="1800" b="0" i="0" u="none" strike="noStrike" cap="none" normalizeH="0" baseline="0" dirty="0">
-              <a:ln>
-                <a:noFill/>
-              </a:ln>
-              <a:solidFill>
-                <a:schemeClr val="tx1"/>
-              </a:solidFill>
-              <a:effectLst/>
-              <a:latin typeface="Arial" panose="020B0604020202020204" pitchFamily="34" charset="0"/>
-            </a:endParaRPr>
-          </a:p>
-        </p:txBody>
-      </p:sp>
-    </p:spTree>
-    <p:extLst>
-      <p:ext uri="{BB962C8B-B14F-4D97-AF65-F5344CB8AC3E}">
-        <p14:creationId xmlns:p14="http://schemas.microsoft.com/office/powerpoint/2010/main" val="1733827384"/>
       </p:ext>
     </p:extLst>
   </p:cSld>

</xml_diff>